<commit_message>
homogénéisation des échelles et ajouts de texte explicatif
Signed-off-by: FAUBERT Violaine (UA 1383) <W817186@intra.bdf.local>
</commit_message>
<xml_diff>
--- a/c17255-Point d’étape projet WIOD TIVA.pptx
+++ b/c17255-Point d’étape projet WIOD TIVA.pptx
@@ -6,15 +6,17 @@
   </p:sldMasterIdLst>
   <p:sldIdLst>
     <p:sldId id="256" r:id="rId2"/>
-    <p:sldId id="257" r:id="rId3"/>
-    <p:sldId id="258" r:id="rId4"/>
-    <p:sldId id="260" r:id="rId5"/>
-    <p:sldId id="261" r:id="rId6"/>
-    <p:sldId id="259" r:id="rId7"/>
-    <p:sldId id="262" r:id="rId8"/>
-    <p:sldId id="263" r:id="rId9"/>
-    <p:sldId id="265" r:id="rId10"/>
-    <p:sldId id="266" r:id="rId11"/>
+    <p:sldId id="267" r:id="rId3"/>
+    <p:sldId id="257" r:id="rId4"/>
+    <p:sldId id="258" r:id="rId5"/>
+    <p:sldId id="260" r:id="rId6"/>
+    <p:sldId id="261" r:id="rId7"/>
+    <p:sldId id="259" r:id="rId8"/>
+    <p:sldId id="262" r:id="rId9"/>
+    <p:sldId id="263" r:id="rId10"/>
+    <p:sldId id="265" r:id="rId11"/>
+    <p:sldId id="266" r:id="rId12"/>
+    <p:sldId id="268" r:id="rId13"/>
   </p:sldIdLst>
   <p:sldSz cx="9144000" cy="6858000" type="screen4x3"/>
   <p:notesSz cx="6858000" cy="9144000"/>
@@ -3202,11 +3204,239 @@
           <a:p>
             <a:r>
               <a:rPr lang="fr-FR" dirty="0" smtClean="0"/>
-              <a:t>Élasticité prix conso ZE à une appréciation </a:t>
-            </a:r>
+              <a:t>Élasticité prix conso ZE à une appréciation USD</a:t>
+            </a:r>
+            <a:endParaRPr lang="fr-FR" dirty="0"/>
+          </a:p>
+        </p:txBody>
+      </p:sp>
+      <p:graphicFrame>
+        <p:nvGraphicFramePr>
+          <p:cNvPr id="4" name="Espace réservé du contenu 3"/>
+          <p:cNvGraphicFramePr>
+            <a:graphicFrameLocks noGrp="1"/>
+          </p:cNvGraphicFramePr>
+          <p:nvPr>
+            <p:ph idx="1"/>
+            <p:extLst>
+              <p:ext uri="{D42A27DB-BD31-4B8C-83A1-F6EECF244321}">
+                <p14:modId xmlns:p14="http://schemas.microsoft.com/office/powerpoint/2010/main" val="1940146336"/>
+              </p:ext>
+            </p:extLst>
+          </p:nvPr>
+        </p:nvGraphicFramePr>
+        <p:xfrm>
+          <a:off x="457200" y="1600200"/>
+          <a:ext cx="8229600" cy="370840"/>
+        </p:xfrm>
+        <a:graphic>
+          <a:graphicData uri="http://schemas.openxmlformats.org/drawingml/2006/table">
+            <a:tbl>
+              <a:tblPr firstRow="1" bandRow="1">
+                <a:tableStyleId>{5C22544A-7EE6-4342-B048-85BDC9FD1C3A}</a:tableStyleId>
+              </a:tblPr>
+              <a:tblGrid>
+                <a:gridCol w="4114800"/>
+                <a:gridCol w="4114800"/>
+              </a:tblGrid>
+              <a:tr h="370840">
+                <a:tc>
+                  <a:txBody>
+                    <a:bodyPr/>
+                    <a:lstStyle/>
+                    <a:p>
+                      <a:pPr algn="ctr"/>
+                      <a:r>
+                        <a:rPr lang="fr-FR" dirty="0" smtClean="0"/>
+                        <a:t>WIOD</a:t>
+                      </a:r>
+                      <a:endParaRPr lang="fr-FR" dirty="0"/>
+                    </a:p>
+                  </a:txBody>
+                  <a:tcPr/>
+                </a:tc>
+                <a:tc>
+                  <a:txBody>
+                    <a:bodyPr/>
+                    <a:lstStyle/>
+                    <a:p>
+                      <a:pPr algn="ctr"/>
+                      <a:r>
+                        <a:rPr lang="fr-FR" dirty="0" smtClean="0"/>
+                        <a:t>TIVA</a:t>
+                      </a:r>
+                      <a:endParaRPr lang="fr-FR" dirty="0"/>
+                    </a:p>
+                  </a:txBody>
+                  <a:tcPr/>
+                </a:tc>
+              </a:tr>
+            </a:tbl>
+          </a:graphicData>
+        </a:graphic>
+      </p:graphicFrame>
+      <p:pic>
+        <p:nvPicPr>
+          <p:cNvPr id="5122" name="Picture 2" descr="V:\DiagConj\Commun\CommerceVA\Results\Devaluations\HC_Graph_7c_TIVA.png"/>
+          <p:cNvPicPr>
+            <a:picLocks noChangeAspect="1" noChangeArrowheads="1"/>
+          </p:cNvPicPr>
+          <p:nvPr/>
+        </p:nvPicPr>
+        <p:blipFill>
+          <a:blip r:embed="rId2">
+            <a:extLst>
+              <a:ext uri="{28A0092B-C50C-407E-A947-70E740481C1C}">
+                <a14:useLocalDpi xmlns:a14="http://schemas.microsoft.com/office/drawing/2010/main" val="0"/>
+              </a:ext>
+            </a:extLst>
+          </a:blip>
+          <a:srcRect/>
+          <a:stretch>
+            <a:fillRect/>
+          </a:stretch>
+        </p:blipFill>
+        <p:spPr bwMode="auto">
+          <a:xfrm>
+            <a:off x="4548304" y="1988839"/>
+            <a:ext cx="4552950" cy="3305175"/>
+          </a:xfrm>
+          <a:prstGeom prst="rect">
+            <a:avLst/>
+          </a:prstGeom>
+          <a:noFill/>
+          <a:extLst>
+            <a:ext uri="{909E8E84-426E-40DD-AFC4-6F175D3DCCD1}">
+              <a14:hiddenFill xmlns:a14="http://schemas.microsoft.com/office/drawing/2010/main">
+                <a:solidFill>
+                  <a:srgbClr val="FFFFFF"/>
+                </a:solidFill>
+              </a14:hiddenFill>
+            </a:ext>
+          </a:extLst>
+        </p:spPr>
+      </p:pic>
+      <p:pic>
+        <p:nvPicPr>
+          <p:cNvPr id="5123" name="Picture 3" descr="V:\DiagConj\Commun\CommerceVA\Results\Devaluations\HC_Graph_7c_WIOD.png"/>
+          <p:cNvPicPr>
+            <a:picLocks noChangeAspect="1" noChangeArrowheads="1"/>
+          </p:cNvPicPr>
+          <p:nvPr/>
+        </p:nvPicPr>
+        <p:blipFill>
+          <a:blip r:embed="rId3">
+            <a:extLst>
+              <a:ext uri="{28A0092B-C50C-407E-A947-70E740481C1C}">
+                <a14:useLocalDpi xmlns:a14="http://schemas.microsoft.com/office/drawing/2010/main" val="0"/>
+              </a:ext>
+            </a:extLst>
+          </a:blip>
+          <a:srcRect/>
+          <a:stretch>
+            <a:fillRect/>
+          </a:stretch>
+        </p:blipFill>
+        <p:spPr bwMode="auto">
+          <a:xfrm>
+            <a:off x="-4646" y="1988840"/>
+            <a:ext cx="4552950" cy="3305175"/>
+          </a:xfrm>
+          <a:prstGeom prst="rect">
+            <a:avLst/>
+          </a:prstGeom>
+          <a:noFill/>
+          <a:extLst>
+            <a:ext uri="{909E8E84-426E-40DD-AFC4-6F175D3DCCD1}">
+              <a14:hiddenFill xmlns:a14="http://schemas.microsoft.com/office/drawing/2010/main">
+                <a:solidFill>
+                  <a:srgbClr val="FFFFFF"/>
+                </a:solidFill>
+              </a14:hiddenFill>
+            </a:ext>
+          </a:extLst>
+        </p:spPr>
+      </p:pic>
+      <p:sp>
+        <p:nvSpPr>
+          <p:cNvPr id="3" name="ZoneTexte 2"/>
+          <p:cNvSpPr txBox="1"/>
+          <p:nvPr/>
+        </p:nvSpPr>
+        <p:spPr>
+          <a:xfrm>
+            <a:off x="323528" y="5661248"/>
+            <a:ext cx="8640960" cy="646331"/>
+          </a:xfrm>
+          <a:prstGeom prst="rect">
+            <a:avLst/>
+          </a:prstGeom>
+          <a:noFill/>
+        </p:spPr>
+        <p:txBody>
+          <a:bodyPr wrap="square" rtlCol="0">
+            <a:spAutoFit/>
+          </a:bodyPr>
+          <a:lstStyle/>
+          <a:p>
             <a:r>
               <a:rPr lang="fr-FR" dirty="0" smtClean="0"/>
-              <a:t>UK</a:t>
+              <a:t>WIOD: corrélation positive entre parts des importations dans la consommation et impact du choc de change</a:t>
+            </a:r>
+            <a:endParaRPr lang="fr-FR" dirty="0"/>
+          </a:p>
+        </p:txBody>
+      </p:sp>
+    </p:spTree>
+    <p:extLst>
+      <p:ext uri="{BB962C8B-B14F-4D97-AF65-F5344CB8AC3E}">
+        <p14:creationId xmlns:p14="http://schemas.microsoft.com/office/powerpoint/2010/main" val="93674187"/>
+      </p:ext>
+    </p:extLst>
+  </p:cSld>
+  <p:clrMapOvr>
+    <a:masterClrMapping/>
+  </p:clrMapOvr>
+</p:sld>
+</file>
+
+<file path=ppt/slides/slide11.xml><?xml version="1.0" encoding="utf-8"?>
+<p:sld xmlns:a="http://schemas.openxmlformats.org/drawingml/2006/main" xmlns:r="http://schemas.openxmlformats.org/officeDocument/2006/relationships" xmlns:p="http://schemas.openxmlformats.org/presentationml/2006/main">
+  <p:cSld>
+    <p:spTree>
+      <p:nvGrpSpPr>
+        <p:cNvPr id="1" name=""/>
+        <p:cNvGrpSpPr/>
+        <p:nvPr/>
+      </p:nvGrpSpPr>
+      <p:grpSpPr>
+        <a:xfrm>
+          <a:off x="0" y="0"/>
+          <a:ext cx="0" cy="0"/>
+          <a:chOff x="0" y="0"/>
+          <a:chExt cx="0" cy="0"/>
+        </a:xfrm>
+      </p:grpSpPr>
+      <p:sp>
+        <p:nvSpPr>
+          <p:cNvPr id="2" name="Titre 1"/>
+          <p:cNvSpPr>
+            <a:spLocks noGrp="1"/>
+          </p:cNvSpPr>
+          <p:nvPr>
+            <p:ph type="title"/>
+          </p:nvPr>
+        </p:nvSpPr>
+        <p:spPr/>
+        <p:txBody>
+          <a:bodyPr>
+            <a:normAutofit fontScale="90000"/>
+          </a:bodyPr>
+          <a:lstStyle/>
+          <a:p>
+            <a:r>
+              <a:rPr lang="fr-FR" dirty="0" smtClean="0"/>
+              <a:t>Élasticité prix conso ZE à une appréciation UK</a:t>
             </a:r>
             <a:endParaRPr lang="fr-FR" dirty="0"/>
           </a:p>
@@ -3372,7 +3602,205 @@
 </p:sld>
 </file>
 
+<file path=ppt/slides/slide12.xml><?xml version="1.0" encoding="utf-8"?>
+<p:sld xmlns:a="http://schemas.openxmlformats.org/drawingml/2006/main" xmlns:r="http://schemas.openxmlformats.org/officeDocument/2006/relationships" xmlns:p="http://schemas.openxmlformats.org/presentationml/2006/main">
+  <p:cSld>
+    <p:spTree>
+      <p:nvGrpSpPr>
+        <p:cNvPr id="1" name=""/>
+        <p:cNvGrpSpPr/>
+        <p:nvPr/>
+      </p:nvGrpSpPr>
+      <p:grpSpPr>
+        <a:xfrm>
+          <a:off x="0" y="0"/>
+          <a:ext cx="0" cy="0"/>
+          <a:chOff x="0" y="0"/>
+          <a:chExt cx="0" cy="0"/>
+        </a:xfrm>
+      </p:grpSpPr>
+      <p:sp>
+        <p:nvSpPr>
+          <p:cNvPr id="2" name="Titre 1"/>
+          <p:cNvSpPr>
+            <a:spLocks noGrp="1"/>
+          </p:cNvSpPr>
+          <p:nvPr>
+            <p:ph type="title"/>
+          </p:nvPr>
+        </p:nvSpPr>
+        <p:spPr/>
+        <p:txBody>
+          <a:bodyPr/>
+          <a:lstStyle/>
+          <a:p>
+            <a:r>
+              <a:rPr lang="fr-FR" dirty="0" smtClean="0"/>
+              <a:t>Suite du projet</a:t>
+            </a:r>
+            <a:endParaRPr lang="fr-FR" dirty="0"/>
+          </a:p>
+        </p:txBody>
+      </p:sp>
+      <p:sp>
+        <p:nvSpPr>
+          <p:cNvPr id="3" name="Espace réservé du contenu 2"/>
+          <p:cNvSpPr>
+            <a:spLocks noGrp="1"/>
+          </p:cNvSpPr>
+          <p:nvPr>
+            <p:ph idx="1"/>
+          </p:nvPr>
+        </p:nvSpPr>
+        <p:spPr/>
+        <p:txBody>
+          <a:bodyPr/>
+          <a:lstStyle/>
+          <a:p>
+            <a:r>
+              <a:rPr lang="fr-FR" dirty="0" smtClean="0"/>
+              <a:t>Interprétation des résultats</a:t>
+            </a:r>
+          </a:p>
+          <a:p>
+            <a:r>
+              <a:rPr lang="fr-FR" dirty="0" smtClean="0"/>
+              <a:t>Approfondir l’analyse sur la part des inputs importés </a:t>
+            </a:r>
+          </a:p>
+          <a:p>
+            <a:r>
+              <a:rPr lang="fr-FR" dirty="0" smtClean="0"/>
+              <a:t>Impact d’un choc sur le prix du pétrole sur les déflateurs</a:t>
+            </a:r>
+            <a:endParaRPr lang="fr-FR" dirty="0"/>
+          </a:p>
+        </p:txBody>
+      </p:sp>
+    </p:spTree>
+    <p:extLst>
+      <p:ext uri="{BB962C8B-B14F-4D97-AF65-F5344CB8AC3E}">
+        <p14:creationId xmlns:p14="http://schemas.microsoft.com/office/powerpoint/2010/main" val="3062386013"/>
+      </p:ext>
+    </p:extLst>
+  </p:cSld>
+  <p:clrMapOvr>
+    <a:masterClrMapping/>
+  </p:clrMapOvr>
+</p:sld>
+</file>
+
 <file path=ppt/slides/slide2.xml><?xml version="1.0" encoding="utf-8"?>
+<p:sld xmlns:a="http://schemas.openxmlformats.org/drawingml/2006/main" xmlns:r="http://schemas.openxmlformats.org/officeDocument/2006/relationships" xmlns:p="http://schemas.openxmlformats.org/presentationml/2006/main">
+  <p:cSld>
+    <p:spTree>
+      <p:nvGrpSpPr>
+        <p:cNvPr id="1" name=""/>
+        <p:cNvGrpSpPr/>
+        <p:nvPr/>
+      </p:nvGrpSpPr>
+      <p:grpSpPr>
+        <a:xfrm>
+          <a:off x="0" y="0"/>
+          <a:ext cx="0" cy="0"/>
+          <a:chOff x="0" y="0"/>
+          <a:chExt cx="0" cy="0"/>
+        </a:xfrm>
+      </p:grpSpPr>
+      <p:sp>
+        <p:nvSpPr>
+          <p:cNvPr id="2" name="Titre 1"/>
+          <p:cNvSpPr>
+            <a:spLocks noGrp="1"/>
+          </p:cNvSpPr>
+          <p:nvPr>
+            <p:ph type="title"/>
+          </p:nvPr>
+        </p:nvSpPr>
+        <p:spPr/>
+        <p:txBody>
+          <a:bodyPr/>
+          <a:lstStyle/>
+          <a:p>
+            <a:r>
+              <a:rPr lang="fr-FR" dirty="0" smtClean="0"/>
+              <a:t>Travail effectué</a:t>
+            </a:r>
+            <a:endParaRPr lang="fr-FR" dirty="0"/>
+          </a:p>
+        </p:txBody>
+      </p:sp>
+      <p:sp>
+        <p:nvSpPr>
+          <p:cNvPr id="3" name="Espace réservé du contenu 2"/>
+          <p:cNvSpPr>
+            <a:spLocks noGrp="1"/>
+          </p:cNvSpPr>
+          <p:nvPr>
+            <p:ph idx="1"/>
+          </p:nvPr>
+        </p:nvSpPr>
+        <p:spPr>
+          <a:xfrm>
+            <a:off x="457200" y="1268760"/>
+            <a:ext cx="8229600" cy="4857403"/>
+          </a:xfrm>
+        </p:spPr>
+        <p:txBody>
+          <a:bodyPr/>
+          <a:lstStyle/>
+          <a:p>
+            <a:r>
+              <a:rPr lang="fr-FR" dirty="0" smtClean="0"/>
+              <a:t>Reproduction du travail fourni dans le WP OFCE à une nouvelle base de données (WIOD) et prise en compte des mises à jour de la base TIVA</a:t>
+            </a:r>
+          </a:p>
+          <a:p>
+            <a:r>
+              <a:rPr lang="fr-FR" dirty="0" smtClean="0"/>
+              <a:t>Impact de chocs de change sur:</a:t>
+            </a:r>
+          </a:p>
+          <a:p>
+            <a:pPr lvl="1"/>
+            <a:r>
+              <a:rPr lang="fr-FR" dirty="0" smtClean="0"/>
+              <a:t>Prix de production</a:t>
+            </a:r>
+          </a:p>
+          <a:p>
+            <a:pPr lvl="1"/>
+            <a:r>
+              <a:rPr lang="fr-FR" dirty="0" smtClean="0"/>
+              <a:t>Prix d’exportations</a:t>
+            </a:r>
+          </a:p>
+          <a:p>
+            <a:pPr lvl="1"/>
+            <a:r>
+              <a:rPr lang="fr-FR" dirty="0" smtClean="0"/>
+              <a:t>Prix de consommation</a:t>
+            </a:r>
+          </a:p>
+          <a:p>
+            <a:endParaRPr lang="fr-FR" dirty="0"/>
+          </a:p>
+        </p:txBody>
+      </p:sp>
+    </p:spTree>
+    <p:extLst>
+      <p:ext uri="{BB962C8B-B14F-4D97-AF65-F5344CB8AC3E}">
+        <p14:creationId xmlns:p14="http://schemas.microsoft.com/office/powerpoint/2010/main" val="3408210633"/>
+      </p:ext>
+    </p:extLst>
+  </p:cSld>
+  <p:clrMapOvr>
+    <a:masterClrMapping/>
+  </p:clrMapOvr>
+</p:sld>
+</file>
+
+<file path=ppt/slides/slide3.xml><?xml version="1.0" encoding="utf-8"?>
 <p:sld xmlns:a="http://schemas.openxmlformats.org/drawingml/2006/main" xmlns:r="http://schemas.openxmlformats.org/officeDocument/2006/relationships" xmlns:p="http://schemas.openxmlformats.org/presentationml/2006/main">
   <p:cSld>
     <p:spTree>
@@ -3584,15 +4012,7 @@
                     <a:p>
                       <a:r>
                         <a:rPr lang="fr-FR" dirty="0" smtClean="0"/>
-                        <a:t>Agriculture, </a:t>
-                      </a:r>
-                      <a:r>
-                        <a:rPr lang="fr-FR" dirty="0" smtClean="0"/>
-                        <a:t>biens, </a:t>
-                      </a:r>
-                      <a:r>
-                        <a:rPr lang="fr-FR" dirty="0" smtClean="0"/>
-                        <a:t>services</a:t>
+                        <a:t>Agriculture, biens, services</a:t>
                       </a:r>
                       <a:endParaRPr lang="fr-FR" dirty="0"/>
                     </a:p>
@@ -3644,19 +4064,7 @@
                           <a:ea typeface="+mn-ea"/>
                           <a:cs typeface="+mn-cs"/>
                         </a:rPr>
-                        <a:t>Import </a:t>
-                      </a:r>
-                      <a:r>
-                        <a:rPr lang="en-US" sz="1800" b="1" kern="1200" dirty="0" smtClean="0">
-                          <a:solidFill>
-                            <a:schemeClr val="dk1"/>
-                          </a:solidFill>
-                          <a:effectLst/>
-                          <a:latin typeface="+mn-lt"/>
-                          <a:ea typeface="+mn-ea"/>
-                          <a:cs typeface="+mn-cs"/>
-                        </a:rPr>
-                        <a:t>proportionality assumption</a:t>
+                        <a:t>Import proportionality assumption</a:t>
                       </a:r>
                       <a:endParaRPr lang="fr-FR" b="1" dirty="0"/>
                     </a:p>
@@ -3726,19 +4134,7 @@
                           <a:ea typeface="+mn-ea"/>
                           <a:cs typeface="+mn-cs"/>
                         </a:rPr>
-                        <a:t>uses </a:t>
-                      </a:r>
-                      <a:r>
-                        <a:rPr lang="en-US" sz="1800" b="1" kern="1200" dirty="0" smtClean="0">
-                          <a:solidFill>
-                            <a:schemeClr val="dk1"/>
-                          </a:solidFill>
-                          <a:effectLst/>
-                          <a:latin typeface="+mn-lt"/>
-                          <a:ea typeface="+mn-ea"/>
-                          <a:cs typeface="+mn-cs"/>
-                        </a:rPr>
-                        <a:t>bilateral trade statistics to derive import shares for three end-use categories </a:t>
+                        <a:t>uses bilateral trade statistics to derive import shares for three end-use categories </a:t>
                       </a:r>
                       <a:r>
                         <a:rPr lang="en-US" sz="1800" kern="1200" dirty="0" smtClean="0">
@@ -3803,19 +4199,7 @@
                           <a:ea typeface="+mn-ea"/>
                           <a:cs typeface="+mn-cs"/>
                         </a:rPr>
-                        <a:t>assumes </a:t>
-                      </a:r>
-                      <a:r>
-                        <a:rPr lang="en-US" sz="1800" b="1" kern="1200" dirty="0" smtClean="0">
-                          <a:solidFill>
-                            <a:schemeClr val="dk1"/>
-                          </a:solidFill>
-                          <a:effectLst/>
-                          <a:latin typeface="+mn-lt"/>
-                          <a:ea typeface="+mn-ea"/>
-                          <a:cs typeface="+mn-cs"/>
-                        </a:rPr>
-                        <a:t>that the share of imports in any product consumed directly as intermediate consumption or final demand is the same for all users</a:t>
+                        <a:t>assumes that the share of imports in any product consumed directly as intermediate consumption or final demand is the same for all users</a:t>
                       </a:r>
                       <a:endParaRPr lang="fr-FR" b="1" dirty="0"/>
                     </a:p>
@@ -3840,7 +4224,7 @@
 </p:sld>
 </file>
 
-<file path=ppt/slides/slide3.xml><?xml version="1.0" encoding="utf-8"?>
+<file path=ppt/slides/slide4.xml><?xml version="1.0" encoding="utf-8"?>
 <p:sld xmlns:a="http://schemas.openxmlformats.org/drawingml/2006/main" xmlns:r="http://schemas.openxmlformats.org/officeDocument/2006/relationships" xmlns:p="http://schemas.openxmlformats.org/presentationml/2006/main">
   <p:cSld>
     <p:spTree>
@@ -4131,7 +4515,7 @@
 </p:sld>
 </file>
 
-<file path=ppt/slides/slide4.xml><?xml version="1.0" encoding="utf-8"?>
+<file path=ppt/slides/slide5.xml><?xml version="1.0" encoding="utf-8"?>
 <p:sld xmlns:a="http://schemas.openxmlformats.org/drawingml/2006/main" xmlns:r="http://schemas.openxmlformats.org/officeDocument/2006/relationships" xmlns:p="http://schemas.openxmlformats.org/presentationml/2006/main">
   <p:cSld>
     <p:spTree>
@@ -4333,7 +4717,7 @@
 </p:sld>
 </file>
 
-<file path=ppt/slides/slide5.xml><?xml version="1.0" encoding="utf-8"?>
+<file path=ppt/slides/slide6.xml><?xml version="1.0" encoding="utf-8"?>
 <p:sld xmlns:a="http://schemas.openxmlformats.org/drawingml/2006/main" xmlns:r="http://schemas.openxmlformats.org/officeDocument/2006/relationships" xmlns:p="http://schemas.openxmlformats.org/presentationml/2006/main">
   <p:cSld>
     <p:spTree>
@@ -4369,15 +4753,7 @@
           <a:p>
             <a:r>
               <a:rPr lang="fr-FR" dirty="0" smtClean="0"/>
-              <a:t>Élasticité prix </a:t>
-            </a:r>
-            <a:r>
-              <a:rPr lang="fr-FR" dirty="0" smtClean="0"/>
-              <a:t>conso </a:t>
-            </a:r>
-            <a:r>
-              <a:rPr lang="fr-FR" dirty="0" smtClean="0"/>
-              <a:t>pays hors ZE à une appréciation EUR</a:t>
+              <a:t>Élasticité prix conso pays hors ZE à une appréciation EUR</a:t>
             </a:r>
             <a:endParaRPr lang="fr-FR" dirty="0"/>
           </a:p>
@@ -4593,7 +4969,7 @@
 </p:sld>
 </file>
 
-<file path=ppt/slides/slide6.xml><?xml version="1.0" encoding="utf-8"?>
+<file path=ppt/slides/slide7.xml><?xml version="1.0" encoding="utf-8"?>
 <p:sld xmlns:a="http://schemas.openxmlformats.org/drawingml/2006/main" xmlns:r="http://schemas.openxmlformats.org/officeDocument/2006/relationships" xmlns:p="http://schemas.openxmlformats.org/presentationml/2006/main">
   <p:cSld>
     <p:spTree>
@@ -4800,7 +5176,7 @@
 </p:sld>
 </file>
 
-<file path=ppt/slides/slide7.xml><?xml version="1.0" encoding="utf-8"?>
+<file path=ppt/slides/slide8.xml><?xml version="1.0" encoding="utf-8"?>
 <p:sld xmlns:a="http://schemas.openxmlformats.org/drawingml/2006/main" xmlns:r="http://schemas.openxmlformats.org/officeDocument/2006/relationships" xmlns:p="http://schemas.openxmlformats.org/presentationml/2006/main">
   <p:cSld>
     <p:spTree>
@@ -5056,7 +5432,7 @@
 </p:sld>
 </file>
 
-<file path=ppt/slides/slide8.xml><?xml version="1.0" encoding="utf-8"?>
+<file path=ppt/slides/slide9.xml><?xml version="1.0" encoding="utf-8"?>
 <p:sld xmlns:a="http://schemas.openxmlformats.org/drawingml/2006/main" xmlns:r="http://schemas.openxmlformats.org/officeDocument/2006/relationships" xmlns:p="http://schemas.openxmlformats.org/presentationml/2006/main">
   <p:cSld>
     <p:spTree>
@@ -5303,242 +5679,6 @@
     <p:extLst>
       <p:ext uri="{BB962C8B-B14F-4D97-AF65-F5344CB8AC3E}">
         <p14:creationId xmlns:p14="http://schemas.microsoft.com/office/powerpoint/2010/main" val="4245209825"/>
-      </p:ext>
-    </p:extLst>
-  </p:cSld>
-  <p:clrMapOvr>
-    <a:masterClrMapping/>
-  </p:clrMapOvr>
-</p:sld>
-</file>
-
-<file path=ppt/slides/slide9.xml><?xml version="1.0" encoding="utf-8"?>
-<p:sld xmlns:a="http://schemas.openxmlformats.org/drawingml/2006/main" xmlns:r="http://schemas.openxmlformats.org/officeDocument/2006/relationships" xmlns:p="http://schemas.openxmlformats.org/presentationml/2006/main">
-  <p:cSld>
-    <p:spTree>
-      <p:nvGrpSpPr>
-        <p:cNvPr id="1" name=""/>
-        <p:cNvGrpSpPr/>
-        <p:nvPr/>
-      </p:nvGrpSpPr>
-      <p:grpSpPr>
-        <a:xfrm>
-          <a:off x="0" y="0"/>
-          <a:ext cx="0" cy="0"/>
-          <a:chOff x="0" y="0"/>
-          <a:chExt cx="0" cy="0"/>
-        </a:xfrm>
-      </p:grpSpPr>
-      <p:sp>
-        <p:nvSpPr>
-          <p:cNvPr id="2" name="Titre 1"/>
-          <p:cNvSpPr>
-            <a:spLocks noGrp="1"/>
-          </p:cNvSpPr>
-          <p:nvPr>
-            <p:ph type="title"/>
-          </p:nvPr>
-        </p:nvSpPr>
-        <p:spPr/>
-        <p:txBody>
-          <a:bodyPr>
-            <a:normAutofit fontScale="90000"/>
-          </a:bodyPr>
-          <a:lstStyle/>
-          <a:p>
-            <a:r>
-              <a:rPr lang="fr-FR" dirty="0" smtClean="0"/>
-              <a:t>Élasticité prix conso ZE à une appréciation </a:t>
-            </a:r>
-            <a:r>
-              <a:rPr lang="fr-FR" dirty="0" smtClean="0"/>
-              <a:t>USD</a:t>
-            </a:r>
-            <a:endParaRPr lang="fr-FR" dirty="0"/>
-          </a:p>
-        </p:txBody>
-      </p:sp>
-      <p:graphicFrame>
-        <p:nvGraphicFramePr>
-          <p:cNvPr id="4" name="Espace réservé du contenu 3"/>
-          <p:cNvGraphicFramePr>
-            <a:graphicFrameLocks noGrp="1"/>
-          </p:cNvGraphicFramePr>
-          <p:nvPr>
-            <p:ph idx="1"/>
-            <p:extLst>
-              <p:ext uri="{D42A27DB-BD31-4B8C-83A1-F6EECF244321}">
-                <p14:modId xmlns:p14="http://schemas.microsoft.com/office/powerpoint/2010/main" val="1940146336"/>
-              </p:ext>
-            </p:extLst>
-          </p:nvPr>
-        </p:nvGraphicFramePr>
-        <p:xfrm>
-          <a:off x="457200" y="1600200"/>
-          <a:ext cx="8229600" cy="370840"/>
-        </p:xfrm>
-        <a:graphic>
-          <a:graphicData uri="http://schemas.openxmlformats.org/drawingml/2006/table">
-            <a:tbl>
-              <a:tblPr firstRow="1" bandRow="1">
-                <a:tableStyleId>{5C22544A-7EE6-4342-B048-85BDC9FD1C3A}</a:tableStyleId>
-              </a:tblPr>
-              <a:tblGrid>
-                <a:gridCol w="4114800"/>
-                <a:gridCol w="4114800"/>
-              </a:tblGrid>
-              <a:tr h="370840">
-                <a:tc>
-                  <a:txBody>
-                    <a:bodyPr/>
-                    <a:lstStyle/>
-                    <a:p>
-                      <a:pPr algn="ctr"/>
-                      <a:r>
-                        <a:rPr lang="fr-FR" dirty="0" smtClean="0"/>
-                        <a:t>WIOD</a:t>
-                      </a:r>
-                      <a:endParaRPr lang="fr-FR" dirty="0"/>
-                    </a:p>
-                  </a:txBody>
-                  <a:tcPr/>
-                </a:tc>
-                <a:tc>
-                  <a:txBody>
-                    <a:bodyPr/>
-                    <a:lstStyle/>
-                    <a:p>
-                      <a:pPr algn="ctr"/>
-                      <a:r>
-                        <a:rPr lang="fr-FR" dirty="0" smtClean="0"/>
-                        <a:t>TIVA</a:t>
-                      </a:r>
-                      <a:endParaRPr lang="fr-FR" dirty="0"/>
-                    </a:p>
-                  </a:txBody>
-                  <a:tcPr/>
-                </a:tc>
-              </a:tr>
-            </a:tbl>
-          </a:graphicData>
-        </a:graphic>
-      </p:graphicFrame>
-      <p:pic>
-        <p:nvPicPr>
-          <p:cNvPr id="5122" name="Picture 2" descr="V:\DiagConj\Commun\CommerceVA\Results\Devaluations\HC_Graph_7c_TIVA.png"/>
-          <p:cNvPicPr>
-            <a:picLocks noChangeAspect="1" noChangeArrowheads="1"/>
-          </p:cNvPicPr>
-          <p:nvPr/>
-        </p:nvPicPr>
-        <p:blipFill>
-          <a:blip r:embed="rId2">
-            <a:extLst>
-              <a:ext uri="{28A0092B-C50C-407E-A947-70E740481C1C}">
-                <a14:useLocalDpi xmlns:a14="http://schemas.microsoft.com/office/drawing/2010/main" val="0"/>
-              </a:ext>
-            </a:extLst>
-          </a:blip>
-          <a:srcRect/>
-          <a:stretch>
-            <a:fillRect/>
-          </a:stretch>
-        </p:blipFill>
-        <p:spPr bwMode="auto">
-          <a:xfrm>
-            <a:off x="4548304" y="1988839"/>
-            <a:ext cx="4552950" cy="3305175"/>
-          </a:xfrm>
-          <a:prstGeom prst="rect">
-            <a:avLst/>
-          </a:prstGeom>
-          <a:noFill/>
-          <a:extLst>
-            <a:ext uri="{909E8E84-426E-40DD-AFC4-6F175D3DCCD1}">
-              <a14:hiddenFill xmlns:a14="http://schemas.microsoft.com/office/drawing/2010/main">
-                <a:solidFill>
-                  <a:srgbClr val="FFFFFF"/>
-                </a:solidFill>
-              </a14:hiddenFill>
-            </a:ext>
-          </a:extLst>
-        </p:spPr>
-      </p:pic>
-      <p:pic>
-        <p:nvPicPr>
-          <p:cNvPr id="5123" name="Picture 3" descr="V:\DiagConj\Commun\CommerceVA\Results\Devaluations\HC_Graph_7c_WIOD.png"/>
-          <p:cNvPicPr>
-            <a:picLocks noChangeAspect="1" noChangeArrowheads="1"/>
-          </p:cNvPicPr>
-          <p:nvPr/>
-        </p:nvPicPr>
-        <p:blipFill>
-          <a:blip r:embed="rId3">
-            <a:extLst>
-              <a:ext uri="{28A0092B-C50C-407E-A947-70E740481C1C}">
-                <a14:useLocalDpi xmlns:a14="http://schemas.microsoft.com/office/drawing/2010/main" val="0"/>
-              </a:ext>
-            </a:extLst>
-          </a:blip>
-          <a:srcRect/>
-          <a:stretch>
-            <a:fillRect/>
-          </a:stretch>
-        </p:blipFill>
-        <p:spPr bwMode="auto">
-          <a:xfrm>
-            <a:off x="-4646" y="1988840"/>
-            <a:ext cx="4552950" cy="3305175"/>
-          </a:xfrm>
-          <a:prstGeom prst="rect">
-            <a:avLst/>
-          </a:prstGeom>
-          <a:noFill/>
-          <a:extLst>
-            <a:ext uri="{909E8E84-426E-40DD-AFC4-6F175D3DCCD1}">
-              <a14:hiddenFill xmlns:a14="http://schemas.microsoft.com/office/drawing/2010/main">
-                <a:solidFill>
-                  <a:srgbClr val="FFFFFF"/>
-                </a:solidFill>
-              </a14:hiddenFill>
-            </a:ext>
-          </a:extLst>
-        </p:spPr>
-      </p:pic>
-      <p:sp>
-        <p:nvSpPr>
-          <p:cNvPr id="3" name="ZoneTexte 2"/>
-          <p:cNvSpPr txBox="1"/>
-          <p:nvPr/>
-        </p:nvSpPr>
-        <p:spPr>
-          <a:xfrm>
-            <a:off x="323528" y="5661248"/>
-            <a:ext cx="8640960" cy="646331"/>
-          </a:xfrm>
-          <a:prstGeom prst="rect">
-            <a:avLst/>
-          </a:prstGeom>
-          <a:noFill/>
-        </p:spPr>
-        <p:txBody>
-          <a:bodyPr wrap="square" rtlCol="0">
-            <a:spAutoFit/>
-          </a:bodyPr>
-          <a:lstStyle/>
-          <a:p>
-            <a:r>
-              <a:rPr lang="fr-FR" dirty="0" smtClean="0"/>
-              <a:t>WIOD: corrélation positive entre parts des importations dans la consommation et impact du choc de change</a:t>
-            </a:r>
-            <a:endParaRPr lang="fr-FR" dirty="0"/>
-          </a:p>
-        </p:txBody>
-      </p:sp>
-    </p:spTree>
-    <p:extLst>
-      <p:ext uri="{BB962C8B-B14F-4D97-AF65-F5344CB8AC3E}">
-        <p14:creationId xmlns:p14="http://schemas.microsoft.com/office/powerpoint/2010/main" val="93674187"/>
       </p:ext>
     </p:extLst>
   </p:cSld>

</xml_diff>

<commit_message>
les graphs de la fin ne sont pas à jour
Signed-off-by: FAUBERT Violaine (UA 1383) <W817186@intra.bdf.local>
</commit_message>
<xml_diff>
--- a/c17255-Point d’étape projet WIOD TIVA.pptx
+++ b/c17255-Point d’étape projet WIOD TIVA.pptx
@@ -4,19 +4,23 @@
   <p:sldMasterIdLst>
     <p:sldMasterId id="2147483648" r:id="rId1"/>
   </p:sldMasterIdLst>
+  <p:notesMasterIdLst>
+    <p:notesMasterId r:id="rId15"/>
+  </p:notesMasterIdLst>
   <p:sldIdLst>
     <p:sldId id="256" r:id="rId2"/>
     <p:sldId id="267" r:id="rId3"/>
     <p:sldId id="257" r:id="rId4"/>
-    <p:sldId id="258" r:id="rId5"/>
-    <p:sldId id="260" r:id="rId6"/>
-    <p:sldId id="261" r:id="rId7"/>
-    <p:sldId id="259" r:id="rId8"/>
-    <p:sldId id="262" r:id="rId9"/>
-    <p:sldId id="263" r:id="rId10"/>
-    <p:sldId id="265" r:id="rId11"/>
-    <p:sldId id="266" r:id="rId12"/>
-    <p:sldId id="268" r:id="rId13"/>
+    <p:sldId id="269" r:id="rId5"/>
+    <p:sldId id="258" r:id="rId6"/>
+    <p:sldId id="260" r:id="rId7"/>
+    <p:sldId id="261" r:id="rId8"/>
+    <p:sldId id="259" r:id="rId9"/>
+    <p:sldId id="262" r:id="rId10"/>
+    <p:sldId id="263" r:id="rId11"/>
+    <p:sldId id="265" r:id="rId12"/>
+    <p:sldId id="266" r:id="rId13"/>
+    <p:sldId id="268" r:id="rId14"/>
   </p:sldIdLst>
   <p:sldSz cx="9144000" cy="6858000" type="screen4x3"/>
   <p:notesSz cx="6858000" cy="9144000"/>
@@ -118,6 +122,356 @@
 </p:presentation>
 </file>
 
+<file path=ppt/notesMasters/notesMaster1.xml><?xml version="1.0" encoding="utf-8"?>
+<p:notesMaster xmlns:a="http://schemas.openxmlformats.org/drawingml/2006/main" xmlns:r="http://schemas.openxmlformats.org/officeDocument/2006/relationships" xmlns:p="http://schemas.openxmlformats.org/presentationml/2006/main">
+  <p:cSld>
+    <p:bg>
+      <p:bgRef idx="1001">
+        <a:schemeClr val="bg1"/>
+      </p:bgRef>
+    </p:bg>
+    <p:spTree>
+      <p:nvGrpSpPr>
+        <p:cNvPr id="1" name=""/>
+        <p:cNvGrpSpPr/>
+        <p:nvPr/>
+      </p:nvGrpSpPr>
+      <p:grpSpPr>
+        <a:xfrm>
+          <a:off x="0" y="0"/>
+          <a:ext cx="0" cy="0"/>
+          <a:chOff x="0" y="0"/>
+          <a:chExt cx="0" cy="0"/>
+        </a:xfrm>
+      </p:grpSpPr>
+      <p:sp>
+        <p:nvSpPr>
+          <p:cNvPr id="2" name="Espace réservé de l'en-tête 1"/>
+          <p:cNvSpPr>
+            <a:spLocks noGrp="1"/>
+          </p:cNvSpPr>
+          <p:nvPr>
+            <p:ph type="hdr" sz="quarter"/>
+          </p:nvPr>
+        </p:nvSpPr>
+        <p:spPr>
+          <a:xfrm>
+            <a:off x="0" y="0"/>
+            <a:ext cx="2971800" cy="457200"/>
+          </a:xfrm>
+          <a:prstGeom prst="rect">
+            <a:avLst/>
+          </a:prstGeom>
+        </p:spPr>
+        <p:txBody>
+          <a:bodyPr vert="horz" lIns="91440" tIns="45720" rIns="91440" bIns="45720" rtlCol="0"/>
+          <a:lstStyle>
+            <a:lvl1pPr algn="l">
+              <a:defRPr sz="1200"/>
+            </a:lvl1pPr>
+          </a:lstStyle>
+          <a:p>
+            <a:endParaRPr lang="fr-FR"/>
+          </a:p>
+        </p:txBody>
+      </p:sp>
+      <p:sp>
+        <p:nvSpPr>
+          <p:cNvPr id="3" name="Espace réservé de la date 2"/>
+          <p:cNvSpPr>
+            <a:spLocks noGrp="1"/>
+          </p:cNvSpPr>
+          <p:nvPr>
+            <p:ph type="dt" idx="1"/>
+          </p:nvPr>
+        </p:nvSpPr>
+        <p:spPr>
+          <a:xfrm>
+            <a:off x="3884613" y="0"/>
+            <a:ext cx="2971800" cy="457200"/>
+          </a:xfrm>
+          <a:prstGeom prst="rect">
+            <a:avLst/>
+          </a:prstGeom>
+        </p:spPr>
+        <p:txBody>
+          <a:bodyPr vert="horz" lIns="91440" tIns="45720" rIns="91440" bIns="45720" rtlCol="0"/>
+          <a:lstStyle>
+            <a:lvl1pPr algn="r">
+              <a:defRPr sz="1200"/>
+            </a:lvl1pPr>
+          </a:lstStyle>
+          <a:p>
+            <a:fld id="{AB12468F-A5DA-400C-991C-AD9811B4F9D4}" type="datetimeFigureOut">
+              <a:rPr lang="fr-FR" smtClean="0"/>
+              <a:t>15/12/2017</a:t>
+            </a:fld>
+            <a:endParaRPr lang="fr-FR"/>
+          </a:p>
+        </p:txBody>
+      </p:sp>
+      <p:sp>
+        <p:nvSpPr>
+          <p:cNvPr id="4" name="Espace réservé de l'image des diapositives 3"/>
+          <p:cNvSpPr>
+            <a:spLocks noGrp="1" noRot="1" noChangeAspect="1"/>
+          </p:cNvSpPr>
+          <p:nvPr>
+            <p:ph type="sldImg" idx="2"/>
+          </p:nvPr>
+        </p:nvSpPr>
+        <p:spPr>
+          <a:xfrm>
+            <a:off x="1143000" y="685800"/>
+            <a:ext cx="4572000" cy="3429000"/>
+          </a:xfrm>
+          <a:prstGeom prst="rect">
+            <a:avLst/>
+          </a:prstGeom>
+          <a:noFill/>
+          <a:ln w="12700">
+            <a:solidFill>
+              <a:prstClr val="black"/>
+            </a:solidFill>
+          </a:ln>
+        </p:spPr>
+        <p:txBody>
+          <a:bodyPr vert="horz" lIns="91440" tIns="45720" rIns="91440" bIns="45720" rtlCol="0" anchor="ctr"/>
+          <a:lstStyle/>
+          <a:p>
+            <a:endParaRPr lang="fr-FR"/>
+          </a:p>
+        </p:txBody>
+      </p:sp>
+      <p:sp>
+        <p:nvSpPr>
+          <p:cNvPr id="5" name="Espace réservé des commentaires 4"/>
+          <p:cNvSpPr>
+            <a:spLocks noGrp="1"/>
+          </p:cNvSpPr>
+          <p:nvPr>
+            <p:ph type="body" sz="quarter" idx="3"/>
+          </p:nvPr>
+        </p:nvSpPr>
+        <p:spPr>
+          <a:xfrm>
+            <a:off x="685800" y="4343400"/>
+            <a:ext cx="5486400" cy="4114800"/>
+          </a:xfrm>
+          <a:prstGeom prst="rect">
+            <a:avLst/>
+          </a:prstGeom>
+        </p:spPr>
+        <p:txBody>
+          <a:bodyPr vert="horz" lIns="91440" tIns="45720" rIns="91440" bIns="45720" rtlCol="0"/>
+          <a:lstStyle/>
+          <a:p>
+            <a:pPr lvl="0"/>
+            <a:r>
+              <a:rPr lang="fr-FR" smtClean="0"/>
+              <a:t>Modifiez les styles du texte du masque</a:t>
+            </a:r>
+          </a:p>
+          <a:p>
+            <a:pPr lvl="1"/>
+            <a:r>
+              <a:rPr lang="fr-FR" smtClean="0"/>
+              <a:t>Deuxième niveau</a:t>
+            </a:r>
+          </a:p>
+          <a:p>
+            <a:pPr lvl="2"/>
+            <a:r>
+              <a:rPr lang="fr-FR" smtClean="0"/>
+              <a:t>Troisième niveau</a:t>
+            </a:r>
+          </a:p>
+          <a:p>
+            <a:pPr lvl="3"/>
+            <a:r>
+              <a:rPr lang="fr-FR" smtClean="0"/>
+              <a:t>Quatrième niveau</a:t>
+            </a:r>
+          </a:p>
+          <a:p>
+            <a:pPr lvl="4"/>
+            <a:r>
+              <a:rPr lang="fr-FR" smtClean="0"/>
+              <a:t>Cinquième niveau</a:t>
+            </a:r>
+            <a:endParaRPr lang="fr-FR"/>
+          </a:p>
+        </p:txBody>
+      </p:sp>
+      <p:sp>
+        <p:nvSpPr>
+          <p:cNvPr id="6" name="Espace réservé du pied de page 5"/>
+          <p:cNvSpPr>
+            <a:spLocks noGrp="1"/>
+          </p:cNvSpPr>
+          <p:nvPr>
+            <p:ph type="ftr" sz="quarter" idx="4"/>
+          </p:nvPr>
+        </p:nvSpPr>
+        <p:spPr>
+          <a:xfrm>
+            <a:off x="0" y="8685213"/>
+            <a:ext cx="2971800" cy="457200"/>
+          </a:xfrm>
+          <a:prstGeom prst="rect">
+            <a:avLst/>
+          </a:prstGeom>
+        </p:spPr>
+        <p:txBody>
+          <a:bodyPr vert="horz" lIns="91440" tIns="45720" rIns="91440" bIns="45720" rtlCol="0" anchor="b"/>
+          <a:lstStyle>
+            <a:lvl1pPr algn="l">
+              <a:defRPr sz="1200"/>
+            </a:lvl1pPr>
+          </a:lstStyle>
+          <a:p>
+            <a:endParaRPr lang="fr-FR"/>
+          </a:p>
+        </p:txBody>
+      </p:sp>
+      <p:sp>
+        <p:nvSpPr>
+          <p:cNvPr id="7" name="Espace réservé du numéro de diapositive 6"/>
+          <p:cNvSpPr>
+            <a:spLocks noGrp="1"/>
+          </p:cNvSpPr>
+          <p:nvPr>
+            <p:ph type="sldNum" sz="quarter" idx="5"/>
+          </p:nvPr>
+        </p:nvSpPr>
+        <p:spPr>
+          <a:xfrm>
+            <a:off x="3884613" y="8685213"/>
+            <a:ext cx="2971800" cy="457200"/>
+          </a:xfrm>
+          <a:prstGeom prst="rect">
+            <a:avLst/>
+          </a:prstGeom>
+        </p:spPr>
+        <p:txBody>
+          <a:bodyPr vert="horz" lIns="91440" tIns="45720" rIns="91440" bIns="45720" rtlCol="0" anchor="b"/>
+          <a:lstStyle>
+            <a:lvl1pPr algn="r">
+              <a:defRPr sz="1200"/>
+            </a:lvl1pPr>
+          </a:lstStyle>
+          <a:p>
+            <a:fld id="{34FD9D5A-21CA-4802-8696-C4EAA3839922}" type="slidenum">
+              <a:rPr lang="fr-FR" smtClean="0"/>
+              <a:t>‹N°›</a:t>
+            </a:fld>
+            <a:endParaRPr lang="fr-FR"/>
+          </a:p>
+        </p:txBody>
+      </p:sp>
+    </p:spTree>
+    <p:extLst>
+      <p:ext uri="{BB962C8B-B14F-4D97-AF65-F5344CB8AC3E}">
+        <p14:creationId xmlns:p14="http://schemas.microsoft.com/office/powerpoint/2010/main" val="3761103573"/>
+      </p:ext>
+    </p:extLst>
+  </p:cSld>
+  <p:clrMap bg1="lt1" tx1="dk1" bg2="lt2" tx2="dk2" accent1="accent1" accent2="accent2" accent3="accent3" accent4="accent4" accent5="accent5" accent6="accent6" hlink="hlink" folHlink="folHlink"/>
+  <p:notesStyle>
+    <a:lvl1pPr marL="0" algn="l" defTabSz="914400" rtl="0" eaLnBrk="1" latinLnBrk="0" hangingPunct="1">
+      <a:defRPr sz="1200" kern="1200">
+        <a:solidFill>
+          <a:schemeClr val="tx1"/>
+        </a:solidFill>
+        <a:latin typeface="+mn-lt"/>
+        <a:ea typeface="+mn-ea"/>
+        <a:cs typeface="+mn-cs"/>
+      </a:defRPr>
+    </a:lvl1pPr>
+    <a:lvl2pPr marL="457200" algn="l" defTabSz="914400" rtl="0" eaLnBrk="1" latinLnBrk="0" hangingPunct="1">
+      <a:defRPr sz="1200" kern="1200">
+        <a:solidFill>
+          <a:schemeClr val="tx1"/>
+        </a:solidFill>
+        <a:latin typeface="+mn-lt"/>
+        <a:ea typeface="+mn-ea"/>
+        <a:cs typeface="+mn-cs"/>
+      </a:defRPr>
+    </a:lvl2pPr>
+    <a:lvl3pPr marL="914400" algn="l" defTabSz="914400" rtl="0" eaLnBrk="1" latinLnBrk="0" hangingPunct="1">
+      <a:defRPr sz="1200" kern="1200">
+        <a:solidFill>
+          <a:schemeClr val="tx1"/>
+        </a:solidFill>
+        <a:latin typeface="+mn-lt"/>
+        <a:ea typeface="+mn-ea"/>
+        <a:cs typeface="+mn-cs"/>
+      </a:defRPr>
+    </a:lvl3pPr>
+    <a:lvl4pPr marL="1371600" algn="l" defTabSz="914400" rtl="0" eaLnBrk="1" latinLnBrk="0" hangingPunct="1">
+      <a:defRPr sz="1200" kern="1200">
+        <a:solidFill>
+          <a:schemeClr val="tx1"/>
+        </a:solidFill>
+        <a:latin typeface="+mn-lt"/>
+        <a:ea typeface="+mn-ea"/>
+        <a:cs typeface="+mn-cs"/>
+      </a:defRPr>
+    </a:lvl4pPr>
+    <a:lvl5pPr marL="1828800" algn="l" defTabSz="914400" rtl="0" eaLnBrk="1" latinLnBrk="0" hangingPunct="1">
+      <a:defRPr sz="1200" kern="1200">
+        <a:solidFill>
+          <a:schemeClr val="tx1"/>
+        </a:solidFill>
+        <a:latin typeface="+mn-lt"/>
+        <a:ea typeface="+mn-ea"/>
+        <a:cs typeface="+mn-cs"/>
+      </a:defRPr>
+    </a:lvl5pPr>
+    <a:lvl6pPr marL="2286000" algn="l" defTabSz="914400" rtl="0" eaLnBrk="1" latinLnBrk="0" hangingPunct="1">
+      <a:defRPr sz="1200" kern="1200">
+        <a:solidFill>
+          <a:schemeClr val="tx1"/>
+        </a:solidFill>
+        <a:latin typeface="+mn-lt"/>
+        <a:ea typeface="+mn-ea"/>
+        <a:cs typeface="+mn-cs"/>
+      </a:defRPr>
+    </a:lvl6pPr>
+    <a:lvl7pPr marL="2743200" algn="l" defTabSz="914400" rtl="0" eaLnBrk="1" latinLnBrk="0" hangingPunct="1">
+      <a:defRPr sz="1200" kern="1200">
+        <a:solidFill>
+          <a:schemeClr val="tx1"/>
+        </a:solidFill>
+        <a:latin typeface="+mn-lt"/>
+        <a:ea typeface="+mn-ea"/>
+        <a:cs typeface="+mn-cs"/>
+      </a:defRPr>
+    </a:lvl7pPr>
+    <a:lvl8pPr marL="3200400" algn="l" defTabSz="914400" rtl="0" eaLnBrk="1" latinLnBrk="0" hangingPunct="1">
+      <a:defRPr sz="1200" kern="1200">
+        <a:solidFill>
+          <a:schemeClr val="tx1"/>
+        </a:solidFill>
+        <a:latin typeface="+mn-lt"/>
+        <a:ea typeface="+mn-ea"/>
+        <a:cs typeface="+mn-cs"/>
+      </a:defRPr>
+    </a:lvl8pPr>
+    <a:lvl9pPr marL="3657600" algn="l" defTabSz="914400" rtl="0" eaLnBrk="1" latinLnBrk="0" hangingPunct="1">
+      <a:defRPr sz="1200" kern="1200">
+        <a:solidFill>
+          <a:schemeClr val="tx1"/>
+        </a:solidFill>
+        <a:latin typeface="+mn-lt"/>
+        <a:ea typeface="+mn-ea"/>
+        <a:cs typeface="+mn-cs"/>
+      </a:defRPr>
+    </a:lvl9pPr>
+  </p:notesStyle>
+</p:notesMaster>
+</file>
+
 <file path=ppt/slideLayouts/slideLayout1.xml><?xml version="1.0" encoding="utf-8"?>
 <p:sldLayout xmlns:a="http://schemas.openxmlformats.org/drawingml/2006/main" xmlns:r="http://schemas.openxmlformats.org/officeDocument/2006/relationships" xmlns:p="http://schemas.openxmlformats.org/presentationml/2006/main" type="title" preserve="1">
   <p:cSld name="Diapositive de titre">
@@ -297,7 +651,7 @@
           <a:bodyPr/>
           <a:lstStyle/>
           <a:p>
-            <a:fld id="{6C44BA15-617B-471D-9C24-3379A5298874}" type="datetimeFigureOut">
+            <a:fld id="{CCA50400-36D4-4F83-9BBA-CF56EAE6DADE}" type="datetime1">
               <a:rPr lang="fr-FR" smtClean="0"/>
               <a:t>15/12/2017</a:t>
             </a:fld>
@@ -467,7 +821,7 @@
           <a:bodyPr/>
           <a:lstStyle/>
           <a:p>
-            <a:fld id="{6C44BA15-617B-471D-9C24-3379A5298874}" type="datetimeFigureOut">
+            <a:fld id="{F472EDD6-7A26-4A0F-AF4A-B0A1F8C0E941}" type="datetime1">
               <a:rPr lang="fr-FR" smtClean="0"/>
               <a:t>15/12/2017</a:t>
             </a:fld>
@@ -647,7 +1001,7 @@
           <a:bodyPr/>
           <a:lstStyle/>
           <a:p>
-            <a:fld id="{6C44BA15-617B-471D-9C24-3379A5298874}" type="datetimeFigureOut">
+            <a:fld id="{7BE79696-DE3A-4842-B75D-F1103FC536BC}" type="datetime1">
               <a:rPr lang="fr-FR" smtClean="0"/>
               <a:t>15/12/2017</a:t>
             </a:fld>
@@ -817,7 +1171,7 @@
           <a:bodyPr/>
           <a:lstStyle/>
           <a:p>
-            <a:fld id="{6C44BA15-617B-471D-9C24-3379A5298874}" type="datetimeFigureOut">
+            <a:fld id="{C39DB157-0410-4ACC-9C5E-CEBE5C3E3921}" type="datetime1">
               <a:rPr lang="fr-FR" smtClean="0"/>
               <a:t>15/12/2017</a:t>
             </a:fld>
@@ -1063,7 +1417,7 @@
           <a:bodyPr/>
           <a:lstStyle/>
           <a:p>
-            <a:fld id="{6C44BA15-617B-471D-9C24-3379A5298874}" type="datetimeFigureOut">
+            <a:fld id="{1232B527-99F4-4D93-A98F-F3F388B8EF95}" type="datetime1">
               <a:rPr lang="fr-FR" smtClean="0"/>
               <a:t>15/12/2017</a:t>
             </a:fld>
@@ -1351,7 +1705,7 @@
           <a:bodyPr/>
           <a:lstStyle/>
           <a:p>
-            <a:fld id="{6C44BA15-617B-471D-9C24-3379A5298874}" type="datetimeFigureOut">
+            <a:fld id="{DB4AB7DD-1C63-4F8C-9087-2FF5B212B72C}" type="datetime1">
               <a:rPr lang="fr-FR" smtClean="0"/>
               <a:t>15/12/2017</a:t>
             </a:fld>
@@ -1773,7 +2127,7 @@
           <a:bodyPr/>
           <a:lstStyle/>
           <a:p>
-            <a:fld id="{6C44BA15-617B-471D-9C24-3379A5298874}" type="datetimeFigureOut">
+            <a:fld id="{5AFFE8C1-8C7F-4341-B301-64523B8EAFEE}" type="datetime1">
               <a:rPr lang="fr-FR" smtClean="0"/>
               <a:t>15/12/2017</a:t>
             </a:fld>
@@ -1891,7 +2245,7 @@
           <a:bodyPr/>
           <a:lstStyle/>
           <a:p>
-            <a:fld id="{6C44BA15-617B-471D-9C24-3379A5298874}" type="datetimeFigureOut">
+            <a:fld id="{1132373A-D583-444A-A6D7-E67B2FDA2222}" type="datetime1">
               <a:rPr lang="fr-FR" smtClean="0"/>
               <a:t>15/12/2017</a:t>
             </a:fld>
@@ -1986,7 +2340,7 @@
           <a:bodyPr/>
           <a:lstStyle/>
           <a:p>
-            <a:fld id="{6C44BA15-617B-471D-9C24-3379A5298874}" type="datetimeFigureOut">
+            <a:fld id="{0F6A986F-B75E-47C7-B647-89E37CF8CB10}" type="datetime1">
               <a:rPr lang="fr-FR" smtClean="0"/>
               <a:t>15/12/2017</a:t>
             </a:fld>
@@ -2263,7 +2617,7 @@
           <a:bodyPr/>
           <a:lstStyle/>
           <a:p>
-            <a:fld id="{6C44BA15-617B-471D-9C24-3379A5298874}" type="datetimeFigureOut">
+            <a:fld id="{FEE3C235-02D7-4799-BA0C-1D259E4CB2A9}" type="datetime1">
               <a:rPr lang="fr-FR" smtClean="0"/>
               <a:t>15/12/2017</a:t>
             </a:fld>
@@ -2516,7 +2870,7 @@
           <a:bodyPr/>
           <a:lstStyle/>
           <a:p>
-            <a:fld id="{6C44BA15-617B-471D-9C24-3379A5298874}" type="datetimeFigureOut">
+            <a:fld id="{368D7DB7-CE0D-411D-9505-A5714BF5AE15}" type="datetime1">
               <a:rPr lang="fr-FR" smtClean="0"/>
               <a:t>15/12/2017</a:t>
             </a:fld>
@@ -2729,7 +3083,7 @@
             </a:lvl1pPr>
           </a:lstStyle>
           <a:p>
-            <a:fld id="{6C44BA15-617B-471D-9C24-3379A5298874}" type="datetimeFigureOut">
+            <a:fld id="{2619214C-069E-4712-9793-CD2AC39332E6}" type="datetime1">
               <a:rPr lang="fr-FR" smtClean="0"/>
               <a:t>15/12/2017</a:t>
             </a:fld>
@@ -2836,6 +3190,7 @@
     <p:sldLayoutId id="2147483658" r:id="rId10"/>
     <p:sldLayoutId id="2147483659" r:id="rId11"/>
   </p:sldLayoutIdLst>
+  <p:hf hdr="0" ftr="0" dt="0"/>
   <p:txStyles>
     <p:titleStyle>
       <a:lvl1pPr algn="ctr" defTabSz="914400" rtl="0" eaLnBrk="1" latinLnBrk="0" hangingPunct="1">
@@ -3155,6 +3510,29 @@
           </a:p>
         </p:txBody>
       </p:sp>
+      <p:sp>
+        <p:nvSpPr>
+          <p:cNvPr id="4" name="Espace réservé du numéro de diapositive 3"/>
+          <p:cNvSpPr>
+            <a:spLocks noGrp="1"/>
+          </p:cNvSpPr>
+          <p:nvPr>
+            <p:ph type="sldNum" sz="quarter" idx="12"/>
+          </p:nvPr>
+        </p:nvSpPr>
+        <p:spPr/>
+        <p:txBody>
+          <a:bodyPr/>
+          <a:lstStyle/>
+          <a:p>
+            <a:fld id="{6C2979F8-DCA1-40EA-8D91-2EE9239FA742}" type="slidenum">
+              <a:rPr lang="fr-FR" smtClean="0"/>
+              <a:t>1</a:t>
+            </a:fld>
+            <a:endParaRPr lang="fr-FR"/>
+          </a:p>
+        </p:txBody>
+      </p:sp>
     </p:spTree>
     <p:extLst>
       <p:ext uri="{BB962C8B-B14F-4D97-AF65-F5344CB8AC3E}">
@@ -3169,6 +3547,285 @@
 </file>
 
 <file path=ppt/slides/slide10.xml><?xml version="1.0" encoding="utf-8"?>
+<p:sld xmlns:a="http://schemas.openxmlformats.org/drawingml/2006/main" xmlns:r="http://schemas.openxmlformats.org/officeDocument/2006/relationships" xmlns:p="http://schemas.openxmlformats.org/presentationml/2006/main">
+  <p:cSld>
+    <p:spTree>
+      <p:nvGrpSpPr>
+        <p:cNvPr id="1" name=""/>
+        <p:cNvGrpSpPr/>
+        <p:nvPr/>
+      </p:nvGrpSpPr>
+      <p:grpSpPr>
+        <a:xfrm>
+          <a:off x="0" y="0"/>
+          <a:ext cx="0" cy="0"/>
+          <a:chOff x="0" y="0"/>
+          <a:chExt cx="0" cy="0"/>
+        </a:xfrm>
+      </p:grpSpPr>
+      <p:sp>
+        <p:nvSpPr>
+          <p:cNvPr id="2" name="Titre 1"/>
+          <p:cNvSpPr>
+            <a:spLocks noGrp="1"/>
+          </p:cNvSpPr>
+          <p:nvPr>
+            <p:ph type="title"/>
+          </p:nvPr>
+        </p:nvSpPr>
+        <p:spPr/>
+        <p:txBody>
+          <a:bodyPr>
+            <a:normAutofit fontScale="90000"/>
+          </a:bodyPr>
+          <a:lstStyle/>
+          <a:p>
+            <a:r>
+              <a:rPr lang="fr-FR" dirty="0" smtClean="0"/>
+              <a:t>Élasticité prix conso ZE à une appréciation UK</a:t>
+            </a:r>
+            <a:endParaRPr lang="fr-FR" dirty="0"/>
+          </a:p>
+        </p:txBody>
+      </p:sp>
+      <p:graphicFrame>
+        <p:nvGraphicFramePr>
+          <p:cNvPr id="4" name="Espace réservé du contenu 3"/>
+          <p:cNvGraphicFramePr>
+            <a:graphicFrameLocks noGrp="1"/>
+          </p:cNvGraphicFramePr>
+          <p:nvPr>
+            <p:ph idx="1"/>
+            <p:extLst>
+              <p:ext uri="{D42A27DB-BD31-4B8C-83A1-F6EECF244321}">
+                <p14:modId xmlns:p14="http://schemas.microsoft.com/office/powerpoint/2010/main" val="1121728573"/>
+              </p:ext>
+            </p:extLst>
+          </p:nvPr>
+        </p:nvGraphicFramePr>
+        <p:xfrm>
+          <a:off x="457200" y="1600200"/>
+          <a:ext cx="8229600" cy="370840"/>
+        </p:xfrm>
+        <a:graphic>
+          <a:graphicData uri="http://schemas.openxmlformats.org/drawingml/2006/table">
+            <a:tbl>
+              <a:tblPr firstRow="1" bandRow="1">
+                <a:tableStyleId>{5C22544A-7EE6-4342-B048-85BDC9FD1C3A}</a:tableStyleId>
+              </a:tblPr>
+              <a:tblGrid>
+                <a:gridCol w="4114800"/>
+                <a:gridCol w="4114800"/>
+              </a:tblGrid>
+              <a:tr h="370840">
+                <a:tc>
+                  <a:txBody>
+                    <a:bodyPr/>
+                    <a:lstStyle/>
+                    <a:p>
+                      <a:pPr algn="ctr"/>
+                      <a:r>
+                        <a:rPr lang="fr-FR" dirty="0" smtClean="0"/>
+                        <a:t>WIOD</a:t>
+                      </a:r>
+                      <a:endParaRPr lang="fr-FR" dirty="0"/>
+                    </a:p>
+                  </a:txBody>
+                  <a:tcPr/>
+                </a:tc>
+                <a:tc>
+                  <a:txBody>
+                    <a:bodyPr/>
+                    <a:lstStyle/>
+                    <a:p>
+                      <a:pPr algn="ctr"/>
+                      <a:r>
+                        <a:rPr lang="fr-FR" dirty="0" smtClean="0"/>
+                        <a:t>TIVA</a:t>
+                      </a:r>
+                      <a:endParaRPr lang="fr-FR" dirty="0"/>
+                    </a:p>
+                  </a:txBody>
+                  <a:tcPr/>
+                </a:tc>
+              </a:tr>
+            </a:tbl>
+          </a:graphicData>
+        </a:graphic>
+      </p:graphicFrame>
+      <p:pic>
+        <p:nvPicPr>
+          <p:cNvPr id="4098" name="Picture 2" descr="V:\DiagConj\Commun\CommerceVA\Results\Devaluations\HC_WIOD_Graph_4tempb.png"/>
+          <p:cNvPicPr>
+            <a:picLocks noChangeAspect="1" noChangeArrowheads="1"/>
+          </p:cNvPicPr>
+          <p:nvPr/>
+        </p:nvPicPr>
+        <p:blipFill>
+          <a:blip r:embed="rId2">
+            <a:extLst>
+              <a:ext uri="{28A0092B-C50C-407E-A947-70E740481C1C}">
+                <a14:useLocalDpi xmlns:a14="http://schemas.microsoft.com/office/drawing/2010/main" val="0"/>
+              </a:ext>
+            </a:extLst>
+          </a:blip>
+          <a:srcRect/>
+          <a:stretch>
+            <a:fillRect/>
+          </a:stretch>
+        </p:blipFill>
+        <p:spPr bwMode="auto">
+          <a:xfrm>
+            <a:off x="31794" y="1916832"/>
+            <a:ext cx="4552950" cy="3305175"/>
+          </a:xfrm>
+          <a:prstGeom prst="rect">
+            <a:avLst/>
+          </a:prstGeom>
+          <a:noFill/>
+          <a:extLst>
+            <a:ext uri="{909E8E84-426E-40DD-AFC4-6F175D3DCCD1}">
+              <a14:hiddenFill xmlns:a14="http://schemas.microsoft.com/office/drawing/2010/main">
+                <a:solidFill>
+                  <a:srgbClr val="FFFFFF"/>
+                </a:solidFill>
+              </a14:hiddenFill>
+            </a:ext>
+          </a:extLst>
+        </p:spPr>
+      </p:pic>
+      <p:pic>
+        <p:nvPicPr>
+          <p:cNvPr id="4099" name="Picture 3" descr="V:\DiagConj\Commun\CommerceVA\Results\Devaluations\HC_TIVA_Graph_4tempb.png"/>
+          <p:cNvPicPr>
+            <a:picLocks noChangeAspect="1" noChangeArrowheads="1"/>
+          </p:cNvPicPr>
+          <p:nvPr/>
+        </p:nvPicPr>
+        <p:blipFill>
+          <a:blip r:embed="rId3">
+            <a:extLst>
+              <a:ext uri="{28A0092B-C50C-407E-A947-70E740481C1C}">
+                <a14:useLocalDpi xmlns:a14="http://schemas.microsoft.com/office/drawing/2010/main" val="0"/>
+              </a:ext>
+            </a:extLst>
+          </a:blip>
+          <a:srcRect/>
+          <a:stretch>
+            <a:fillRect/>
+          </a:stretch>
+        </p:blipFill>
+        <p:spPr bwMode="auto">
+          <a:xfrm>
+            <a:off x="4627247" y="1916832"/>
+            <a:ext cx="4552950" cy="3305175"/>
+          </a:xfrm>
+          <a:prstGeom prst="rect">
+            <a:avLst/>
+          </a:prstGeom>
+          <a:noFill/>
+          <a:extLst>
+            <a:ext uri="{909E8E84-426E-40DD-AFC4-6F175D3DCCD1}">
+              <a14:hiddenFill xmlns:a14="http://schemas.microsoft.com/office/drawing/2010/main">
+                <a:solidFill>
+                  <a:srgbClr val="FFFFFF"/>
+                </a:solidFill>
+              </a14:hiddenFill>
+            </a:ext>
+          </a:extLst>
+        </p:spPr>
+      </p:pic>
+      <p:sp>
+        <p:nvSpPr>
+          <p:cNvPr id="8" name="ZoneTexte 7"/>
+          <p:cNvSpPr txBox="1"/>
+          <p:nvPr/>
+        </p:nvSpPr>
+        <p:spPr>
+          <a:xfrm>
+            <a:off x="395536" y="5589240"/>
+            <a:ext cx="8424936" cy="923330"/>
+          </a:xfrm>
+          <a:prstGeom prst="rect">
+            <a:avLst/>
+          </a:prstGeom>
+          <a:noFill/>
+        </p:spPr>
+        <p:txBody>
+          <a:bodyPr wrap="square" rtlCol="0">
+            <a:spAutoFit/>
+          </a:bodyPr>
+          <a:lstStyle/>
+          <a:p>
+            <a:pPr marL="285750" indent="-285750">
+              <a:buFont typeface="Arial" panose="020B0604020202020204" pitchFamily="34" charset="0"/>
+              <a:buChar char="•"/>
+            </a:pPr>
+            <a:r>
+              <a:rPr lang="fr-FR" dirty="0" smtClean="0"/>
+              <a:t>Pays les plus exposés: Irlande, Malte, Chypre, Luxembourg</a:t>
+            </a:r>
+          </a:p>
+          <a:p>
+            <a:pPr marL="285750" indent="-285750">
+              <a:buFont typeface="Arial" panose="020B0604020202020204" pitchFamily="34" charset="0"/>
+              <a:buChar char="•"/>
+            </a:pPr>
+            <a:r>
+              <a:rPr lang="fr-FR" dirty="0" smtClean="0"/>
+              <a:t>Augmentation de l’exposition dans le temps avec WIOD</a:t>
+            </a:r>
+          </a:p>
+          <a:p>
+            <a:pPr marL="285750" indent="-285750">
+              <a:buFont typeface="Arial" panose="020B0604020202020204" pitchFamily="34" charset="0"/>
+              <a:buChar char="•"/>
+            </a:pPr>
+            <a:r>
+              <a:rPr lang="fr-FR" dirty="0" smtClean="0"/>
+              <a:t>Effet plus faible avec TIVA, hormis pour l’Irlande</a:t>
+            </a:r>
+            <a:endParaRPr lang="fr-FR" dirty="0"/>
+          </a:p>
+        </p:txBody>
+      </p:sp>
+      <p:sp>
+        <p:nvSpPr>
+          <p:cNvPr id="3" name="Espace réservé du numéro de diapositive 2"/>
+          <p:cNvSpPr>
+            <a:spLocks noGrp="1"/>
+          </p:cNvSpPr>
+          <p:nvPr>
+            <p:ph type="sldNum" sz="quarter" idx="12"/>
+          </p:nvPr>
+        </p:nvSpPr>
+        <p:spPr/>
+        <p:txBody>
+          <a:bodyPr/>
+          <a:lstStyle/>
+          <a:p>
+            <a:fld id="{6C2979F8-DCA1-40EA-8D91-2EE9239FA742}" type="slidenum">
+              <a:rPr lang="fr-FR" smtClean="0"/>
+              <a:t>10</a:t>
+            </a:fld>
+            <a:endParaRPr lang="fr-FR"/>
+          </a:p>
+        </p:txBody>
+      </p:sp>
+    </p:spTree>
+    <p:extLst>
+      <p:ext uri="{BB962C8B-B14F-4D97-AF65-F5344CB8AC3E}">
+        <p14:creationId xmlns:p14="http://schemas.microsoft.com/office/powerpoint/2010/main" val="4245209825"/>
+      </p:ext>
+    </p:extLst>
+  </p:cSld>
+  <p:clrMapOvr>
+    <a:masterClrMapping/>
+  </p:clrMapOvr>
+</p:sld>
+</file>
+
+<file path=ppt/slides/slide11.xml><?xml version="1.0" encoding="utf-8"?>
 <p:sld xmlns:a="http://schemas.openxmlformats.org/drawingml/2006/main" xmlns:r="http://schemas.openxmlformats.org/officeDocument/2006/relationships" xmlns:p="http://schemas.openxmlformats.org/presentationml/2006/main">
   <p:cSld>
     <p:spTree>
@@ -3387,6 +4044,29 @@
           </a:p>
         </p:txBody>
       </p:sp>
+      <p:sp>
+        <p:nvSpPr>
+          <p:cNvPr id="5" name="Espace réservé du numéro de diapositive 4"/>
+          <p:cNvSpPr>
+            <a:spLocks noGrp="1"/>
+          </p:cNvSpPr>
+          <p:nvPr>
+            <p:ph type="sldNum" sz="quarter" idx="12"/>
+          </p:nvPr>
+        </p:nvSpPr>
+        <p:spPr/>
+        <p:txBody>
+          <a:bodyPr/>
+          <a:lstStyle/>
+          <a:p>
+            <a:fld id="{6C2979F8-DCA1-40EA-8D91-2EE9239FA742}" type="slidenum">
+              <a:rPr lang="fr-FR" smtClean="0"/>
+              <a:t>11</a:t>
+            </a:fld>
+            <a:endParaRPr lang="fr-FR"/>
+          </a:p>
+        </p:txBody>
+      </p:sp>
     </p:spTree>
     <p:extLst>
       <p:ext uri="{BB962C8B-B14F-4D97-AF65-F5344CB8AC3E}">
@@ -3400,7 +4080,7 @@
 </p:sld>
 </file>
 
-<file path=ppt/slides/slide11.xml><?xml version="1.0" encoding="utf-8"?>
+<file path=ppt/slides/slide12.xml><?xml version="1.0" encoding="utf-8"?>
 <p:sld xmlns:a="http://schemas.openxmlformats.org/drawingml/2006/main" xmlns:r="http://schemas.openxmlformats.org/officeDocument/2006/relationships" xmlns:p="http://schemas.openxmlformats.org/presentationml/2006/main">
   <p:cSld>
     <p:spTree>
@@ -3589,6 +4269,29 @@
           </a:extLst>
         </p:spPr>
       </p:pic>
+      <p:sp>
+        <p:nvSpPr>
+          <p:cNvPr id="3" name="Espace réservé du numéro de diapositive 2"/>
+          <p:cNvSpPr>
+            <a:spLocks noGrp="1"/>
+          </p:cNvSpPr>
+          <p:nvPr>
+            <p:ph type="sldNum" sz="quarter" idx="12"/>
+          </p:nvPr>
+        </p:nvSpPr>
+        <p:spPr/>
+        <p:txBody>
+          <a:bodyPr/>
+          <a:lstStyle/>
+          <a:p>
+            <a:fld id="{6C2979F8-DCA1-40EA-8D91-2EE9239FA742}" type="slidenum">
+              <a:rPr lang="fr-FR" smtClean="0"/>
+              <a:t>12</a:t>
+            </a:fld>
+            <a:endParaRPr lang="fr-FR"/>
+          </a:p>
+        </p:txBody>
+      </p:sp>
     </p:spTree>
     <p:extLst>
       <p:ext uri="{BB962C8B-B14F-4D97-AF65-F5344CB8AC3E}">
@@ -3602,7 +4305,7 @@
 </p:sld>
 </file>
 
-<file path=ppt/slides/slide12.xml><?xml version="1.0" encoding="utf-8"?>
+<file path=ppt/slides/slide13.xml><?xml version="1.0" encoding="utf-8"?>
 <p:sld xmlns:a="http://schemas.openxmlformats.org/drawingml/2006/main" xmlns:r="http://schemas.openxmlformats.org/officeDocument/2006/relationships" xmlns:p="http://schemas.openxmlformats.org/presentationml/2006/main">
   <p:cSld>
     <p:spTree>
@@ -3674,6 +4377,29 @@
               <a:t>Impact d’un choc sur le prix du pétrole sur les déflateurs</a:t>
             </a:r>
             <a:endParaRPr lang="fr-FR" dirty="0"/>
+          </a:p>
+        </p:txBody>
+      </p:sp>
+      <p:sp>
+        <p:nvSpPr>
+          <p:cNvPr id="4" name="Espace réservé du numéro de diapositive 3"/>
+          <p:cNvSpPr>
+            <a:spLocks noGrp="1"/>
+          </p:cNvSpPr>
+          <p:nvPr>
+            <p:ph type="sldNum" sz="quarter" idx="12"/>
+          </p:nvPr>
+        </p:nvSpPr>
+        <p:spPr/>
+        <p:txBody>
+          <a:bodyPr/>
+          <a:lstStyle/>
+          <a:p>
+            <a:fld id="{6C2979F8-DCA1-40EA-8D91-2EE9239FA742}" type="slidenum">
+              <a:rPr lang="fr-FR" smtClean="0"/>
+              <a:t>13</a:t>
+            </a:fld>
+            <a:endParaRPr lang="fr-FR"/>
           </a:p>
         </p:txBody>
       </p:sp>
@@ -3787,6 +4513,29 @@
           </a:p>
         </p:txBody>
       </p:sp>
+      <p:sp>
+        <p:nvSpPr>
+          <p:cNvPr id="4" name="Espace réservé du numéro de diapositive 3"/>
+          <p:cNvSpPr>
+            <a:spLocks noGrp="1"/>
+          </p:cNvSpPr>
+          <p:nvPr>
+            <p:ph type="sldNum" sz="quarter" idx="12"/>
+          </p:nvPr>
+        </p:nvSpPr>
+        <p:spPr/>
+        <p:txBody>
+          <a:bodyPr/>
+          <a:lstStyle/>
+          <a:p>
+            <a:fld id="{6C2979F8-DCA1-40EA-8D91-2EE9239FA742}" type="slidenum">
+              <a:rPr lang="fr-FR" smtClean="0"/>
+              <a:t>2</a:t>
+            </a:fld>
+            <a:endParaRPr lang="fr-FR"/>
+          </a:p>
+        </p:txBody>
+      </p:sp>
     </p:spTree>
     <p:extLst>
       <p:ext uri="{BB962C8B-B14F-4D97-AF65-F5344CB8AC3E}">
@@ -3850,7 +4599,7 @@
             <p:ph idx="1"/>
             <p:extLst>
               <p:ext uri="{D42A27DB-BD31-4B8C-83A1-F6EECF244321}">
-                <p14:modId xmlns:p14="http://schemas.microsoft.com/office/powerpoint/2010/main" val="1084451561"/>
+                <p14:modId xmlns:p14="http://schemas.microsoft.com/office/powerpoint/2010/main" val="203755948"/>
               </p:ext>
             </p:extLst>
           </p:nvPr>
@@ -3990,7 +4739,7 @@
                     <a:p>
                       <a:r>
                         <a:rPr lang="fr-FR" dirty="0" smtClean="0"/>
-                        <a:t>64</a:t>
+                        <a:t>64 </a:t>
                       </a:r>
                       <a:endParaRPr lang="fr-FR" dirty="0"/>
                     </a:p>
@@ -4211,6 +4960,29 @@
           </a:graphicData>
         </a:graphic>
       </p:graphicFrame>
+      <p:sp>
+        <p:nvSpPr>
+          <p:cNvPr id="3" name="Espace réservé du numéro de diapositive 2"/>
+          <p:cNvSpPr>
+            <a:spLocks noGrp="1"/>
+          </p:cNvSpPr>
+          <p:nvPr>
+            <p:ph type="sldNum" sz="quarter" idx="12"/>
+          </p:nvPr>
+        </p:nvSpPr>
+        <p:spPr/>
+        <p:txBody>
+          <a:bodyPr/>
+          <a:lstStyle/>
+          <a:p>
+            <a:fld id="{6C2979F8-DCA1-40EA-8D91-2EE9239FA742}" type="slidenum">
+              <a:rPr lang="fr-FR" smtClean="0"/>
+              <a:t>3</a:t>
+            </a:fld>
+            <a:endParaRPr lang="fr-FR"/>
+          </a:p>
+        </p:txBody>
+      </p:sp>
     </p:spTree>
     <p:extLst>
       <p:ext uri="{BB962C8B-B14F-4D97-AF65-F5344CB8AC3E}">
@@ -4225,6 +4997,145 @@
 </file>
 
 <file path=ppt/slides/slide4.xml><?xml version="1.0" encoding="utf-8"?>
+<p:sld xmlns:a="http://schemas.openxmlformats.org/drawingml/2006/main" xmlns:r="http://schemas.openxmlformats.org/officeDocument/2006/relationships" xmlns:p="http://schemas.openxmlformats.org/presentationml/2006/main">
+  <p:cSld>
+    <p:spTree>
+      <p:nvGrpSpPr>
+        <p:cNvPr id="1" name=""/>
+        <p:cNvGrpSpPr/>
+        <p:nvPr/>
+      </p:nvGrpSpPr>
+      <p:grpSpPr>
+        <a:xfrm>
+          <a:off x="0" y="0"/>
+          <a:ext cx="0" cy="0"/>
+          <a:chOff x="0" y="0"/>
+          <a:chExt cx="0" cy="0"/>
+        </a:xfrm>
+      </p:grpSpPr>
+      <p:sp>
+        <p:nvSpPr>
+          <p:cNvPr id="2" name="Titre 1"/>
+          <p:cNvSpPr>
+            <a:spLocks noGrp="1"/>
+          </p:cNvSpPr>
+          <p:nvPr>
+            <p:ph type="title"/>
+          </p:nvPr>
+        </p:nvSpPr>
+        <p:spPr>
+          <a:xfrm>
+            <a:off x="457200" y="274638"/>
+            <a:ext cx="8229600" cy="562074"/>
+          </a:xfrm>
+        </p:spPr>
+        <p:txBody>
+          <a:bodyPr>
+            <a:normAutofit fontScale="90000"/>
+          </a:bodyPr>
+          <a:lstStyle/>
+          <a:p>
+            <a:r>
+              <a:rPr lang="fr-FR" dirty="0" smtClean="0"/>
+              <a:t>Structure des WIOT (ici, TIVA)</a:t>
+            </a:r>
+            <a:endParaRPr lang="fr-FR" dirty="0"/>
+          </a:p>
+        </p:txBody>
+      </p:sp>
+      <p:pic>
+        <p:nvPicPr>
+          <p:cNvPr id="1026" name="Picture 2"/>
+          <p:cNvPicPr>
+            <a:picLocks noGrp="1" noChangeAspect="1" noChangeArrowheads="1"/>
+          </p:cNvPicPr>
+          <p:nvPr>
+            <p:ph idx="1"/>
+          </p:nvPr>
+        </p:nvPicPr>
+        <p:blipFill>
+          <a:blip r:embed="rId2">
+            <a:extLst>
+              <a:ext uri="{28A0092B-C50C-407E-A947-70E740481C1C}">
+                <a14:useLocalDpi xmlns:a14="http://schemas.microsoft.com/office/drawing/2010/main" val="0"/>
+              </a:ext>
+            </a:extLst>
+          </a:blip>
+          <a:srcRect/>
+          <a:stretch>
+            <a:fillRect/>
+          </a:stretch>
+        </p:blipFill>
+        <p:spPr bwMode="auto">
+          <a:xfrm>
+            <a:off x="0" y="764703"/>
+            <a:ext cx="9105111" cy="5949955"/>
+          </a:xfrm>
+          <a:prstGeom prst="rect">
+            <a:avLst/>
+          </a:prstGeom>
+          <a:noFill/>
+          <a:ln>
+            <a:noFill/>
+          </a:ln>
+          <a:extLst>
+            <a:ext uri="{909E8E84-426E-40DD-AFC4-6F175D3DCCD1}">
+              <a14:hiddenFill xmlns:a14="http://schemas.microsoft.com/office/drawing/2010/main">
+                <a:solidFill>
+                  <a:schemeClr val="accent1"/>
+                </a:solidFill>
+              </a14:hiddenFill>
+            </a:ext>
+            <a:ext uri="{91240B29-F687-4F45-9708-019B960494DF}">
+              <a14:hiddenLine xmlns:a14="http://schemas.microsoft.com/office/drawing/2010/main" w="9525">
+                <a:solidFill>
+                  <a:schemeClr val="tx1"/>
+                </a:solidFill>
+                <a:miter lim="800000"/>
+                <a:headEnd/>
+                <a:tailEnd/>
+              </a14:hiddenLine>
+            </a:ext>
+          </a:extLst>
+        </p:spPr>
+      </p:pic>
+      <p:sp>
+        <p:nvSpPr>
+          <p:cNvPr id="4" name="Espace réservé du numéro de diapositive 3"/>
+          <p:cNvSpPr>
+            <a:spLocks noGrp="1"/>
+          </p:cNvSpPr>
+          <p:nvPr>
+            <p:ph type="sldNum" sz="quarter" idx="12"/>
+          </p:nvPr>
+        </p:nvSpPr>
+        <p:spPr/>
+        <p:txBody>
+          <a:bodyPr/>
+          <a:lstStyle/>
+          <a:p>
+            <a:fld id="{6C2979F8-DCA1-40EA-8D91-2EE9239FA742}" type="slidenum">
+              <a:rPr lang="fr-FR" smtClean="0"/>
+              <a:t>4</a:t>
+            </a:fld>
+            <a:endParaRPr lang="fr-FR"/>
+          </a:p>
+        </p:txBody>
+      </p:sp>
+    </p:spTree>
+    <p:extLst>
+      <p:ext uri="{BB962C8B-B14F-4D97-AF65-F5344CB8AC3E}">
+        <p14:creationId xmlns:p14="http://schemas.microsoft.com/office/powerpoint/2010/main" val="3459171974"/>
+      </p:ext>
+    </p:extLst>
+  </p:cSld>
+  <p:clrMapOvr>
+    <a:masterClrMapping/>
+  </p:clrMapOvr>
+</p:sld>
+</file>
+
+<file path=ppt/slides/slide5.xml><?xml version="1.0" encoding="utf-8"?>
 <p:sld xmlns:a="http://schemas.openxmlformats.org/drawingml/2006/main" xmlns:r="http://schemas.openxmlformats.org/officeDocument/2006/relationships" xmlns:p="http://schemas.openxmlformats.org/presentationml/2006/main">
   <p:cSld>
     <p:spTree>
@@ -4502,6 +5413,29 @@
           </a:extLst>
         </p:spPr>
       </p:pic>
+      <p:sp>
+        <p:nvSpPr>
+          <p:cNvPr id="5" name="Espace réservé du numéro de diapositive 4"/>
+          <p:cNvSpPr>
+            <a:spLocks noGrp="1"/>
+          </p:cNvSpPr>
+          <p:nvPr>
+            <p:ph type="sldNum" sz="quarter" idx="12"/>
+          </p:nvPr>
+        </p:nvSpPr>
+        <p:spPr/>
+        <p:txBody>
+          <a:bodyPr/>
+          <a:lstStyle/>
+          <a:p>
+            <a:fld id="{6C2979F8-DCA1-40EA-8D91-2EE9239FA742}" type="slidenum">
+              <a:rPr lang="fr-FR" smtClean="0"/>
+              <a:t>5</a:t>
+            </a:fld>
+            <a:endParaRPr lang="fr-FR"/>
+          </a:p>
+        </p:txBody>
+      </p:sp>
     </p:spTree>
     <p:extLst>
       <p:ext uri="{BB962C8B-B14F-4D97-AF65-F5344CB8AC3E}">
@@ -4515,7 +5449,7 @@
 </p:sld>
 </file>
 
-<file path=ppt/slides/slide5.xml><?xml version="1.0" encoding="utf-8"?>
+<file path=ppt/slides/slide6.xml><?xml version="1.0" encoding="utf-8"?>
 <p:sld xmlns:a="http://schemas.openxmlformats.org/drawingml/2006/main" xmlns:r="http://schemas.openxmlformats.org/officeDocument/2006/relationships" xmlns:p="http://schemas.openxmlformats.org/presentationml/2006/main">
   <p:cSld>
     <p:spTree>
@@ -4704,6 +5638,29 @@
           </a:extLst>
         </p:spPr>
       </p:pic>
+      <p:sp>
+        <p:nvSpPr>
+          <p:cNvPr id="3" name="Espace réservé du numéro de diapositive 2"/>
+          <p:cNvSpPr>
+            <a:spLocks noGrp="1"/>
+          </p:cNvSpPr>
+          <p:nvPr>
+            <p:ph type="sldNum" sz="quarter" idx="12"/>
+          </p:nvPr>
+        </p:nvSpPr>
+        <p:spPr/>
+        <p:txBody>
+          <a:bodyPr/>
+          <a:lstStyle/>
+          <a:p>
+            <a:fld id="{6C2979F8-DCA1-40EA-8D91-2EE9239FA742}" type="slidenum">
+              <a:rPr lang="fr-FR" smtClean="0"/>
+              <a:t>6</a:t>
+            </a:fld>
+            <a:endParaRPr lang="fr-FR"/>
+          </a:p>
+        </p:txBody>
+      </p:sp>
     </p:spTree>
     <p:extLst>
       <p:ext uri="{BB962C8B-B14F-4D97-AF65-F5344CB8AC3E}">
@@ -4717,7 +5674,7 @@
 </p:sld>
 </file>
 
-<file path=ppt/slides/slide6.xml><?xml version="1.0" encoding="utf-8"?>
+<file path=ppt/slides/slide7.xml><?xml version="1.0" encoding="utf-8"?>
 <p:sld xmlns:a="http://schemas.openxmlformats.org/drawingml/2006/main" xmlns:r="http://schemas.openxmlformats.org/officeDocument/2006/relationships" xmlns:p="http://schemas.openxmlformats.org/presentationml/2006/main">
   <p:cSld>
     <p:spTree>
@@ -4956,6 +5913,29 @@
           </a:p>
         </p:txBody>
       </p:sp>
+      <p:sp>
+        <p:nvSpPr>
+          <p:cNvPr id="5" name="Espace réservé du numéro de diapositive 4"/>
+          <p:cNvSpPr>
+            <a:spLocks noGrp="1"/>
+          </p:cNvSpPr>
+          <p:nvPr>
+            <p:ph type="sldNum" sz="quarter" idx="12"/>
+          </p:nvPr>
+        </p:nvSpPr>
+        <p:spPr/>
+        <p:txBody>
+          <a:bodyPr/>
+          <a:lstStyle/>
+          <a:p>
+            <a:fld id="{6C2979F8-DCA1-40EA-8D91-2EE9239FA742}" type="slidenum">
+              <a:rPr lang="fr-FR" smtClean="0"/>
+              <a:t>7</a:t>
+            </a:fld>
+            <a:endParaRPr lang="fr-FR"/>
+          </a:p>
+        </p:txBody>
+      </p:sp>
     </p:spTree>
     <p:extLst>
       <p:ext uri="{BB962C8B-B14F-4D97-AF65-F5344CB8AC3E}">
@@ -4969,7 +5949,7 @@
 </p:sld>
 </file>
 
-<file path=ppt/slides/slide7.xml><?xml version="1.0" encoding="utf-8"?>
+<file path=ppt/slides/slide8.xml><?xml version="1.0" encoding="utf-8"?>
 <p:sld xmlns:a="http://schemas.openxmlformats.org/drawingml/2006/main" xmlns:r="http://schemas.openxmlformats.org/officeDocument/2006/relationships" xmlns:p="http://schemas.openxmlformats.org/presentationml/2006/main">
   <p:cSld>
     <p:spTree>
@@ -5163,6 +6143,29 @@
           </a:extLst>
         </p:spPr>
       </p:pic>
+      <p:sp>
+        <p:nvSpPr>
+          <p:cNvPr id="3" name="Espace réservé du numéro de diapositive 2"/>
+          <p:cNvSpPr>
+            <a:spLocks noGrp="1"/>
+          </p:cNvSpPr>
+          <p:nvPr>
+            <p:ph type="sldNum" sz="quarter" idx="12"/>
+          </p:nvPr>
+        </p:nvSpPr>
+        <p:spPr/>
+        <p:txBody>
+          <a:bodyPr/>
+          <a:lstStyle/>
+          <a:p>
+            <a:fld id="{6C2979F8-DCA1-40EA-8D91-2EE9239FA742}" type="slidenum">
+              <a:rPr lang="fr-FR" smtClean="0"/>
+              <a:t>8</a:t>
+            </a:fld>
+            <a:endParaRPr lang="fr-FR"/>
+          </a:p>
+        </p:txBody>
+      </p:sp>
     </p:spTree>
     <p:extLst>
       <p:ext uri="{BB962C8B-B14F-4D97-AF65-F5344CB8AC3E}">
@@ -5176,7 +6179,7 @@
 </p:sld>
 </file>
 
-<file path=ppt/slides/slide8.xml><?xml version="1.0" encoding="utf-8"?>
+<file path=ppt/slides/slide9.xml><?xml version="1.0" encoding="utf-8"?>
 <p:sld xmlns:a="http://schemas.openxmlformats.org/drawingml/2006/main" xmlns:r="http://schemas.openxmlformats.org/officeDocument/2006/relationships" xmlns:p="http://schemas.openxmlformats.org/presentationml/2006/main">
   <p:cSld>
     <p:spTree>
@@ -5419,266 +6422,33 @@
           </a:p>
         </p:txBody>
       </p:sp>
+      <p:sp>
+        <p:nvSpPr>
+          <p:cNvPr id="5" name="Espace réservé du numéro de diapositive 4"/>
+          <p:cNvSpPr>
+            <a:spLocks noGrp="1"/>
+          </p:cNvSpPr>
+          <p:nvPr>
+            <p:ph type="sldNum" sz="quarter" idx="12"/>
+          </p:nvPr>
+        </p:nvSpPr>
+        <p:spPr/>
+        <p:txBody>
+          <a:bodyPr/>
+          <a:lstStyle/>
+          <a:p>
+            <a:fld id="{6C2979F8-DCA1-40EA-8D91-2EE9239FA742}" type="slidenum">
+              <a:rPr lang="fr-FR" smtClean="0"/>
+              <a:t>9</a:t>
+            </a:fld>
+            <a:endParaRPr lang="fr-FR"/>
+          </a:p>
+        </p:txBody>
+      </p:sp>
     </p:spTree>
     <p:extLst>
       <p:ext uri="{BB962C8B-B14F-4D97-AF65-F5344CB8AC3E}">
         <p14:creationId xmlns:p14="http://schemas.microsoft.com/office/powerpoint/2010/main" val="2044842288"/>
-      </p:ext>
-    </p:extLst>
-  </p:cSld>
-  <p:clrMapOvr>
-    <a:masterClrMapping/>
-  </p:clrMapOvr>
-</p:sld>
-</file>
-
-<file path=ppt/slides/slide9.xml><?xml version="1.0" encoding="utf-8"?>
-<p:sld xmlns:a="http://schemas.openxmlformats.org/drawingml/2006/main" xmlns:r="http://schemas.openxmlformats.org/officeDocument/2006/relationships" xmlns:p="http://schemas.openxmlformats.org/presentationml/2006/main">
-  <p:cSld>
-    <p:spTree>
-      <p:nvGrpSpPr>
-        <p:cNvPr id="1" name=""/>
-        <p:cNvGrpSpPr/>
-        <p:nvPr/>
-      </p:nvGrpSpPr>
-      <p:grpSpPr>
-        <a:xfrm>
-          <a:off x="0" y="0"/>
-          <a:ext cx="0" cy="0"/>
-          <a:chOff x="0" y="0"/>
-          <a:chExt cx="0" cy="0"/>
-        </a:xfrm>
-      </p:grpSpPr>
-      <p:sp>
-        <p:nvSpPr>
-          <p:cNvPr id="2" name="Titre 1"/>
-          <p:cNvSpPr>
-            <a:spLocks noGrp="1"/>
-          </p:cNvSpPr>
-          <p:nvPr>
-            <p:ph type="title"/>
-          </p:nvPr>
-        </p:nvSpPr>
-        <p:spPr/>
-        <p:txBody>
-          <a:bodyPr>
-            <a:normAutofit fontScale="90000"/>
-          </a:bodyPr>
-          <a:lstStyle/>
-          <a:p>
-            <a:r>
-              <a:rPr lang="fr-FR" dirty="0" smtClean="0"/>
-              <a:t>Élasticité prix conso ZE à une appréciation UK</a:t>
-            </a:r>
-            <a:endParaRPr lang="fr-FR" dirty="0"/>
-          </a:p>
-        </p:txBody>
-      </p:sp>
-      <p:graphicFrame>
-        <p:nvGraphicFramePr>
-          <p:cNvPr id="4" name="Espace réservé du contenu 3"/>
-          <p:cNvGraphicFramePr>
-            <a:graphicFrameLocks noGrp="1"/>
-          </p:cNvGraphicFramePr>
-          <p:nvPr>
-            <p:ph idx="1"/>
-            <p:extLst>
-              <p:ext uri="{D42A27DB-BD31-4B8C-83A1-F6EECF244321}">
-                <p14:modId xmlns:p14="http://schemas.microsoft.com/office/powerpoint/2010/main" val="1121728573"/>
-              </p:ext>
-            </p:extLst>
-          </p:nvPr>
-        </p:nvGraphicFramePr>
-        <p:xfrm>
-          <a:off x="457200" y="1600200"/>
-          <a:ext cx="8229600" cy="370840"/>
-        </p:xfrm>
-        <a:graphic>
-          <a:graphicData uri="http://schemas.openxmlformats.org/drawingml/2006/table">
-            <a:tbl>
-              <a:tblPr firstRow="1" bandRow="1">
-                <a:tableStyleId>{5C22544A-7EE6-4342-B048-85BDC9FD1C3A}</a:tableStyleId>
-              </a:tblPr>
-              <a:tblGrid>
-                <a:gridCol w="4114800"/>
-                <a:gridCol w="4114800"/>
-              </a:tblGrid>
-              <a:tr h="370840">
-                <a:tc>
-                  <a:txBody>
-                    <a:bodyPr/>
-                    <a:lstStyle/>
-                    <a:p>
-                      <a:pPr algn="ctr"/>
-                      <a:r>
-                        <a:rPr lang="fr-FR" dirty="0" smtClean="0"/>
-                        <a:t>WIOD</a:t>
-                      </a:r>
-                      <a:endParaRPr lang="fr-FR" dirty="0"/>
-                    </a:p>
-                  </a:txBody>
-                  <a:tcPr/>
-                </a:tc>
-                <a:tc>
-                  <a:txBody>
-                    <a:bodyPr/>
-                    <a:lstStyle/>
-                    <a:p>
-                      <a:pPr algn="ctr"/>
-                      <a:r>
-                        <a:rPr lang="fr-FR" dirty="0" smtClean="0"/>
-                        <a:t>TIVA</a:t>
-                      </a:r>
-                      <a:endParaRPr lang="fr-FR" dirty="0"/>
-                    </a:p>
-                  </a:txBody>
-                  <a:tcPr/>
-                </a:tc>
-              </a:tr>
-            </a:tbl>
-          </a:graphicData>
-        </a:graphic>
-      </p:graphicFrame>
-      <p:pic>
-        <p:nvPicPr>
-          <p:cNvPr id="4098" name="Picture 2" descr="V:\DiagConj\Commun\CommerceVA\Results\Devaluations\HC_WIOD_Graph_4tempb.png"/>
-          <p:cNvPicPr>
-            <a:picLocks noChangeAspect="1" noChangeArrowheads="1"/>
-          </p:cNvPicPr>
-          <p:nvPr/>
-        </p:nvPicPr>
-        <p:blipFill>
-          <a:blip r:embed="rId2">
-            <a:extLst>
-              <a:ext uri="{28A0092B-C50C-407E-A947-70E740481C1C}">
-                <a14:useLocalDpi xmlns:a14="http://schemas.microsoft.com/office/drawing/2010/main" val="0"/>
-              </a:ext>
-            </a:extLst>
-          </a:blip>
-          <a:srcRect/>
-          <a:stretch>
-            <a:fillRect/>
-          </a:stretch>
-        </p:blipFill>
-        <p:spPr bwMode="auto">
-          <a:xfrm>
-            <a:off x="31794" y="1916832"/>
-            <a:ext cx="4552950" cy="3305175"/>
-          </a:xfrm>
-          <a:prstGeom prst="rect">
-            <a:avLst/>
-          </a:prstGeom>
-          <a:noFill/>
-          <a:extLst>
-            <a:ext uri="{909E8E84-426E-40DD-AFC4-6F175D3DCCD1}">
-              <a14:hiddenFill xmlns:a14="http://schemas.microsoft.com/office/drawing/2010/main">
-                <a:solidFill>
-                  <a:srgbClr val="FFFFFF"/>
-                </a:solidFill>
-              </a14:hiddenFill>
-            </a:ext>
-          </a:extLst>
-        </p:spPr>
-      </p:pic>
-      <p:pic>
-        <p:nvPicPr>
-          <p:cNvPr id="4099" name="Picture 3" descr="V:\DiagConj\Commun\CommerceVA\Results\Devaluations\HC_TIVA_Graph_4tempb.png"/>
-          <p:cNvPicPr>
-            <a:picLocks noChangeAspect="1" noChangeArrowheads="1"/>
-          </p:cNvPicPr>
-          <p:nvPr/>
-        </p:nvPicPr>
-        <p:blipFill>
-          <a:blip r:embed="rId3">
-            <a:extLst>
-              <a:ext uri="{28A0092B-C50C-407E-A947-70E740481C1C}">
-                <a14:useLocalDpi xmlns:a14="http://schemas.microsoft.com/office/drawing/2010/main" val="0"/>
-              </a:ext>
-            </a:extLst>
-          </a:blip>
-          <a:srcRect/>
-          <a:stretch>
-            <a:fillRect/>
-          </a:stretch>
-        </p:blipFill>
-        <p:spPr bwMode="auto">
-          <a:xfrm>
-            <a:off x="4627247" y="1916832"/>
-            <a:ext cx="4552950" cy="3305175"/>
-          </a:xfrm>
-          <a:prstGeom prst="rect">
-            <a:avLst/>
-          </a:prstGeom>
-          <a:noFill/>
-          <a:extLst>
-            <a:ext uri="{909E8E84-426E-40DD-AFC4-6F175D3DCCD1}">
-              <a14:hiddenFill xmlns:a14="http://schemas.microsoft.com/office/drawing/2010/main">
-                <a:solidFill>
-                  <a:srgbClr val="FFFFFF"/>
-                </a:solidFill>
-              </a14:hiddenFill>
-            </a:ext>
-          </a:extLst>
-        </p:spPr>
-      </p:pic>
-      <p:sp>
-        <p:nvSpPr>
-          <p:cNvPr id="8" name="ZoneTexte 7"/>
-          <p:cNvSpPr txBox="1"/>
-          <p:nvPr/>
-        </p:nvSpPr>
-        <p:spPr>
-          <a:xfrm>
-            <a:off x="395536" y="5589240"/>
-            <a:ext cx="8424936" cy="923330"/>
-          </a:xfrm>
-          <a:prstGeom prst="rect">
-            <a:avLst/>
-          </a:prstGeom>
-          <a:noFill/>
-        </p:spPr>
-        <p:txBody>
-          <a:bodyPr wrap="square" rtlCol="0">
-            <a:spAutoFit/>
-          </a:bodyPr>
-          <a:lstStyle/>
-          <a:p>
-            <a:pPr marL="285750" indent="-285750">
-              <a:buFont typeface="Arial" panose="020B0604020202020204" pitchFamily="34" charset="0"/>
-              <a:buChar char="•"/>
-            </a:pPr>
-            <a:r>
-              <a:rPr lang="fr-FR" dirty="0" smtClean="0"/>
-              <a:t>Pays les plus exposés: Irlande, Malte, Chypre, Luxembourg</a:t>
-            </a:r>
-          </a:p>
-          <a:p>
-            <a:pPr marL="285750" indent="-285750">
-              <a:buFont typeface="Arial" panose="020B0604020202020204" pitchFamily="34" charset="0"/>
-              <a:buChar char="•"/>
-            </a:pPr>
-            <a:r>
-              <a:rPr lang="fr-FR" dirty="0" smtClean="0"/>
-              <a:t>Augmentation de l’exposition dans le temps avec WIOD</a:t>
-            </a:r>
-          </a:p>
-          <a:p>
-            <a:pPr marL="285750" indent="-285750">
-              <a:buFont typeface="Arial" panose="020B0604020202020204" pitchFamily="34" charset="0"/>
-              <a:buChar char="•"/>
-            </a:pPr>
-            <a:r>
-              <a:rPr lang="fr-FR" dirty="0" smtClean="0"/>
-              <a:t>Effet plus faible avec TIVA, hormis pour l’Irlande</a:t>
-            </a:r>
-            <a:endParaRPr lang="fr-FR" dirty="0"/>
-          </a:p>
-        </p:txBody>
-      </p:sp>
-    </p:spTree>
-    <p:extLst>
-      <p:ext uri="{BB962C8B-B14F-4D97-AF65-F5344CB8AC3E}">
-        <p14:creationId xmlns:p14="http://schemas.microsoft.com/office/powerpoint/2010/main" val="4245209825"/>
       </p:ext>
     </p:extLst>
   </p:cSld>
@@ -5971,4 +6741,289 @@
   <a:objectDefaults/>
   <a:extraClrSchemeLst/>
 </a:theme>
+</file>
+
+<file path=ppt/theme/theme2.xml><?xml version="1.0" encoding="utf-8"?>
+<a:theme xmlns:a="http://schemas.openxmlformats.org/drawingml/2006/main" name="Thème Office">
+  <a:themeElements>
+    <a:clrScheme name="Office">
+      <a:dk1>
+        <a:sysClr val="windowText" lastClr="000000"/>
+      </a:dk1>
+      <a:lt1>
+        <a:sysClr val="window" lastClr="FFFFFF"/>
+      </a:lt1>
+      <a:dk2>
+        <a:srgbClr val="1F497D"/>
+      </a:dk2>
+      <a:lt2>
+        <a:srgbClr val="EEECE1"/>
+      </a:lt2>
+      <a:accent1>
+        <a:srgbClr val="4F81BD"/>
+      </a:accent1>
+      <a:accent2>
+        <a:srgbClr val="C0504D"/>
+      </a:accent2>
+      <a:accent3>
+        <a:srgbClr val="9BBB59"/>
+      </a:accent3>
+      <a:accent4>
+        <a:srgbClr val="8064A2"/>
+      </a:accent4>
+      <a:accent5>
+        <a:srgbClr val="4BACC6"/>
+      </a:accent5>
+      <a:accent6>
+        <a:srgbClr val="F79646"/>
+      </a:accent6>
+      <a:hlink>
+        <a:srgbClr val="0000FF"/>
+      </a:hlink>
+      <a:folHlink>
+        <a:srgbClr val="800080"/>
+      </a:folHlink>
+    </a:clrScheme>
+    <a:fontScheme name="Office">
+      <a:majorFont>
+        <a:latin typeface="Calibri"/>
+        <a:ea typeface=""/>
+        <a:cs typeface=""/>
+        <a:font script="Jpan" typeface="ＭＳ Ｐゴシック"/>
+        <a:font script="Hang" typeface="맑은 고딕"/>
+        <a:font script="Hans" typeface="宋体"/>
+        <a:font script="Hant" typeface="新細明體"/>
+        <a:font script="Arab" typeface="Times New Roman"/>
+        <a:font script="Hebr" typeface="Times New Roman"/>
+        <a:font script="Thai" typeface="Angsana New"/>
+        <a:font script="Ethi" typeface="Nyala"/>
+        <a:font script="Beng" typeface="Vrinda"/>
+        <a:font script="Gujr" typeface="Shruti"/>
+        <a:font script="Khmr" typeface="MoolBoran"/>
+        <a:font script="Knda" typeface="Tunga"/>
+        <a:font script="Guru" typeface="Raavi"/>
+        <a:font script="Cans" typeface="Euphemia"/>
+        <a:font script="Cher" typeface="Plantagenet Cherokee"/>
+        <a:font script="Yiii" typeface="Microsoft Yi Baiti"/>
+        <a:font script="Tibt" typeface="Microsoft Himalaya"/>
+        <a:font script="Thaa" typeface="MV Boli"/>
+        <a:font script="Deva" typeface="Mangal"/>
+        <a:font script="Telu" typeface="Gautami"/>
+        <a:font script="Taml" typeface="Latha"/>
+        <a:font script="Syrc" typeface="Estrangelo Edessa"/>
+        <a:font script="Orya" typeface="Kalinga"/>
+        <a:font script="Mlym" typeface="Kartika"/>
+        <a:font script="Laoo" typeface="DokChampa"/>
+        <a:font script="Sinh" typeface="Iskoola Pota"/>
+        <a:font script="Mong" typeface="Mongolian Baiti"/>
+        <a:font script="Viet" typeface="Times New Roman"/>
+        <a:font script="Uigh" typeface="Microsoft Uighur"/>
+        <a:font script="Geor" typeface="Sylfaen"/>
+      </a:majorFont>
+      <a:minorFont>
+        <a:latin typeface="Calibri"/>
+        <a:ea typeface=""/>
+        <a:cs typeface=""/>
+        <a:font script="Jpan" typeface="ＭＳ Ｐゴシック"/>
+        <a:font script="Hang" typeface="맑은 고딕"/>
+        <a:font script="Hans" typeface="宋体"/>
+        <a:font script="Hant" typeface="新細明體"/>
+        <a:font script="Arab" typeface="Arial"/>
+        <a:font script="Hebr" typeface="Arial"/>
+        <a:font script="Thai" typeface="Cordia New"/>
+        <a:font script="Ethi" typeface="Nyala"/>
+        <a:font script="Beng" typeface="Vrinda"/>
+        <a:font script="Gujr" typeface="Shruti"/>
+        <a:font script="Khmr" typeface="DaunPenh"/>
+        <a:font script="Knda" typeface="Tunga"/>
+        <a:font script="Guru" typeface="Raavi"/>
+        <a:font script="Cans" typeface="Euphemia"/>
+        <a:font script="Cher" typeface="Plantagenet Cherokee"/>
+        <a:font script="Yiii" typeface="Microsoft Yi Baiti"/>
+        <a:font script="Tibt" typeface="Microsoft Himalaya"/>
+        <a:font script="Thaa" typeface="MV Boli"/>
+        <a:font script="Deva" typeface="Mangal"/>
+        <a:font script="Telu" typeface="Gautami"/>
+        <a:font script="Taml" typeface="Latha"/>
+        <a:font script="Syrc" typeface="Estrangelo Edessa"/>
+        <a:font script="Orya" typeface="Kalinga"/>
+        <a:font script="Mlym" typeface="Kartika"/>
+        <a:font script="Laoo" typeface="DokChampa"/>
+        <a:font script="Sinh" typeface="Iskoola Pota"/>
+        <a:font script="Mong" typeface="Mongolian Baiti"/>
+        <a:font script="Viet" typeface="Arial"/>
+        <a:font script="Uigh" typeface="Microsoft Uighur"/>
+        <a:font script="Geor" typeface="Sylfaen"/>
+      </a:minorFont>
+    </a:fontScheme>
+    <a:fmtScheme name="Office">
+      <a:fillStyleLst>
+        <a:solidFill>
+          <a:schemeClr val="phClr"/>
+        </a:solidFill>
+        <a:gradFill rotWithShape="1">
+          <a:gsLst>
+            <a:gs pos="0">
+              <a:schemeClr val="phClr">
+                <a:tint val="50000"/>
+                <a:satMod val="300000"/>
+              </a:schemeClr>
+            </a:gs>
+            <a:gs pos="35000">
+              <a:schemeClr val="phClr">
+                <a:tint val="37000"/>
+                <a:satMod val="300000"/>
+              </a:schemeClr>
+            </a:gs>
+            <a:gs pos="100000">
+              <a:schemeClr val="phClr">
+                <a:tint val="15000"/>
+                <a:satMod val="350000"/>
+              </a:schemeClr>
+            </a:gs>
+          </a:gsLst>
+          <a:lin ang="16200000" scaled="1"/>
+        </a:gradFill>
+        <a:gradFill rotWithShape="1">
+          <a:gsLst>
+            <a:gs pos="0">
+              <a:schemeClr val="phClr">
+                <a:shade val="51000"/>
+                <a:satMod val="130000"/>
+              </a:schemeClr>
+            </a:gs>
+            <a:gs pos="80000">
+              <a:schemeClr val="phClr">
+                <a:shade val="93000"/>
+                <a:satMod val="130000"/>
+              </a:schemeClr>
+            </a:gs>
+            <a:gs pos="100000">
+              <a:schemeClr val="phClr">
+                <a:shade val="94000"/>
+                <a:satMod val="135000"/>
+              </a:schemeClr>
+            </a:gs>
+          </a:gsLst>
+          <a:lin ang="16200000" scaled="0"/>
+        </a:gradFill>
+      </a:fillStyleLst>
+      <a:lnStyleLst>
+        <a:ln w="9525" cap="flat" cmpd="sng" algn="ctr">
+          <a:solidFill>
+            <a:schemeClr val="phClr">
+              <a:shade val="95000"/>
+              <a:satMod val="105000"/>
+            </a:schemeClr>
+          </a:solidFill>
+          <a:prstDash val="solid"/>
+        </a:ln>
+        <a:ln w="25400" cap="flat" cmpd="sng" algn="ctr">
+          <a:solidFill>
+            <a:schemeClr val="phClr"/>
+          </a:solidFill>
+          <a:prstDash val="solid"/>
+        </a:ln>
+        <a:ln w="38100" cap="flat" cmpd="sng" algn="ctr">
+          <a:solidFill>
+            <a:schemeClr val="phClr"/>
+          </a:solidFill>
+          <a:prstDash val="solid"/>
+        </a:ln>
+      </a:lnStyleLst>
+      <a:effectStyleLst>
+        <a:effectStyle>
+          <a:effectLst>
+            <a:outerShdw blurRad="40000" dist="20000" dir="5400000" rotWithShape="0">
+              <a:srgbClr val="000000">
+                <a:alpha val="38000"/>
+              </a:srgbClr>
+            </a:outerShdw>
+          </a:effectLst>
+        </a:effectStyle>
+        <a:effectStyle>
+          <a:effectLst>
+            <a:outerShdw blurRad="40000" dist="23000" dir="5400000" rotWithShape="0">
+              <a:srgbClr val="000000">
+                <a:alpha val="35000"/>
+              </a:srgbClr>
+            </a:outerShdw>
+          </a:effectLst>
+        </a:effectStyle>
+        <a:effectStyle>
+          <a:effectLst>
+            <a:outerShdw blurRad="40000" dist="23000" dir="5400000" rotWithShape="0">
+              <a:srgbClr val="000000">
+                <a:alpha val="35000"/>
+              </a:srgbClr>
+            </a:outerShdw>
+          </a:effectLst>
+          <a:scene3d>
+            <a:camera prst="orthographicFront">
+              <a:rot lat="0" lon="0" rev="0"/>
+            </a:camera>
+            <a:lightRig rig="threePt" dir="t">
+              <a:rot lat="0" lon="0" rev="1200000"/>
+            </a:lightRig>
+          </a:scene3d>
+          <a:sp3d>
+            <a:bevelT w="63500" h="25400"/>
+          </a:sp3d>
+        </a:effectStyle>
+      </a:effectStyleLst>
+      <a:bgFillStyleLst>
+        <a:solidFill>
+          <a:schemeClr val="phClr"/>
+        </a:solidFill>
+        <a:gradFill rotWithShape="1">
+          <a:gsLst>
+            <a:gs pos="0">
+              <a:schemeClr val="phClr">
+                <a:tint val="40000"/>
+                <a:satMod val="350000"/>
+              </a:schemeClr>
+            </a:gs>
+            <a:gs pos="40000">
+              <a:schemeClr val="phClr">
+                <a:tint val="45000"/>
+                <a:shade val="99000"/>
+                <a:satMod val="350000"/>
+              </a:schemeClr>
+            </a:gs>
+            <a:gs pos="100000">
+              <a:schemeClr val="phClr">
+                <a:shade val="20000"/>
+                <a:satMod val="255000"/>
+              </a:schemeClr>
+            </a:gs>
+          </a:gsLst>
+          <a:path path="circle">
+            <a:fillToRect l="50000" t="-80000" r="50000" b="180000"/>
+          </a:path>
+        </a:gradFill>
+        <a:gradFill rotWithShape="1">
+          <a:gsLst>
+            <a:gs pos="0">
+              <a:schemeClr val="phClr">
+                <a:tint val="80000"/>
+                <a:satMod val="300000"/>
+              </a:schemeClr>
+            </a:gs>
+            <a:gs pos="100000">
+              <a:schemeClr val="phClr">
+                <a:shade val="30000"/>
+                <a:satMod val="200000"/>
+              </a:schemeClr>
+            </a:gs>
+          </a:gsLst>
+          <a:path path="circle">
+            <a:fillToRect l="50000" t="50000" r="50000" b="50000"/>
+          </a:path>
+        </a:gradFill>
+      </a:bgFillStyleLst>
+    </a:fmtScheme>
+  </a:themeElements>
+  <a:objectDefaults/>
+  <a:extraClrSchemeLst/>
+</a:theme>
 </file>
</xml_diff>

<commit_message>
maj diapo de conclusion
Signed-off-by: FAUBERT Violaine (UA 1383) <W817186@intra.bdf.local>
</commit_message>
<xml_diff>
--- a/c17255-Point d’étape projet WIOD TIVA.pptx
+++ b/c17255-Point d’étape projet WIOD TIVA.pptx
@@ -4357,26 +4357,55 @@
         </p:nvSpPr>
         <p:spPr/>
         <p:txBody>
-          <a:bodyPr/>
-          <a:lstStyle/>
-          <a:p>
-            <a:r>
-              <a:rPr lang="fr-FR" dirty="0" smtClean="0"/>
-              <a:t>Interprétation des résultats</a:t>
-            </a:r>
-          </a:p>
-          <a:p>
-            <a:r>
-              <a:rPr lang="fr-FR" dirty="0" smtClean="0"/>
-              <a:t>Approfondir l’analyse sur la part des inputs importés </a:t>
-            </a:r>
-          </a:p>
-          <a:p>
-            <a:r>
-              <a:rPr lang="fr-FR" dirty="0" smtClean="0"/>
+          <a:bodyPr>
+            <a:normAutofit fontScale="70000" lnSpcReduction="20000"/>
+          </a:bodyPr>
+          <a:lstStyle/>
+          <a:p>
+            <a:r>
+              <a:rPr lang="fr-FR" dirty="0"/>
+              <a:t>Comparaison avec les élasticités agrégées ?</a:t>
+            </a:r>
+          </a:p>
+          <a:p>
+            <a:r>
+              <a:rPr lang="fr-FR" dirty="0"/>
+              <a:t>On ne peut pas comparer avec le MT ou le LT, mais on peut le faire avec le CT Est-ce que les différences sont comptables ou liées au bouclage ?</a:t>
+            </a:r>
+          </a:p>
+          <a:p>
+            <a:r>
+              <a:rPr lang="fr-FR" dirty="0"/>
+              <a:t>Que nous pourrions utiliser pour les années récentes ?</a:t>
+            </a:r>
+          </a:p>
+          <a:p>
+            <a:r>
+              <a:rPr lang="fr-FR" dirty="0"/>
+              <a:t>Approfondir l’analyse sur la part des inputs importés Quid des changements dans le temps ?</a:t>
+            </a:r>
+          </a:p>
+          <a:p>
+            <a:r>
+              <a:rPr lang="fr-FR" dirty="0"/>
+              <a:t>Est-ce qu’il y a une dynamique qui ne se résume à l’évolution de la part des inputs ?</a:t>
+            </a:r>
+          </a:p>
+          <a:p>
+            <a:r>
+              <a:rPr lang="fr-FR" dirty="0"/>
+              <a:t>Problématique pour une note : existe-t-il une formule au doigt mouillé qui serait meilleure que les élasticités agrégées de CT actuelles ?</a:t>
+            </a:r>
+          </a:p>
+          <a:p>
+            <a:r>
+              <a:rPr lang="fr-FR" dirty="0"/>
+              <a:t>Contrat suivant ? </a:t>
+            </a:r>
+            <a:r>
+              <a:rPr lang="fr-FR"/>
               <a:t>Impact d’un choc sur le prix du pétrole sur les déflateurs</a:t>
             </a:r>
-            <a:endParaRPr lang="fr-FR" dirty="0"/>
           </a:p>
         </p:txBody>
       </p:sp>

</xml_diff>

<commit_message>
Signed-off-by: FAUBERT Violaine (UA 1383) <W817186@intra.bdf.local>
</commit_message>
<xml_diff>
--- a/c17255-Point d’étape projet WIOD TIVA.pptx
+++ b/c17255-Point d’étape projet WIOD TIVA.pptx
@@ -8,15 +8,17 @@
     <p:sldId id="256" r:id="rId2"/>
     <p:sldId id="267" r:id="rId3"/>
     <p:sldId id="257" r:id="rId4"/>
-    <p:sldId id="258" r:id="rId5"/>
-    <p:sldId id="260" r:id="rId6"/>
-    <p:sldId id="261" r:id="rId7"/>
-    <p:sldId id="259" r:id="rId8"/>
-    <p:sldId id="262" r:id="rId9"/>
-    <p:sldId id="263" r:id="rId10"/>
-    <p:sldId id="265" r:id="rId11"/>
-    <p:sldId id="266" r:id="rId12"/>
-    <p:sldId id="268" r:id="rId13"/>
+    <p:sldId id="269" r:id="rId5"/>
+    <p:sldId id="258" r:id="rId6"/>
+    <p:sldId id="271" r:id="rId7"/>
+    <p:sldId id="260" r:id="rId8"/>
+    <p:sldId id="261" r:id="rId9"/>
+    <p:sldId id="259" r:id="rId10"/>
+    <p:sldId id="262" r:id="rId11"/>
+    <p:sldId id="263" r:id="rId12"/>
+    <p:sldId id="265" r:id="rId13"/>
+    <p:sldId id="266" r:id="rId14"/>
+    <p:sldId id="270" r:id="rId15"/>
   </p:sldIdLst>
   <p:sldSz cx="9144000" cy="6858000" type="screen4x3"/>
   <p:notesSz cx="6858000" cy="9144000"/>
@@ -117,7 +119,7 @@
   </p:defaultTextStyle>
   <p:extLst>
     <p:ext uri="{EFAFB233-063F-42B5-8137-9DF3F51BA10A}">
-      <p15:sldGuideLst xmlns:p15="http://schemas.microsoft.com/office/powerpoint/2012/main">
+      <p15:sldGuideLst xmlns="" xmlns:p15="http://schemas.microsoft.com/office/powerpoint/2012/main">
         <p15:guide id="1" orient="horz" pos="2160">
           <p15:clr>
             <a:srgbClr val="A4A3A4"/>
@@ -357,7 +359,7 @@
           <a:p>
             <a:fld id="{6C2979F8-DCA1-40EA-8D91-2EE9239FA742}" type="slidenum">
               <a:rPr lang="fr-FR" smtClean="0"/>
-              <a:t>‹#›</a:t>
+              <a:t>‹N°›</a:t>
             </a:fld>
             <a:endParaRPr lang="fr-FR"/>
           </a:p>
@@ -527,7 +529,7 @@
           <a:p>
             <a:fld id="{6C2979F8-DCA1-40EA-8D91-2EE9239FA742}" type="slidenum">
               <a:rPr lang="fr-FR" smtClean="0"/>
-              <a:t>‹#›</a:t>
+              <a:t>‹N°›</a:t>
             </a:fld>
             <a:endParaRPr lang="fr-FR"/>
           </a:p>
@@ -707,7 +709,7 @@
           <a:p>
             <a:fld id="{6C2979F8-DCA1-40EA-8D91-2EE9239FA742}" type="slidenum">
               <a:rPr lang="fr-FR" smtClean="0"/>
-              <a:t>‹#›</a:t>
+              <a:t>‹N°›</a:t>
             </a:fld>
             <a:endParaRPr lang="fr-FR"/>
           </a:p>
@@ -877,7 +879,7 @@
           <a:p>
             <a:fld id="{6C2979F8-DCA1-40EA-8D91-2EE9239FA742}" type="slidenum">
               <a:rPr lang="fr-FR" smtClean="0"/>
-              <a:t>‹#›</a:t>
+              <a:t>‹N°›</a:t>
             </a:fld>
             <a:endParaRPr lang="fr-FR"/>
           </a:p>
@@ -1123,7 +1125,7 @@
           <a:p>
             <a:fld id="{6C2979F8-DCA1-40EA-8D91-2EE9239FA742}" type="slidenum">
               <a:rPr lang="fr-FR" smtClean="0"/>
-              <a:t>‹#›</a:t>
+              <a:t>‹N°›</a:t>
             </a:fld>
             <a:endParaRPr lang="fr-FR"/>
           </a:p>
@@ -1411,7 +1413,7 @@
           <a:p>
             <a:fld id="{6C2979F8-DCA1-40EA-8D91-2EE9239FA742}" type="slidenum">
               <a:rPr lang="fr-FR" smtClean="0"/>
-              <a:t>‹#›</a:t>
+              <a:t>‹N°›</a:t>
             </a:fld>
             <a:endParaRPr lang="fr-FR"/>
           </a:p>
@@ -1833,7 +1835,7 @@
           <a:p>
             <a:fld id="{6C2979F8-DCA1-40EA-8D91-2EE9239FA742}" type="slidenum">
               <a:rPr lang="fr-FR" smtClean="0"/>
-              <a:t>‹#›</a:t>
+              <a:t>‹N°›</a:t>
             </a:fld>
             <a:endParaRPr lang="fr-FR"/>
           </a:p>
@@ -1951,7 +1953,7 @@
           <a:p>
             <a:fld id="{6C2979F8-DCA1-40EA-8D91-2EE9239FA742}" type="slidenum">
               <a:rPr lang="fr-FR" smtClean="0"/>
-              <a:t>‹#›</a:t>
+              <a:t>‹N°›</a:t>
             </a:fld>
             <a:endParaRPr lang="fr-FR"/>
           </a:p>
@@ -2046,7 +2048,7 @@
           <a:p>
             <a:fld id="{6C2979F8-DCA1-40EA-8D91-2EE9239FA742}" type="slidenum">
               <a:rPr lang="fr-FR" smtClean="0"/>
-              <a:t>‹#›</a:t>
+              <a:t>‹N°›</a:t>
             </a:fld>
             <a:endParaRPr lang="fr-FR"/>
           </a:p>
@@ -2323,7 +2325,7 @@
           <a:p>
             <a:fld id="{6C2979F8-DCA1-40EA-8D91-2EE9239FA742}" type="slidenum">
               <a:rPr lang="fr-FR" smtClean="0"/>
-              <a:t>‹#›</a:t>
+              <a:t>‹N°›</a:t>
             </a:fld>
             <a:endParaRPr lang="fr-FR"/>
           </a:p>
@@ -2576,7 +2578,7 @@
           <a:p>
             <a:fld id="{6C2979F8-DCA1-40EA-8D91-2EE9239FA742}" type="slidenum">
               <a:rPr lang="fr-FR" smtClean="0"/>
-              <a:t>‹#›</a:t>
+              <a:t>‹N°›</a:t>
             </a:fld>
             <a:endParaRPr lang="fr-FR"/>
           </a:p>
@@ -2825,7 +2827,7 @@
           <a:p>
             <a:fld id="{6C2979F8-DCA1-40EA-8D91-2EE9239FA742}" type="slidenum">
               <a:rPr lang="fr-FR" smtClean="0"/>
-              <a:t>‹#›</a:t>
+              <a:t>‹N°›</a:t>
             </a:fld>
             <a:endParaRPr lang="fr-FR"/>
           </a:p>
@@ -3236,6 +3238,518 @@
             <p:ph idx="1"/>
             <p:extLst>
               <p:ext uri="{D42A27DB-BD31-4B8C-83A1-F6EECF244321}">
+                <p14:modId xmlns:p14="http://schemas.microsoft.com/office/powerpoint/2010/main" val="909267680"/>
+              </p:ext>
+            </p:extLst>
+          </p:nvPr>
+        </p:nvGraphicFramePr>
+        <p:xfrm>
+          <a:off x="457200" y="1600200"/>
+          <a:ext cx="8229600" cy="370840"/>
+        </p:xfrm>
+        <a:graphic>
+          <a:graphicData uri="http://schemas.openxmlformats.org/drawingml/2006/table">
+            <a:tbl>
+              <a:tblPr firstRow="1" bandRow="1">
+                <a:tableStyleId>{5C22544A-7EE6-4342-B048-85BDC9FD1C3A}</a:tableStyleId>
+              </a:tblPr>
+              <a:tblGrid>
+                <a:gridCol w="4114800"/>
+                <a:gridCol w="4114800"/>
+              </a:tblGrid>
+              <a:tr h="370840">
+                <a:tc>
+                  <a:txBody>
+                    <a:bodyPr/>
+                    <a:lstStyle/>
+                    <a:p>
+                      <a:pPr algn="ctr"/>
+                      <a:r>
+                        <a:rPr lang="fr-FR" dirty="0" smtClean="0"/>
+                        <a:t>WIOD</a:t>
+                      </a:r>
+                      <a:endParaRPr lang="fr-FR" dirty="0"/>
+                    </a:p>
+                  </a:txBody>
+                  <a:tcPr/>
+                </a:tc>
+                <a:tc>
+                  <a:txBody>
+                    <a:bodyPr/>
+                    <a:lstStyle/>
+                    <a:p>
+                      <a:pPr algn="ctr"/>
+                      <a:r>
+                        <a:rPr lang="fr-FR" dirty="0" smtClean="0"/>
+                        <a:t>TIVA</a:t>
+                      </a:r>
+                      <a:endParaRPr lang="fr-FR" dirty="0"/>
+                    </a:p>
+                  </a:txBody>
+                  <a:tcPr/>
+                </a:tc>
+              </a:tr>
+            </a:tbl>
+          </a:graphicData>
+        </a:graphic>
+      </p:graphicFrame>
+      <p:pic>
+        <p:nvPicPr>
+          <p:cNvPr id="3074" name="Picture 2" descr="V:\DiagConj\Commun\CommerceVA\Results\Devaluations\HC_Graph_4tempc_TIVA.png"/>
+          <p:cNvPicPr>
+            <a:picLocks noChangeAspect="1" noChangeArrowheads="1"/>
+          </p:cNvPicPr>
+          <p:nvPr/>
+        </p:nvPicPr>
+        <p:blipFill>
+          <a:blip r:embed="rId2">
+            <a:extLst>
+              <a:ext uri="{28A0092B-C50C-407E-A947-70E740481C1C}">
+                <a14:useLocalDpi xmlns:a14="http://schemas.microsoft.com/office/drawing/2010/main" val="0"/>
+              </a:ext>
+            </a:extLst>
+          </a:blip>
+          <a:srcRect/>
+          <a:stretch>
+            <a:fillRect/>
+          </a:stretch>
+        </p:blipFill>
+        <p:spPr bwMode="auto">
+          <a:xfrm>
+            <a:off x="4591050" y="1988840"/>
+            <a:ext cx="4552950" cy="3305175"/>
+          </a:xfrm>
+          <a:prstGeom prst="rect">
+            <a:avLst/>
+          </a:prstGeom>
+          <a:noFill/>
+          <a:extLst>
+            <a:ext uri="{909E8E84-426E-40DD-AFC4-6F175D3DCCD1}">
+              <a14:hiddenFill xmlns:a14="http://schemas.microsoft.com/office/drawing/2010/main">
+                <a:solidFill>
+                  <a:srgbClr val="FFFFFF"/>
+                </a:solidFill>
+              </a14:hiddenFill>
+            </a:ext>
+          </a:extLst>
+        </p:spPr>
+      </p:pic>
+      <p:pic>
+        <p:nvPicPr>
+          <p:cNvPr id="3075" name="Picture 3" descr="V:\DiagConj\Commun\CommerceVA\Results\Devaluations\HC_Graph_4tempc_WIOD.png"/>
+          <p:cNvPicPr>
+            <a:picLocks noChangeAspect="1" noChangeArrowheads="1"/>
+          </p:cNvPicPr>
+          <p:nvPr/>
+        </p:nvPicPr>
+        <p:blipFill>
+          <a:blip r:embed="rId3">
+            <a:extLst>
+              <a:ext uri="{28A0092B-C50C-407E-A947-70E740481C1C}">
+                <a14:useLocalDpi xmlns:a14="http://schemas.microsoft.com/office/drawing/2010/main" val="0"/>
+              </a:ext>
+            </a:extLst>
+          </a:blip>
+          <a:srcRect/>
+          <a:stretch>
+            <a:fillRect/>
+          </a:stretch>
+        </p:blipFill>
+        <p:spPr bwMode="auto">
+          <a:xfrm>
+            <a:off x="19050" y="1988839"/>
+            <a:ext cx="4552950" cy="3305175"/>
+          </a:xfrm>
+          <a:prstGeom prst="rect">
+            <a:avLst/>
+          </a:prstGeom>
+          <a:noFill/>
+          <a:extLst>
+            <a:ext uri="{909E8E84-426E-40DD-AFC4-6F175D3DCCD1}">
+              <a14:hiddenFill xmlns:a14="http://schemas.microsoft.com/office/drawing/2010/main">
+                <a:solidFill>
+                  <a:srgbClr val="FFFFFF"/>
+                </a:solidFill>
+              </a14:hiddenFill>
+            </a:ext>
+          </a:extLst>
+        </p:spPr>
+      </p:pic>
+      <p:sp>
+        <p:nvSpPr>
+          <p:cNvPr id="3" name="ZoneTexte 2"/>
+          <p:cNvSpPr txBox="1"/>
+          <p:nvPr/>
+        </p:nvSpPr>
+        <p:spPr>
+          <a:xfrm>
+            <a:off x="395536" y="5589240"/>
+            <a:ext cx="8424936" cy="923330"/>
+          </a:xfrm>
+          <a:prstGeom prst="rect">
+            <a:avLst/>
+          </a:prstGeom>
+          <a:noFill/>
+        </p:spPr>
+        <p:txBody>
+          <a:bodyPr wrap="square" rtlCol="0">
+            <a:spAutoFit/>
+          </a:bodyPr>
+          <a:lstStyle/>
+          <a:p>
+            <a:pPr marL="285750" indent="-285750">
+              <a:buFont typeface="Arial" panose="020B0604020202020204" pitchFamily="34" charset="0"/>
+              <a:buChar char="•"/>
+            </a:pPr>
+            <a:r>
+              <a:rPr lang="fr-FR" dirty="0" smtClean="0"/>
+              <a:t>Pays le plus exposé: Irlande</a:t>
+            </a:r>
+          </a:p>
+          <a:p>
+            <a:pPr marL="285750" indent="-285750">
+              <a:buFont typeface="Arial" panose="020B0604020202020204" pitchFamily="34" charset="0"/>
+              <a:buChar char="•"/>
+            </a:pPr>
+            <a:r>
+              <a:rPr lang="fr-FR" dirty="0" smtClean="0"/>
+              <a:t>Augmentation de l’exposition dans le temps avec WIOD</a:t>
+            </a:r>
+          </a:p>
+          <a:p>
+            <a:pPr marL="285750" indent="-285750">
+              <a:buFont typeface="Arial" panose="020B0604020202020204" pitchFamily="34" charset="0"/>
+              <a:buChar char="•"/>
+            </a:pPr>
+            <a:r>
+              <a:rPr lang="fr-FR" dirty="0" smtClean="0"/>
+              <a:t>Effet plus faible avec TIVA, hormis pour l’Irlande</a:t>
+            </a:r>
+            <a:endParaRPr lang="fr-FR" dirty="0"/>
+          </a:p>
+        </p:txBody>
+      </p:sp>
+    </p:spTree>
+    <p:extLst>
+      <p:ext uri="{BB962C8B-B14F-4D97-AF65-F5344CB8AC3E}">
+        <p14:creationId xmlns:p14="http://schemas.microsoft.com/office/powerpoint/2010/main" val="2044842288"/>
+      </p:ext>
+    </p:extLst>
+  </p:cSld>
+  <p:clrMapOvr>
+    <a:masterClrMapping/>
+  </p:clrMapOvr>
+</p:sld>
+</file>
+
+<file path=ppt/slides/slide11.xml><?xml version="1.0" encoding="utf-8"?>
+<p:sld xmlns:a="http://schemas.openxmlformats.org/drawingml/2006/main" xmlns:r="http://schemas.openxmlformats.org/officeDocument/2006/relationships" xmlns:p="http://schemas.openxmlformats.org/presentationml/2006/main">
+  <p:cSld>
+    <p:spTree>
+      <p:nvGrpSpPr>
+        <p:cNvPr id="1" name=""/>
+        <p:cNvGrpSpPr/>
+        <p:nvPr/>
+      </p:nvGrpSpPr>
+      <p:grpSpPr>
+        <a:xfrm>
+          <a:off x="0" y="0"/>
+          <a:ext cx="0" cy="0"/>
+          <a:chOff x="0" y="0"/>
+          <a:chExt cx="0" cy="0"/>
+        </a:xfrm>
+      </p:grpSpPr>
+      <p:sp>
+        <p:nvSpPr>
+          <p:cNvPr id="2" name="Titre 1"/>
+          <p:cNvSpPr>
+            <a:spLocks noGrp="1"/>
+          </p:cNvSpPr>
+          <p:nvPr>
+            <p:ph type="title"/>
+          </p:nvPr>
+        </p:nvSpPr>
+        <p:spPr/>
+        <p:txBody>
+          <a:bodyPr>
+            <a:normAutofit fontScale="90000"/>
+          </a:bodyPr>
+          <a:lstStyle/>
+          <a:p>
+            <a:r>
+              <a:rPr lang="fr-FR" dirty="0" smtClean="0"/>
+              <a:t>Élasticité prix conso ZE à une appréciation UK</a:t>
+            </a:r>
+            <a:endParaRPr lang="fr-FR" dirty="0"/>
+          </a:p>
+        </p:txBody>
+      </p:sp>
+      <p:graphicFrame>
+        <p:nvGraphicFramePr>
+          <p:cNvPr id="4" name="Espace réservé du contenu 3"/>
+          <p:cNvGraphicFramePr>
+            <a:graphicFrameLocks noGrp="1"/>
+          </p:cNvGraphicFramePr>
+          <p:nvPr>
+            <p:ph idx="1"/>
+            <p:extLst>
+              <p:ext uri="{D42A27DB-BD31-4B8C-83A1-F6EECF244321}">
+                <p14:modId xmlns:p14="http://schemas.microsoft.com/office/powerpoint/2010/main" val="1121728573"/>
+              </p:ext>
+            </p:extLst>
+          </p:nvPr>
+        </p:nvGraphicFramePr>
+        <p:xfrm>
+          <a:off x="457200" y="1600200"/>
+          <a:ext cx="8229600" cy="370840"/>
+        </p:xfrm>
+        <a:graphic>
+          <a:graphicData uri="http://schemas.openxmlformats.org/drawingml/2006/table">
+            <a:tbl>
+              <a:tblPr firstRow="1" bandRow="1">
+                <a:tableStyleId>{5C22544A-7EE6-4342-B048-85BDC9FD1C3A}</a:tableStyleId>
+              </a:tblPr>
+              <a:tblGrid>
+                <a:gridCol w="4114800"/>
+                <a:gridCol w="4114800"/>
+              </a:tblGrid>
+              <a:tr h="370840">
+                <a:tc>
+                  <a:txBody>
+                    <a:bodyPr/>
+                    <a:lstStyle/>
+                    <a:p>
+                      <a:pPr algn="ctr"/>
+                      <a:r>
+                        <a:rPr lang="fr-FR" dirty="0" smtClean="0"/>
+                        <a:t>WIOD</a:t>
+                      </a:r>
+                      <a:endParaRPr lang="fr-FR" dirty="0"/>
+                    </a:p>
+                  </a:txBody>
+                  <a:tcPr/>
+                </a:tc>
+                <a:tc>
+                  <a:txBody>
+                    <a:bodyPr/>
+                    <a:lstStyle/>
+                    <a:p>
+                      <a:pPr algn="ctr"/>
+                      <a:r>
+                        <a:rPr lang="fr-FR" dirty="0" smtClean="0"/>
+                        <a:t>TIVA</a:t>
+                      </a:r>
+                      <a:endParaRPr lang="fr-FR" dirty="0"/>
+                    </a:p>
+                  </a:txBody>
+                  <a:tcPr/>
+                </a:tc>
+              </a:tr>
+            </a:tbl>
+          </a:graphicData>
+        </a:graphic>
+      </p:graphicFrame>
+      <p:pic>
+        <p:nvPicPr>
+          <p:cNvPr id="4098" name="Picture 2" descr="V:\DiagConj\Commun\CommerceVA\Results\Devaluations\HC_WIOD_Graph_4tempb.png"/>
+          <p:cNvPicPr>
+            <a:picLocks noChangeAspect="1" noChangeArrowheads="1"/>
+          </p:cNvPicPr>
+          <p:nvPr/>
+        </p:nvPicPr>
+        <p:blipFill>
+          <a:blip r:embed="rId2">
+            <a:extLst>
+              <a:ext uri="{28A0092B-C50C-407E-A947-70E740481C1C}">
+                <a14:useLocalDpi xmlns:a14="http://schemas.microsoft.com/office/drawing/2010/main" val="0"/>
+              </a:ext>
+            </a:extLst>
+          </a:blip>
+          <a:srcRect/>
+          <a:stretch>
+            <a:fillRect/>
+          </a:stretch>
+        </p:blipFill>
+        <p:spPr bwMode="auto">
+          <a:xfrm>
+            <a:off x="31794" y="1916832"/>
+            <a:ext cx="4552950" cy="3305175"/>
+          </a:xfrm>
+          <a:prstGeom prst="rect">
+            <a:avLst/>
+          </a:prstGeom>
+          <a:noFill/>
+          <a:extLst>
+            <a:ext uri="{909E8E84-426E-40DD-AFC4-6F175D3DCCD1}">
+              <a14:hiddenFill xmlns:a14="http://schemas.microsoft.com/office/drawing/2010/main">
+                <a:solidFill>
+                  <a:srgbClr val="FFFFFF"/>
+                </a:solidFill>
+              </a14:hiddenFill>
+            </a:ext>
+          </a:extLst>
+        </p:spPr>
+      </p:pic>
+      <p:pic>
+        <p:nvPicPr>
+          <p:cNvPr id="4099" name="Picture 3" descr="V:\DiagConj\Commun\CommerceVA\Results\Devaluations\HC_TIVA_Graph_4tempb.png"/>
+          <p:cNvPicPr>
+            <a:picLocks noChangeAspect="1" noChangeArrowheads="1"/>
+          </p:cNvPicPr>
+          <p:nvPr/>
+        </p:nvPicPr>
+        <p:blipFill>
+          <a:blip r:embed="rId3">
+            <a:extLst>
+              <a:ext uri="{28A0092B-C50C-407E-A947-70E740481C1C}">
+                <a14:useLocalDpi xmlns:a14="http://schemas.microsoft.com/office/drawing/2010/main" val="0"/>
+              </a:ext>
+            </a:extLst>
+          </a:blip>
+          <a:srcRect/>
+          <a:stretch>
+            <a:fillRect/>
+          </a:stretch>
+        </p:blipFill>
+        <p:spPr bwMode="auto">
+          <a:xfrm>
+            <a:off x="4627247" y="1916832"/>
+            <a:ext cx="4552950" cy="3305175"/>
+          </a:xfrm>
+          <a:prstGeom prst="rect">
+            <a:avLst/>
+          </a:prstGeom>
+          <a:noFill/>
+          <a:extLst>
+            <a:ext uri="{909E8E84-426E-40DD-AFC4-6F175D3DCCD1}">
+              <a14:hiddenFill xmlns:a14="http://schemas.microsoft.com/office/drawing/2010/main">
+                <a:solidFill>
+                  <a:srgbClr val="FFFFFF"/>
+                </a:solidFill>
+              </a14:hiddenFill>
+            </a:ext>
+          </a:extLst>
+        </p:spPr>
+      </p:pic>
+      <p:sp>
+        <p:nvSpPr>
+          <p:cNvPr id="8" name="ZoneTexte 7"/>
+          <p:cNvSpPr txBox="1"/>
+          <p:nvPr/>
+        </p:nvSpPr>
+        <p:spPr>
+          <a:xfrm>
+            <a:off x="395536" y="5589240"/>
+            <a:ext cx="8424936" cy="923330"/>
+          </a:xfrm>
+          <a:prstGeom prst="rect">
+            <a:avLst/>
+          </a:prstGeom>
+          <a:noFill/>
+        </p:spPr>
+        <p:txBody>
+          <a:bodyPr wrap="square" rtlCol="0">
+            <a:spAutoFit/>
+          </a:bodyPr>
+          <a:lstStyle/>
+          <a:p>
+            <a:pPr marL="285750" indent="-285750">
+              <a:buFont typeface="Arial" panose="020B0604020202020204" pitchFamily="34" charset="0"/>
+              <a:buChar char="•"/>
+            </a:pPr>
+            <a:r>
+              <a:rPr lang="fr-FR" dirty="0" smtClean="0"/>
+              <a:t>Pays les plus exposés: Irlande, Malte, Chypre, Luxembourg</a:t>
+            </a:r>
+          </a:p>
+          <a:p>
+            <a:pPr marL="285750" indent="-285750">
+              <a:buFont typeface="Arial" panose="020B0604020202020204" pitchFamily="34" charset="0"/>
+              <a:buChar char="•"/>
+            </a:pPr>
+            <a:r>
+              <a:rPr lang="fr-FR" dirty="0" smtClean="0"/>
+              <a:t>Augmentation de l’exposition dans le temps avec WIOD</a:t>
+            </a:r>
+          </a:p>
+          <a:p>
+            <a:pPr marL="285750" indent="-285750">
+              <a:buFont typeface="Arial" panose="020B0604020202020204" pitchFamily="34" charset="0"/>
+              <a:buChar char="•"/>
+            </a:pPr>
+            <a:r>
+              <a:rPr lang="fr-FR" dirty="0" smtClean="0"/>
+              <a:t>Effet plus faible avec TIVA, hormis pour l’Irlande</a:t>
+            </a:r>
+            <a:endParaRPr lang="fr-FR" dirty="0"/>
+          </a:p>
+        </p:txBody>
+      </p:sp>
+    </p:spTree>
+    <p:extLst>
+      <p:ext uri="{BB962C8B-B14F-4D97-AF65-F5344CB8AC3E}">
+        <p14:creationId xmlns:p14="http://schemas.microsoft.com/office/powerpoint/2010/main" val="4245209825"/>
+      </p:ext>
+    </p:extLst>
+  </p:cSld>
+  <p:clrMapOvr>
+    <a:masterClrMapping/>
+  </p:clrMapOvr>
+</p:sld>
+</file>
+
+<file path=ppt/slides/slide12.xml><?xml version="1.0" encoding="utf-8"?>
+<p:sld xmlns:a="http://schemas.openxmlformats.org/drawingml/2006/main" xmlns:r="http://schemas.openxmlformats.org/officeDocument/2006/relationships" xmlns:p="http://schemas.openxmlformats.org/presentationml/2006/main">
+  <p:cSld>
+    <p:spTree>
+      <p:nvGrpSpPr>
+        <p:cNvPr id="1" name=""/>
+        <p:cNvGrpSpPr/>
+        <p:nvPr/>
+      </p:nvGrpSpPr>
+      <p:grpSpPr>
+        <a:xfrm>
+          <a:off x="0" y="0"/>
+          <a:ext cx="0" cy="0"/>
+          <a:chOff x="0" y="0"/>
+          <a:chExt cx="0" cy="0"/>
+        </a:xfrm>
+      </p:grpSpPr>
+      <p:sp>
+        <p:nvSpPr>
+          <p:cNvPr id="2" name="Titre 1"/>
+          <p:cNvSpPr>
+            <a:spLocks noGrp="1"/>
+          </p:cNvSpPr>
+          <p:nvPr>
+            <p:ph type="title"/>
+          </p:nvPr>
+        </p:nvSpPr>
+        <p:spPr/>
+        <p:txBody>
+          <a:bodyPr>
+            <a:normAutofit fontScale="90000"/>
+          </a:bodyPr>
+          <a:lstStyle/>
+          <a:p>
+            <a:r>
+              <a:rPr lang="fr-FR" dirty="0" smtClean="0"/>
+              <a:t>Élasticité prix conso ZE à une appréciation USD</a:t>
+            </a:r>
+            <a:endParaRPr lang="fr-FR" dirty="0"/>
+          </a:p>
+        </p:txBody>
+      </p:sp>
+      <p:graphicFrame>
+        <p:nvGraphicFramePr>
+          <p:cNvPr id="4" name="Espace réservé du contenu 3"/>
+          <p:cNvGraphicFramePr>
+            <a:graphicFrameLocks noGrp="1"/>
+          </p:cNvGraphicFramePr>
+          <p:nvPr>
+            <p:ph idx="1"/>
+            <p:extLst>
+              <p:ext uri="{D42A27DB-BD31-4B8C-83A1-F6EECF244321}">
                 <p14:modId xmlns:p14="http://schemas.microsoft.com/office/powerpoint/2010/main" val="1940146336"/>
               </p:ext>
             </p:extLst>
@@ -3416,7 +3930,7 @@
 </p:sld>
 </file>
 
-<file path=ppt/slides/slide11.xml><?xml version="1.0" encoding="utf-8"?>
+<file path=ppt/slides/slide13.xml><?xml version="1.0" encoding="utf-8"?>
 <p:sld xmlns:a="http://schemas.openxmlformats.org/drawingml/2006/main" xmlns:r="http://schemas.openxmlformats.org/officeDocument/2006/relationships" xmlns:p="http://schemas.openxmlformats.org/presentationml/2006/main">
   <p:cSld>
     <p:spTree>
@@ -3618,7 +4132,7 @@
 </p:sld>
 </file>
 
-<file path=ppt/slides/slide12.xml><?xml version="1.0" encoding="utf-8"?>
+<file path=ppt/slides/slide14.xml><?xml version="1.0" encoding="utf-8"?>
 <p:sld xmlns:a="http://schemas.openxmlformats.org/drawingml/2006/main" xmlns:r="http://schemas.openxmlformats.org/officeDocument/2006/relationships" xmlns:p="http://schemas.openxmlformats.org/presentationml/2006/main">
   <p:cSld>
     <p:spTree>
@@ -3670,33 +4184,85 @@
         </p:nvSpPr>
         <p:spPr/>
         <p:txBody>
+          <a:bodyPr>
+            <a:normAutofit fontScale="70000" lnSpcReduction="20000"/>
+          </a:bodyPr>
+          <a:lstStyle/>
+          <a:p>
+            <a:r>
+              <a:rPr lang="fr-FR" dirty="0"/>
+              <a:t>Comparaison avec les élasticités agrégées ?</a:t>
+            </a:r>
+          </a:p>
+          <a:p>
+            <a:r>
+              <a:rPr lang="fr-FR" dirty="0"/>
+              <a:t>On ne peut pas comparer avec le MT ou le LT, mais on peut le faire avec le CT Est-ce que les différences sont comptables ou liées au bouclage ?</a:t>
+            </a:r>
+          </a:p>
+          <a:p>
+            <a:r>
+              <a:rPr lang="fr-FR" dirty="0"/>
+              <a:t>Que nous pourrions utiliser pour les années récentes ?</a:t>
+            </a:r>
+          </a:p>
+          <a:p>
+            <a:r>
+              <a:rPr lang="fr-FR" dirty="0"/>
+              <a:t>Approfondir l’analyse sur la part des inputs importés Quid des changements dans le temps ?</a:t>
+            </a:r>
+          </a:p>
+          <a:p>
+            <a:r>
+              <a:rPr lang="fr-FR" dirty="0"/>
+              <a:t>Est-ce qu’il y a une dynamique qui ne se résume à l’évolution de la part des inputs ?</a:t>
+            </a:r>
+          </a:p>
+          <a:p>
+            <a:r>
+              <a:rPr lang="fr-FR" dirty="0"/>
+              <a:t>Problématique pour une note : existe-t-il une formule au doigt mouillé qui serait meilleure que les élasticités agrégées de CT actuelles ?</a:t>
+            </a:r>
+          </a:p>
+          <a:p>
+            <a:r>
+              <a:rPr lang="fr-FR" dirty="0"/>
+              <a:t>Contrat suivant ? </a:t>
+            </a:r>
+            <a:r>
+              <a:rPr lang="fr-FR"/>
+              <a:t>Impact d’un choc sur le prix du pétrole sur les déflateurs</a:t>
+            </a:r>
+          </a:p>
+        </p:txBody>
+      </p:sp>
+      <p:sp>
+        <p:nvSpPr>
+          <p:cNvPr id="4" name="Espace réservé du numéro de diapositive 3"/>
+          <p:cNvSpPr>
+            <a:spLocks noGrp="1"/>
+          </p:cNvSpPr>
+          <p:nvPr>
+            <p:ph type="sldNum" sz="quarter" idx="12"/>
+          </p:nvPr>
+        </p:nvSpPr>
+        <p:spPr/>
+        <p:txBody>
           <a:bodyPr/>
           <a:lstStyle/>
           <a:p>
-            <a:r>
-              <a:rPr lang="fr-FR" dirty="0" smtClean="0"/>
-              <a:t>Interprétation des résultats</a:t>
-            </a:r>
-          </a:p>
-          <a:p>
-            <a:r>
-              <a:rPr lang="fr-FR" dirty="0" smtClean="0"/>
-              <a:t>Approfondir l’analyse sur la part des inputs importés </a:t>
-            </a:r>
-          </a:p>
-          <a:p>
-            <a:r>
-              <a:rPr lang="fr-FR" dirty="0" smtClean="0"/>
-              <a:t>Impact d’un choc sur le prix du pétrole sur les déflateurs</a:t>
-            </a:r>
-            <a:endParaRPr lang="fr-FR" dirty="0"/>
+            <a:fld id="{6C2979F8-DCA1-40EA-8D91-2EE9239FA742}" type="slidenum">
+              <a:rPr lang="fr-FR" smtClean="0"/>
+              <a:t>14</a:t>
+            </a:fld>
+            <a:endParaRPr lang="fr-FR"/>
           </a:p>
         </p:txBody>
       </p:sp>
     </p:spTree>
     <p:extLst>
       <p:ext uri="{BB962C8B-B14F-4D97-AF65-F5344CB8AC3E}">
-        <p14:creationId xmlns:p14="http://schemas.microsoft.com/office/powerpoint/2010/main" val="3062386013"/>
+        <p14:creationId xmlns:p14="http://schemas.microsoft.com/office/powerpoint/2010/main" val="1252658836"/>
       </p:ext>
     </p:extLst>
   </p:cSld>
@@ -4270,6 +4836,145 @@
         </p:nvSpPr>
         <p:spPr>
           <a:xfrm>
+            <a:off x="457200" y="274638"/>
+            <a:ext cx="8229600" cy="562074"/>
+          </a:xfrm>
+        </p:spPr>
+        <p:txBody>
+          <a:bodyPr>
+            <a:normAutofit fontScale="90000"/>
+          </a:bodyPr>
+          <a:lstStyle/>
+          <a:p>
+            <a:r>
+              <a:rPr lang="fr-FR" dirty="0" smtClean="0"/>
+              <a:t>Structure des WIOT (ici, TIVA)</a:t>
+            </a:r>
+            <a:endParaRPr lang="fr-FR" dirty="0"/>
+          </a:p>
+        </p:txBody>
+      </p:sp>
+      <p:pic>
+        <p:nvPicPr>
+          <p:cNvPr id="1026" name="Picture 2"/>
+          <p:cNvPicPr>
+            <a:picLocks noGrp="1" noChangeAspect="1" noChangeArrowheads="1"/>
+          </p:cNvPicPr>
+          <p:nvPr>
+            <p:ph idx="1"/>
+          </p:nvPr>
+        </p:nvPicPr>
+        <p:blipFill>
+          <a:blip r:embed="rId2">
+            <a:extLst>
+              <a:ext uri="{28A0092B-C50C-407E-A947-70E740481C1C}">
+                <a14:useLocalDpi xmlns:a14="http://schemas.microsoft.com/office/drawing/2010/main" val="0"/>
+              </a:ext>
+            </a:extLst>
+          </a:blip>
+          <a:srcRect/>
+          <a:stretch>
+            <a:fillRect/>
+          </a:stretch>
+        </p:blipFill>
+        <p:spPr bwMode="auto">
+          <a:xfrm>
+            <a:off x="0" y="764703"/>
+            <a:ext cx="9105111" cy="5949955"/>
+          </a:xfrm>
+          <a:prstGeom prst="rect">
+            <a:avLst/>
+          </a:prstGeom>
+          <a:noFill/>
+          <a:ln>
+            <a:noFill/>
+          </a:ln>
+          <a:extLst>
+            <a:ext uri="{909E8E84-426E-40DD-AFC4-6F175D3DCCD1}">
+              <a14:hiddenFill xmlns:a14="http://schemas.microsoft.com/office/drawing/2010/main">
+                <a:solidFill>
+                  <a:schemeClr val="accent1"/>
+                </a:solidFill>
+              </a14:hiddenFill>
+            </a:ext>
+            <a:ext uri="{91240B29-F687-4F45-9708-019B960494DF}">
+              <a14:hiddenLine xmlns:a14="http://schemas.microsoft.com/office/drawing/2010/main" w="9525">
+                <a:solidFill>
+                  <a:schemeClr val="tx1"/>
+                </a:solidFill>
+                <a:miter lim="800000"/>
+                <a:headEnd/>
+                <a:tailEnd/>
+              </a14:hiddenLine>
+            </a:ext>
+          </a:extLst>
+        </p:spPr>
+      </p:pic>
+      <p:sp>
+        <p:nvSpPr>
+          <p:cNvPr id="4" name="Espace réservé du numéro de diapositive 3"/>
+          <p:cNvSpPr>
+            <a:spLocks noGrp="1"/>
+          </p:cNvSpPr>
+          <p:nvPr>
+            <p:ph type="sldNum" sz="quarter" idx="12"/>
+          </p:nvPr>
+        </p:nvSpPr>
+        <p:spPr/>
+        <p:txBody>
+          <a:bodyPr/>
+          <a:lstStyle/>
+          <a:p>
+            <a:fld id="{6C2979F8-DCA1-40EA-8D91-2EE9239FA742}" type="slidenum">
+              <a:rPr lang="fr-FR" smtClean="0"/>
+              <a:t>4</a:t>
+            </a:fld>
+            <a:endParaRPr lang="fr-FR"/>
+          </a:p>
+        </p:txBody>
+      </p:sp>
+    </p:spTree>
+    <p:extLst>
+      <p:ext uri="{BB962C8B-B14F-4D97-AF65-F5344CB8AC3E}">
+        <p14:creationId xmlns:p14="http://schemas.microsoft.com/office/powerpoint/2010/main" val="73092093"/>
+      </p:ext>
+    </p:extLst>
+  </p:cSld>
+  <p:clrMapOvr>
+    <a:masterClrMapping/>
+  </p:clrMapOvr>
+</p:sld>
+</file>
+
+<file path=ppt/slides/slide5.xml><?xml version="1.0" encoding="utf-8"?>
+<p:sld xmlns:a="http://schemas.openxmlformats.org/drawingml/2006/main" xmlns:r="http://schemas.openxmlformats.org/officeDocument/2006/relationships" xmlns:p="http://schemas.openxmlformats.org/presentationml/2006/main">
+  <p:cSld>
+    <p:spTree>
+      <p:nvGrpSpPr>
+        <p:cNvPr id="1" name=""/>
+        <p:cNvGrpSpPr/>
+        <p:nvPr/>
+      </p:nvGrpSpPr>
+      <p:grpSpPr>
+        <a:xfrm>
+          <a:off x="0" y="0"/>
+          <a:ext cx="0" cy="0"/>
+          <a:chOff x="0" y="0"/>
+          <a:chExt cx="0" cy="0"/>
+        </a:xfrm>
+      </p:grpSpPr>
+      <p:sp>
+        <p:nvSpPr>
+          <p:cNvPr id="2" name="Titre 1"/>
+          <p:cNvSpPr>
+            <a:spLocks noGrp="1"/>
+          </p:cNvSpPr>
+          <p:nvPr>
+            <p:ph type="title"/>
+          </p:nvPr>
+        </p:nvSpPr>
+        <p:spPr>
+          <a:xfrm>
             <a:off x="0" y="274638"/>
             <a:ext cx="8686800" cy="634082"/>
           </a:xfrm>
@@ -4415,7 +5120,7 @@
 </p:sld>
 </file>
 
-<file path=ppt/slides/slide5.xml><?xml version="1.0" encoding="utf-8"?>
+<file path=ppt/slides/slide6.xml><?xml version="1.0" encoding="utf-8"?>
 <p:sld xmlns:a="http://schemas.openxmlformats.org/drawingml/2006/main" xmlns:r="http://schemas.openxmlformats.org/officeDocument/2006/relationships" xmlns:p="http://schemas.openxmlformats.org/presentationml/2006/main">
   <p:cSld>
     <p:spTree>
@@ -4442,7 +5147,12 @@
             <p:ph type="title"/>
           </p:nvPr>
         </p:nvSpPr>
-        <p:spPr/>
+        <p:spPr>
+          <a:xfrm>
+            <a:off x="0" y="274638"/>
+            <a:ext cx="8686800" cy="634082"/>
+          </a:xfrm>
+        </p:spPr>
         <p:txBody>
           <a:bodyPr>
             <a:normAutofit fontScale="90000"/>
@@ -4451,7 +5161,320 @@
           <a:p>
             <a:r>
               <a:rPr lang="fr-FR" dirty="0" smtClean="0"/>
-              <a:t>Élasticité prix pays hors ZE à une appréciation EUR</a:t>
+              <a:t>Élasticité prix ZE à une appréciation EUR</a:t>
+            </a:r>
+            <a:endParaRPr lang="fr-FR" dirty="0"/>
+          </a:p>
+        </p:txBody>
+      </p:sp>
+      <p:graphicFrame>
+        <p:nvGraphicFramePr>
+          <p:cNvPr id="4" name="Espace réservé du contenu 3"/>
+          <p:cNvGraphicFramePr>
+            <a:graphicFrameLocks noGrp="1"/>
+          </p:cNvGraphicFramePr>
+          <p:nvPr>
+            <p:ph idx="1"/>
+            <p:extLst>
+              <p:ext uri="{D42A27DB-BD31-4B8C-83A1-F6EECF244321}">
+                <p14:modId xmlns:p14="http://schemas.microsoft.com/office/powerpoint/2010/main" val="2488688525"/>
+              </p:ext>
+            </p:extLst>
+          </p:nvPr>
+        </p:nvGraphicFramePr>
+        <p:xfrm>
+          <a:off x="457200" y="1052736"/>
+          <a:ext cx="8229600" cy="370840"/>
+        </p:xfrm>
+        <a:graphic>
+          <a:graphicData uri="http://schemas.openxmlformats.org/drawingml/2006/table">
+            <a:tbl>
+              <a:tblPr firstRow="1" bandRow="1">
+                <a:tableStyleId>{5C22544A-7EE6-4342-B048-85BDC9FD1C3A}</a:tableStyleId>
+              </a:tblPr>
+              <a:tblGrid>
+                <a:gridCol w="4114800"/>
+                <a:gridCol w="4114800"/>
+              </a:tblGrid>
+              <a:tr h="370840">
+                <a:tc>
+                  <a:txBody>
+                    <a:bodyPr/>
+                    <a:lstStyle/>
+                    <a:p>
+                      <a:pPr algn="ctr"/>
+                      <a:r>
+                        <a:rPr lang="fr-FR" dirty="0" smtClean="0"/>
+                        <a:t>WIOD</a:t>
+                      </a:r>
+                      <a:endParaRPr lang="fr-FR" dirty="0"/>
+                    </a:p>
+                  </a:txBody>
+                  <a:tcPr/>
+                </a:tc>
+                <a:tc>
+                  <a:txBody>
+                    <a:bodyPr/>
+                    <a:lstStyle/>
+                    <a:p>
+                      <a:pPr algn="ctr"/>
+                      <a:r>
+                        <a:rPr lang="fr-FR" dirty="0" smtClean="0"/>
+                        <a:t>TIVA</a:t>
+                      </a:r>
+                      <a:endParaRPr lang="fr-FR" dirty="0"/>
+                    </a:p>
+                  </a:txBody>
+                  <a:tcPr/>
+                </a:tc>
+              </a:tr>
+            </a:tbl>
+          </a:graphicData>
+        </a:graphic>
+      </p:graphicFrame>
+      <p:sp>
+        <p:nvSpPr>
+          <p:cNvPr id="3" name="ZoneTexte 2"/>
+          <p:cNvSpPr txBox="1"/>
+          <p:nvPr/>
+        </p:nvSpPr>
+        <p:spPr>
+          <a:xfrm>
+            <a:off x="323238" y="4771412"/>
+            <a:ext cx="8496944" cy="2031325"/>
+          </a:xfrm>
+          <a:prstGeom prst="rect">
+            <a:avLst/>
+          </a:prstGeom>
+          <a:noFill/>
+        </p:spPr>
+        <p:txBody>
+          <a:bodyPr wrap="square" rtlCol="0">
+            <a:spAutoFit/>
+          </a:bodyPr>
+          <a:lstStyle/>
+          <a:p>
+            <a:pPr marL="285750" indent="-285750">
+              <a:buFont typeface="Arial" panose="020B0604020202020204" pitchFamily="34" charset="0"/>
+              <a:buChar char="•"/>
+            </a:pPr>
+            <a:r>
+              <a:rPr lang="fr-FR" dirty="0" smtClean="0"/>
+              <a:t>Prix de production et de consommation: des effets relativement proches entre TIVA et WIOD</a:t>
+            </a:r>
+          </a:p>
+          <a:p>
+            <a:pPr marL="285750" indent="-285750">
+              <a:buFont typeface="Arial" panose="020B0604020202020204" pitchFamily="34" charset="0"/>
+              <a:buChar char="•"/>
+            </a:pPr>
+            <a:r>
+              <a:rPr lang="fr-FR" dirty="0" smtClean="0"/>
+              <a:t>Prix des exportations:</a:t>
+            </a:r>
+          </a:p>
+          <a:p>
+            <a:pPr marL="742950" lvl="1" indent="-285750">
+              <a:buFont typeface="Arial" panose="020B0604020202020204" pitchFamily="34" charset="0"/>
+              <a:buChar char="•"/>
+            </a:pPr>
+            <a:r>
+              <a:rPr lang="fr-FR" dirty="0" smtClean="0"/>
+              <a:t>Effet beaucoup plus fort avec WIOD</a:t>
+            </a:r>
+          </a:p>
+          <a:p>
+            <a:pPr marL="742950" lvl="1" indent="-285750">
+              <a:buFont typeface="Arial" panose="020B0604020202020204" pitchFamily="34" charset="0"/>
+              <a:buChar char="•"/>
+            </a:pPr>
+            <a:r>
+              <a:rPr lang="fr-FR" dirty="0" smtClean="0"/>
+              <a:t>Implication de l’hypothèse sur le contenu en importations par usage:</a:t>
+            </a:r>
+          </a:p>
+          <a:p>
+            <a:pPr marL="1200150" lvl="2" indent="-285750">
+              <a:buFont typeface="Arial" panose="020B0604020202020204" pitchFamily="34" charset="0"/>
+              <a:buChar char="•"/>
+            </a:pPr>
+            <a:r>
+              <a:rPr lang="fr-FR" dirty="0" smtClean="0"/>
+              <a:t>WIOD: un effet bien plus fort sur le prix d’exportations</a:t>
+            </a:r>
+          </a:p>
+          <a:p>
+            <a:pPr marL="1200150" lvl="2" indent="-285750">
+              <a:buFont typeface="Arial" panose="020B0604020202020204" pitchFamily="34" charset="0"/>
+              <a:buChar char="•"/>
+            </a:pPr>
+            <a:r>
+              <a:rPr lang="fr-FR" dirty="0" smtClean="0"/>
+              <a:t>TIVA: des effets proches sur tous les déflateurs</a:t>
+            </a:r>
+            <a:endParaRPr lang="fr-FR" dirty="0"/>
+          </a:p>
+        </p:txBody>
+      </p:sp>
+      <p:pic>
+        <p:nvPicPr>
+          <p:cNvPr id="1026" name="Picture 2" descr="V:\DiagConj\Commun\CommerceVA\Results\Devaluations\HC_Graph_3_TIVA.png"/>
+          <p:cNvPicPr>
+            <a:picLocks noChangeAspect="1" noChangeArrowheads="1"/>
+          </p:cNvPicPr>
+          <p:nvPr/>
+        </p:nvPicPr>
+        <p:blipFill>
+          <a:blip r:embed="rId2">
+            <a:extLst>
+              <a:ext uri="{28A0092B-C50C-407E-A947-70E740481C1C}">
+                <a14:useLocalDpi xmlns:a14="http://schemas.microsoft.com/office/drawing/2010/main" val="0"/>
+              </a:ext>
+            </a:extLst>
+          </a:blip>
+          <a:srcRect/>
+          <a:stretch>
+            <a:fillRect/>
+          </a:stretch>
+        </p:blipFill>
+        <p:spPr bwMode="auto">
+          <a:xfrm>
+            <a:off x="4572000" y="1384848"/>
+            <a:ext cx="4552950" cy="3305175"/>
+          </a:xfrm>
+          <a:prstGeom prst="rect">
+            <a:avLst/>
+          </a:prstGeom>
+          <a:noFill/>
+          <a:extLst>
+            <a:ext uri="{909E8E84-426E-40DD-AFC4-6F175D3DCCD1}">
+              <a14:hiddenFill xmlns:a14="http://schemas.microsoft.com/office/drawing/2010/main">
+                <a:solidFill>
+                  <a:srgbClr val="FFFFFF"/>
+                </a:solidFill>
+              </a14:hiddenFill>
+            </a:ext>
+          </a:extLst>
+        </p:spPr>
+      </p:pic>
+      <p:pic>
+        <p:nvPicPr>
+          <p:cNvPr id="1027" name="Picture 3" descr="V:\DiagConj\Commun\CommerceVA\Results\Devaluations\HC_Graph_3_WIOD.png"/>
+          <p:cNvPicPr>
+            <a:picLocks noChangeAspect="1" noChangeArrowheads="1"/>
+          </p:cNvPicPr>
+          <p:nvPr/>
+        </p:nvPicPr>
+        <p:blipFill>
+          <a:blip r:embed="rId3">
+            <a:extLst>
+              <a:ext uri="{28A0092B-C50C-407E-A947-70E740481C1C}">
+                <a14:useLocalDpi xmlns:a14="http://schemas.microsoft.com/office/drawing/2010/main" val="0"/>
+              </a:ext>
+            </a:extLst>
+          </a:blip>
+          <a:srcRect/>
+          <a:stretch>
+            <a:fillRect/>
+          </a:stretch>
+        </p:blipFill>
+        <p:spPr bwMode="auto">
+          <a:xfrm>
+            <a:off x="-4976" y="1384848"/>
+            <a:ext cx="4648984" cy="3374890"/>
+          </a:xfrm>
+          <a:prstGeom prst="rect">
+            <a:avLst/>
+          </a:prstGeom>
+          <a:noFill/>
+          <a:extLst>
+            <a:ext uri="{909E8E84-426E-40DD-AFC4-6F175D3DCCD1}">
+              <a14:hiddenFill xmlns:a14="http://schemas.microsoft.com/office/drawing/2010/main">
+                <a:solidFill>
+                  <a:srgbClr val="FFFFFF"/>
+                </a:solidFill>
+              </a14:hiddenFill>
+            </a:ext>
+          </a:extLst>
+        </p:spPr>
+      </p:pic>
+      <p:sp>
+        <p:nvSpPr>
+          <p:cNvPr id="5" name="Espace réservé du numéro de diapositive 4"/>
+          <p:cNvSpPr>
+            <a:spLocks noGrp="1"/>
+          </p:cNvSpPr>
+          <p:nvPr>
+            <p:ph type="sldNum" sz="quarter" idx="12"/>
+          </p:nvPr>
+        </p:nvSpPr>
+        <p:spPr/>
+        <p:txBody>
+          <a:bodyPr/>
+          <a:lstStyle/>
+          <a:p>
+            <a:fld id="{6C2979F8-DCA1-40EA-8D91-2EE9239FA742}" type="slidenum">
+              <a:rPr lang="fr-FR" smtClean="0"/>
+              <a:t>6</a:t>
+            </a:fld>
+            <a:endParaRPr lang="fr-FR"/>
+          </a:p>
+        </p:txBody>
+      </p:sp>
+    </p:spTree>
+    <p:extLst>
+      <p:ext uri="{BB962C8B-B14F-4D97-AF65-F5344CB8AC3E}">
+        <p14:creationId xmlns:p14="http://schemas.microsoft.com/office/powerpoint/2010/main" val="1578897895"/>
+      </p:ext>
+    </p:extLst>
+  </p:cSld>
+  <p:clrMapOvr>
+    <a:masterClrMapping/>
+  </p:clrMapOvr>
+</p:sld>
+</file>
+
+<file path=ppt/slides/slide7.xml><?xml version="1.0" encoding="utf-8"?>
+<p:sld xmlns:a="http://schemas.openxmlformats.org/drawingml/2006/main" xmlns:r="http://schemas.openxmlformats.org/officeDocument/2006/relationships" xmlns:p="http://schemas.openxmlformats.org/presentationml/2006/main">
+  <p:cSld>
+    <p:spTree>
+      <p:nvGrpSpPr>
+        <p:cNvPr id="1" name=""/>
+        <p:cNvGrpSpPr/>
+        <p:nvPr/>
+      </p:nvGrpSpPr>
+      <p:grpSpPr>
+        <a:xfrm>
+          <a:off x="0" y="0"/>
+          <a:ext cx="0" cy="0"/>
+          <a:chOff x="0" y="0"/>
+          <a:chExt cx="0" cy="0"/>
+        </a:xfrm>
+      </p:grpSpPr>
+      <p:sp>
+        <p:nvSpPr>
+          <p:cNvPr id="2" name="Titre 1"/>
+          <p:cNvSpPr>
+            <a:spLocks noGrp="1"/>
+          </p:cNvSpPr>
+          <p:nvPr>
+            <p:ph type="title"/>
+          </p:nvPr>
+        </p:nvSpPr>
+        <p:spPr/>
+        <p:txBody>
+          <a:bodyPr>
+            <a:normAutofit fontScale="90000"/>
+          </a:bodyPr>
+          <a:lstStyle/>
+          <a:p>
+            <a:r>
+              <a:rPr lang="fr-FR" dirty="0" smtClean="0"/>
+              <a:t>Élasticité prix pays hors ZE à une </a:t>
+            </a:r>
+            <a:r>
+              <a:rPr lang="fr-FR" dirty="0" smtClean="0"/>
+              <a:t>dépréciation devise locale</a:t>
             </a:r>
             <a:endParaRPr lang="fr-FR" dirty="0"/>
           </a:p>
@@ -4530,7 +5553,7 @@
           </p:cNvPicPr>
           <p:nvPr/>
         </p:nvPicPr>
-        <p:blipFill>
+        <p:blipFill rotWithShape="1">
           <a:blip r:embed="rId2">
             <a:extLst>
               <a:ext uri="{28A0092B-C50C-407E-A947-70E740481C1C}">
@@ -4538,15 +5561,13 @@
               </a:ext>
             </a:extLst>
           </a:blip>
-          <a:srcRect/>
-          <a:stretch>
-            <a:fillRect/>
-          </a:stretch>
+          <a:srcRect t="8320"/>
+          <a:stretch/>
         </p:blipFill>
         <p:spPr bwMode="auto">
           <a:xfrm>
-            <a:off x="4444430" y="1988839"/>
-            <a:ext cx="4699570" cy="3411613"/>
+            <a:off x="4444430" y="2272683"/>
+            <a:ext cx="4699570" cy="3127769"/>
           </a:xfrm>
           <a:prstGeom prst="rect">
             <a:avLst/>
@@ -4571,7 +5592,7 @@
           </p:cNvPicPr>
           <p:nvPr/>
         </p:nvPicPr>
-        <p:blipFill>
+        <p:blipFill rotWithShape="1">
           <a:blip r:embed="rId3">
             <a:extLst>
               <a:ext uri="{28A0092B-C50C-407E-A947-70E740481C1C}">
@@ -4579,15 +5600,13 @@
               </a:ext>
             </a:extLst>
           </a:blip>
-          <a:srcRect/>
-          <a:stretch>
-            <a:fillRect/>
-          </a:stretch>
+          <a:srcRect t="8354"/>
+          <a:stretch/>
         </p:blipFill>
         <p:spPr bwMode="auto">
           <a:xfrm>
-            <a:off x="-108520" y="1988840"/>
-            <a:ext cx="4680520" cy="3397783"/>
+            <a:off x="-108520" y="2272683"/>
+            <a:ext cx="4680520" cy="3113940"/>
           </a:xfrm>
           <a:prstGeom prst="rect">
             <a:avLst/>
@@ -4617,7 +5636,7 @@
 </p:sld>
 </file>
 
-<file path=ppt/slides/slide6.xml><?xml version="1.0" encoding="utf-8"?>
+<file path=ppt/slides/slide8.xml><?xml version="1.0" encoding="utf-8"?>
 <p:sld xmlns:a="http://schemas.openxmlformats.org/drawingml/2006/main" xmlns:r="http://schemas.openxmlformats.org/officeDocument/2006/relationships" xmlns:p="http://schemas.openxmlformats.org/presentationml/2006/main">
   <p:cSld>
     <p:spTree>
@@ -4869,7 +5888,7 @@
 </p:sld>
 </file>
 
-<file path=ppt/slides/slide7.xml><?xml version="1.0" encoding="utf-8"?>
+<file path=ppt/slides/slide9.xml><?xml version="1.0" encoding="utf-8"?>
 <p:sld xmlns:a="http://schemas.openxmlformats.org/drawingml/2006/main" xmlns:r="http://schemas.openxmlformats.org/officeDocument/2006/relationships" xmlns:p="http://schemas.openxmlformats.org/presentationml/2006/main">
   <p:cSld>
     <p:spTree>
@@ -5067,518 +6086,6 @@
     <p:extLst>
       <p:ext uri="{BB962C8B-B14F-4D97-AF65-F5344CB8AC3E}">
         <p14:creationId xmlns:p14="http://schemas.microsoft.com/office/powerpoint/2010/main" val="3731524735"/>
-      </p:ext>
-    </p:extLst>
-  </p:cSld>
-  <p:clrMapOvr>
-    <a:masterClrMapping/>
-  </p:clrMapOvr>
-</p:sld>
-</file>
-
-<file path=ppt/slides/slide8.xml><?xml version="1.0" encoding="utf-8"?>
-<p:sld xmlns:a="http://schemas.openxmlformats.org/drawingml/2006/main" xmlns:r="http://schemas.openxmlformats.org/officeDocument/2006/relationships" xmlns:p="http://schemas.openxmlformats.org/presentationml/2006/main">
-  <p:cSld>
-    <p:spTree>
-      <p:nvGrpSpPr>
-        <p:cNvPr id="1" name=""/>
-        <p:cNvGrpSpPr/>
-        <p:nvPr/>
-      </p:nvGrpSpPr>
-      <p:grpSpPr>
-        <a:xfrm>
-          <a:off x="0" y="0"/>
-          <a:ext cx="0" cy="0"/>
-          <a:chOff x="0" y="0"/>
-          <a:chExt cx="0" cy="0"/>
-        </a:xfrm>
-      </p:grpSpPr>
-      <p:sp>
-        <p:nvSpPr>
-          <p:cNvPr id="2" name="Titre 1"/>
-          <p:cNvSpPr>
-            <a:spLocks noGrp="1"/>
-          </p:cNvSpPr>
-          <p:nvPr>
-            <p:ph type="title"/>
-          </p:nvPr>
-        </p:nvSpPr>
-        <p:spPr/>
-        <p:txBody>
-          <a:bodyPr>
-            <a:normAutofit fontScale="90000"/>
-          </a:bodyPr>
-          <a:lstStyle/>
-          <a:p>
-            <a:r>
-              <a:rPr lang="fr-FR" dirty="0" smtClean="0"/>
-              <a:t>Élasticité prix conso ZE à une appréciation USD</a:t>
-            </a:r>
-            <a:endParaRPr lang="fr-FR" dirty="0"/>
-          </a:p>
-        </p:txBody>
-      </p:sp>
-      <p:graphicFrame>
-        <p:nvGraphicFramePr>
-          <p:cNvPr id="4" name="Espace réservé du contenu 3"/>
-          <p:cNvGraphicFramePr>
-            <a:graphicFrameLocks noGrp="1"/>
-          </p:cNvGraphicFramePr>
-          <p:nvPr>
-            <p:ph idx="1"/>
-            <p:extLst>
-              <p:ext uri="{D42A27DB-BD31-4B8C-83A1-F6EECF244321}">
-                <p14:modId xmlns:p14="http://schemas.microsoft.com/office/powerpoint/2010/main" val="909267680"/>
-              </p:ext>
-            </p:extLst>
-          </p:nvPr>
-        </p:nvGraphicFramePr>
-        <p:xfrm>
-          <a:off x="457200" y="1600200"/>
-          <a:ext cx="8229600" cy="370840"/>
-        </p:xfrm>
-        <a:graphic>
-          <a:graphicData uri="http://schemas.openxmlformats.org/drawingml/2006/table">
-            <a:tbl>
-              <a:tblPr firstRow="1" bandRow="1">
-                <a:tableStyleId>{5C22544A-7EE6-4342-B048-85BDC9FD1C3A}</a:tableStyleId>
-              </a:tblPr>
-              <a:tblGrid>
-                <a:gridCol w="4114800"/>
-                <a:gridCol w="4114800"/>
-              </a:tblGrid>
-              <a:tr h="370840">
-                <a:tc>
-                  <a:txBody>
-                    <a:bodyPr/>
-                    <a:lstStyle/>
-                    <a:p>
-                      <a:pPr algn="ctr"/>
-                      <a:r>
-                        <a:rPr lang="fr-FR" dirty="0" smtClean="0"/>
-                        <a:t>WIOD</a:t>
-                      </a:r>
-                      <a:endParaRPr lang="fr-FR" dirty="0"/>
-                    </a:p>
-                  </a:txBody>
-                  <a:tcPr/>
-                </a:tc>
-                <a:tc>
-                  <a:txBody>
-                    <a:bodyPr/>
-                    <a:lstStyle/>
-                    <a:p>
-                      <a:pPr algn="ctr"/>
-                      <a:r>
-                        <a:rPr lang="fr-FR" dirty="0" smtClean="0"/>
-                        <a:t>TIVA</a:t>
-                      </a:r>
-                      <a:endParaRPr lang="fr-FR" dirty="0"/>
-                    </a:p>
-                  </a:txBody>
-                  <a:tcPr/>
-                </a:tc>
-              </a:tr>
-            </a:tbl>
-          </a:graphicData>
-        </a:graphic>
-      </p:graphicFrame>
-      <p:pic>
-        <p:nvPicPr>
-          <p:cNvPr id="3074" name="Picture 2" descr="V:\DiagConj\Commun\CommerceVA\Results\Devaluations\HC_Graph_4tempc_TIVA.png"/>
-          <p:cNvPicPr>
-            <a:picLocks noChangeAspect="1" noChangeArrowheads="1"/>
-          </p:cNvPicPr>
-          <p:nvPr/>
-        </p:nvPicPr>
-        <p:blipFill>
-          <a:blip r:embed="rId2">
-            <a:extLst>
-              <a:ext uri="{28A0092B-C50C-407E-A947-70E740481C1C}">
-                <a14:useLocalDpi xmlns:a14="http://schemas.microsoft.com/office/drawing/2010/main" val="0"/>
-              </a:ext>
-            </a:extLst>
-          </a:blip>
-          <a:srcRect/>
-          <a:stretch>
-            <a:fillRect/>
-          </a:stretch>
-        </p:blipFill>
-        <p:spPr bwMode="auto">
-          <a:xfrm>
-            <a:off x="4591050" y="1988840"/>
-            <a:ext cx="4552950" cy="3305175"/>
-          </a:xfrm>
-          <a:prstGeom prst="rect">
-            <a:avLst/>
-          </a:prstGeom>
-          <a:noFill/>
-          <a:extLst>
-            <a:ext uri="{909E8E84-426E-40DD-AFC4-6F175D3DCCD1}">
-              <a14:hiddenFill xmlns:a14="http://schemas.microsoft.com/office/drawing/2010/main">
-                <a:solidFill>
-                  <a:srgbClr val="FFFFFF"/>
-                </a:solidFill>
-              </a14:hiddenFill>
-            </a:ext>
-          </a:extLst>
-        </p:spPr>
-      </p:pic>
-      <p:pic>
-        <p:nvPicPr>
-          <p:cNvPr id="3075" name="Picture 3" descr="V:\DiagConj\Commun\CommerceVA\Results\Devaluations\HC_Graph_4tempc_WIOD.png"/>
-          <p:cNvPicPr>
-            <a:picLocks noChangeAspect="1" noChangeArrowheads="1"/>
-          </p:cNvPicPr>
-          <p:nvPr/>
-        </p:nvPicPr>
-        <p:blipFill>
-          <a:blip r:embed="rId3">
-            <a:extLst>
-              <a:ext uri="{28A0092B-C50C-407E-A947-70E740481C1C}">
-                <a14:useLocalDpi xmlns:a14="http://schemas.microsoft.com/office/drawing/2010/main" val="0"/>
-              </a:ext>
-            </a:extLst>
-          </a:blip>
-          <a:srcRect/>
-          <a:stretch>
-            <a:fillRect/>
-          </a:stretch>
-        </p:blipFill>
-        <p:spPr bwMode="auto">
-          <a:xfrm>
-            <a:off x="19050" y="1988839"/>
-            <a:ext cx="4552950" cy="3305175"/>
-          </a:xfrm>
-          <a:prstGeom prst="rect">
-            <a:avLst/>
-          </a:prstGeom>
-          <a:noFill/>
-          <a:extLst>
-            <a:ext uri="{909E8E84-426E-40DD-AFC4-6F175D3DCCD1}">
-              <a14:hiddenFill xmlns:a14="http://schemas.microsoft.com/office/drawing/2010/main">
-                <a:solidFill>
-                  <a:srgbClr val="FFFFFF"/>
-                </a:solidFill>
-              </a14:hiddenFill>
-            </a:ext>
-          </a:extLst>
-        </p:spPr>
-      </p:pic>
-      <p:sp>
-        <p:nvSpPr>
-          <p:cNvPr id="3" name="ZoneTexte 2"/>
-          <p:cNvSpPr txBox="1"/>
-          <p:nvPr/>
-        </p:nvSpPr>
-        <p:spPr>
-          <a:xfrm>
-            <a:off x="395536" y="5589240"/>
-            <a:ext cx="8424936" cy="923330"/>
-          </a:xfrm>
-          <a:prstGeom prst="rect">
-            <a:avLst/>
-          </a:prstGeom>
-          <a:noFill/>
-        </p:spPr>
-        <p:txBody>
-          <a:bodyPr wrap="square" rtlCol="0">
-            <a:spAutoFit/>
-          </a:bodyPr>
-          <a:lstStyle/>
-          <a:p>
-            <a:pPr marL="285750" indent="-285750">
-              <a:buFont typeface="Arial" panose="020B0604020202020204" pitchFamily="34" charset="0"/>
-              <a:buChar char="•"/>
-            </a:pPr>
-            <a:r>
-              <a:rPr lang="fr-FR" dirty="0" smtClean="0"/>
-              <a:t>Pays le plus exposé: Irlande</a:t>
-            </a:r>
-          </a:p>
-          <a:p>
-            <a:pPr marL="285750" indent="-285750">
-              <a:buFont typeface="Arial" panose="020B0604020202020204" pitchFamily="34" charset="0"/>
-              <a:buChar char="•"/>
-            </a:pPr>
-            <a:r>
-              <a:rPr lang="fr-FR" dirty="0" smtClean="0"/>
-              <a:t>Augmentation de l’exposition dans le temps avec WIOD</a:t>
-            </a:r>
-          </a:p>
-          <a:p>
-            <a:pPr marL="285750" indent="-285750">
-              <a:buFont typeface="Arial" panose="020B0604020202020204" pitchFamily="34" charset="0"/>
-              <a:buChar char="•"/>
-            </a:pPr>
-            <a:r>
-              <a:rPr lang="fr-FR" dirty="0" smtClean="0"/>
-              <a:t>Effet plus faible avec TIVA, hormis pour l’Irlande</a:t>
-            </a:r>
-            <a:endParaRPr lang="fr-FR" dirty="0"/>
-          </a:p>
-        </p:txBody>
-      </p:sp>
-    </p:spTree>
-    <p:extLst>
-      <p:ext uri="{BB962C8B-B14F-4D97-AF65-F5344CB8AC3E}">
-        <p14:creationId xmlns:p14="http://schemas.microsoft.com/office/powerpoint/2010/main" val="2044842288"/>
-      </p:ext>
-    </p:extLst>
-  </p:cSld>
-  <p:clrMapOvr>
-    <a:masterClrMapping/>
-  </p:clrMapOvr>
-</p:sld>
-</file>
-
-<file path=ppt/slides/slide9.xml><?xml version="1.0" encoding="utf-8"?>
-<p:sld xmlns:a="http://schemas.openxmlformats.org/drawingml/2006/main" xmlns:r="http://schemas.openxmlformats.org/officeDocument/2006/relationships" xmlns:p="http://schemas.openxmlformats.org/presentationml/2006/main">
-  <p:cSld>
-    <p:spTree>
-      <p:nvGrpSpPr>
-        <p:cNvPr id="1" name=""/>
-        <p:cNvGrpSpPr/>
-        <p:nvPr/>
-      </p:nvGrpSpPr>
-      <p:grpSpPr>
-        <a:xfrm>
-          <a:off x="0" y="0"/>
-          <a:ext cx="0" cy="0"/>
-          <a:chOff x="0" y="0"/>
-          <a:chExt cx="0" cy="0"/>
-        </a:xfrm>
-      </p:grpSpPr>
-      <p:sp>
-        <p:nvSpPr>
-          <p:cNvPr id="2" name="Titre 1"/>
-          <p:cNvSpPr>
-            <a:spLocks noGrp="1"/>
-          </p:cNvSpPr>
-          <p:nvPr>
-            <p:ph type="title"/>
-          </p:nvPr>
-        </p:nvSpPr>
-        <p:spPr/>
-        <p:txBody>
-          <a:bodyPr>
-            <a:normAutofit fontScale="90000"/>
-          </a:bodyPr>
-          <a:lstStyle/>
-          <a:p>
-            <a:r>
-              <a:rPr lang="fr-FR" dirty="0" smtClean="0"/>
-              <a:t>Élasticité prix conso ZE à une appréciation UK</a:t>
-            </a:r>
-            <a:endParaRPr lang="fr-FR" dirty="0"/>
-          </a:p>
-        </p:txBody>
-      </p:sp>
-      <p:graphicFrame>
-        <p:nvGraphicFramePr>
-          <p:cNvPr id="4" name="Espace réservé du contenu 3"/>
-          <p:cNvGraphicFramePr>
-            <a:graphicFrameLocks noGrp="1"/>
-          </p:cNvGraphicFramePr>
-          <p:nvPr>
-            <p:ph idx="1"/>
-            <p:extLst>
-              <p:ext uri="{D42A27DB-BD31-4B8C-83A1-F6EECF244321}">
-                <p14:modId xmlns:p14="http://schemas.microsoft.com/office/powerpoint/2010/main" val="1121728573"/>
-              </p:ext>
-            </p:extLst>
-          </p:nvPr>
-        </p:nvGraphicFramePr>
-        <p:xfrm>
-          <a:off x="457200" y="1600200"/>
-          <a:ext cx="8229600" cy="370840"/>
-        </p:xfrm>
-        <a:graphic>
-          <a:graphicData uri="http://schemas.openxmlformats.org/drawingml/2006/table">
-            <a:tbl>
-              <a:tblPr firstRow="1" bandRow="1">
-                <a:tableStyleId>{5C22544A-7EE6-4342-B048-85BDC9FD1C3A}</a:tableStyleId>
-              </a:tblPr>
-              <a:tblGrid>
-                <a:gridCol w="4114800"/>
-                <a:gridCol w="4114800"/>
-              </a:tblGrid>
-              <a:tr h="370840">
-                <a:tc>
-                  <a:txBody>
-                    <a:bodyPr/>
-                    <a:lstStyle/>
-                    <a:p>
-                      <a:pPr algn="ctr"/>
-                      <a:r>
-                        <a:rPr lang="fr-FR" dirty="0" smtClean="0"/>
-                        <a:t>WIOD</a:t>
-                      </a:r>
-                      <a:endParaRPr lang="fr-FR" dirty="0"/>
-                    </a:p>
-                  </a:txBody>
-                  <a:tcPr/>
-                </a:tc>
-                <a:tc>
-                  <a:txBody>
-                    <a:bodyPr/>
-                    <a:lstStyle/>
-                    <a:p>
-                      <a:pPr algn="ctr"/>
-                      <a:r>
-                        <a:rPr lang="fr-FR" dirty="0" smtClean="0"/>
-                        <a:t>TIVA</a:t>
-                      </a:r>
-                      <a:endParaRPr lang="fr-FR" dirty="0"/>
-                    </a:p>
-                  </a:txBody>
-                  <a:tcPr/>
-                </a:tc>
-              </a:tr>
-            </a:tbl>
-          </a:graphicData>
-        </a:graphic>
-      </p:graphicFrame>
-      <p:pic>
-        <p:nvPicPr>
-          <p:cNvPr id="4098" name="Picture 2" descr="V:\DiagConj\Commun\CommerceVA\Results\Devaluations\HC_WIOD_Graph_4tempb.png"/>
-          <p:cNvPicPr>
-            <a:picLocks noChangeAspect="1" noChangeArrowheads="1"/>
-          </p:cNvPicPr>
-          <p:nvPr/>
-        </p:nvPicPr>
-        <p:blipFill>
-          <a:blip r:embed="rId2">
-            <a:extLst>
-              <a:ext uri="{28A0092B-C50C-407E-A947-70E740481C1C}">
-                <a14:useLocalDpi xmlns:a14="http://schemas.microsoft.com/office/drawing/2010/main" val="0"/>
-              </a:ext>
-            </a:extLst>
-          </a:blip>
-          <a:srcRect/>
-          <a:stretch>
-            <a:fillRect/>
-          </a:stretch>
-        </p:blipFill>
-        <p:spPr bwMode="auto">
-          <a:xfrm>
-            <a:off x="31794" y="1916832"/>
-            <a:ext cx="4552950" cy="3305175"/>
-          </a:xfrm>
-          <a:prstGeom prst="rect">
-            <a:avLst/>
-          </a:prstGeom>
-          <a:noFill/>
-          <a:extLst>
-            <a:ext uri="{909E8E84-426E-40DD-AFC4-6F175D3DCCD1}">
-              <a14:hiddenFill xmlns:a14="http://schemas.microsoft.com/office/drawing/2010/main">
-                <a:solidFill>
-                  <a:srgbClr val="FFFFFF"/>
-                </a:solidFill>
-              </a14:hiddenFill>
-            </a:ext>
-          </a:extLst>
-        </p:spPr>
-      </p:pic>
-      <p:pic>
-        <p:nvPicPr>
-          <p:cNvPr id="4099" name="Picture 3" descr="V:\DiagConj\Commun\CommerceVA\Results\Devaluations\HC_TIVA_Graph_4tempb.png"/>
-          <p:cNvPicPr>
-            <a:picLocks noChangeAspect="1" noChangeArrowheads="1"/>
-          </p:cNvPicPr>
-          <p:nvPr/>
-        </p:nvPicPr>
-        <p:blipFill>
-          <a:blip r:embed="rId3">
-            <a:extLst>
-              <a:ext uri="{28A0092B-C50C-407E-A947-70E740481C1C}">
-                <a14:useLocalDpi xmlns:a14="http://schemas.microsoft.com/office/drawing/2010/main" val="0"/>
-              </a:ext>
-            </a:extLst>
-          </a:blip>
-          <a:srcRect/>
-          <a:stretch>
-            <a:fillRect/>
-          </a:stretch>
-        </p:blipFill>
-        <p:spPr bwMode="auto">
-          <a:xfrm>
-            <a:off x="4627247" y="1916832"/>
-            <a:ext cx="4552950" cy="3305175"/>
-          </a:xfrm>
-          <a:prstGeom prst="rect">
-            <a:avLst/>
-          </a:prstGeom>
-          <a:noFill/>
-          <a:extLst>
-            <a:ext uri="{909E8E84-426E-40DD-AFC4-6F175D3DCCD1}">
-              <a14:hiddenFill xmlns:a14="http://schemas.microsoft.com/office/drawing/2010/main">
-                <a:solidFill>
-                  <a:srgbClr val="FFFFFF"/>
-                </a:solidFill>
-              </a14:hiddenFill>
-            </a:ext>
-          </a:extLst>
-        </p:spPr>
-      </p:pic>
-      <p:sp>
-        <p:nvSpPr>
-          <p:cNvPr id="8" name="ZoneTexte 7"/>
-          <p:cNvSpPr txBox="1"/>
-          <p:nvPr/>
-        </p:nvSpPr>
-        <p:spPr>
-          <a:xfrm>
-            <a:off x="395536" y="5589240"/>
-            <a:ext cx="8424936" cy="923330"/>
-          </a:xfrm>
-          <a:prstGeom prst="rect">
-            <a:avLst/>
-          </a:prstGeom>
-          <a:noFill/>
-        </p:spPr>
-        <p:txBody>
-          <a:bodyPr wrap="square" rtlCol="0">
-            <a:spAutoFit/>
-          </a:bodyPr>
-          <a:lstStyle/>
-          <a:p>
-            <a:pPr marL="285750" indent="-285750">
-              <a:buFont typeface="Arial" panose="020B0604020202020204" pitchFamily="34" charset="0"/>
-              <a:buChar char="•"/>
-            </a:pPr>
-            <a:r>
-              <a:rPr lang="fr-FR" dirty="0" smtClean="0"/>
-              <a:t>Pays les plus exposés: Irlande, Malte, Chypre, Luxembourg</a:t>
-            </a:r>
-          </a:p>
-          <a:p>
-            <a:pPr marL="285750" indent="-285750">
-              <a:buFont typeface="Arial" panose="020B0604020202020204" pitchFamily="34" charset="0"/>
-              <a:buChar char="•"/>
-            </a:pPr>
-            <a:r>
-              <a:rPr lang="fr-FR" dirty="0" smtClean="0"/>
-              <a:t>Augmentation de l’exposition dans le temps avec WIOD</a:t>
-            </a:r>
-          </a:p>
-          <a:p>
-            <a:pPr marL="285750" indent="-285750">
-              <a:buFont typeface="Arial" panose="020B0604020202020204" pitchFamily="34" charset="0"/>
-              <a:buChar char="•"/>
-            </a:pPr>
-            <a:r>
-              <a:rPr lang="fr-FR" dirty="0" smtClean="0"/>
-              <a:t>Effet plus faible avec TIVA, hormis pour l’Irlande</a:t>
-            </a:r>
-            <a:endParaRPr lang="fr-FR" dirty="0"/>
-          </a:p>
-        </p:txBody>
-      </p:sp>
-    </p:spTree>
-    <p:extLst>
-      <p:ext uri="{BB962C8B-B14F-4D97-AF65-F5344CB8AC3E}">
-        <p14:creationId xmlns:p14="http://schemas.microsoft.com/office/powerpoint/2010/main" val="4245209825"/>
       </p:ext>
     </p:extLst>
   </p:cSld>

</xml_diff>

<commit_message>
dernière version pp/note d'étape
Signed-off-by: FAUBERT Violaine (UA 1383) <W817186@intra.bdf.local>
</commit_message>
<xml_diff>
--- a/c17255-Point d’étape projet WIOD TIVA.pptx
+++ b/c17255-Point d’étape projet WIOD TIVA.pptx
@@ -3222,7 +3222,11 @@
           <a:p>
             <a:r>
               <a:rPr lang="fr-FR" dirty="0" smtClean="0"/>
-              <a:t>Élasticité prix conso ZE à une appréciation USD</a:t>
+              <a:t>Élasticité prix conso ZE à une appréciation </a:t>
+            </a:r>
+            <a:r>
+              <a:rPr lang="fr-FR" dirty="0"/>
+              <a:t>USD (2011)</a:t>
             </a:r>
             <a:endParaRPr lang="fr-FR" dirty="0"/>
           </a:p>
@@ -3478,7 +3482,11 @@
           <a:p>
             <a:r>
               <a:rPr lang="fr-FR" dirty="0" smtClean="0"/>
-              <a:t>Élasticité prix conso ZE à une appréciation UK</a:t>
+              <a:t>Élasticité prix conso ZE à une appréciation </a:t>
+            </a:r>
+            <a:r>
+              <a:rPr lang="fr-FR" dirty="0"/>
+              <a:t>UK </a:t>
             </a:r>
             <a:endParaRPr lang="fr-FR" dirty="0"/>
           </a:p>
@@ -3734,7 +3742,11 @@
           <a:p>
             <a:r>
               <a:rPr lang="fr-FR" dirty="0" smtClean="0"/>
-              <a:t>Élasticité prix conso ZE à une appréciation USD</a:t>
+              <a:t>Élasticité prix conso ZE à une appréciation </a:t>
+            </a:r>
+            <a:r>
+              <a:rPr lang="fr-FR" dirty="0"/>
+              <a:t>USD (2011)</a:t>
             </a:r>
             <a:endParaRPr lang="fr-FR" dirty="0"/>
           </a:p>
@@ -3966,7 +3978,11 @@
           <a:p>
             <a:r>
               <a:rPr lang="fr-FR" dirty="0" smtClean="0"/>
-              <a:t>Élasticité prix conso ZE à une appréciation UK</a:t>
+              <a:t>Élasticité prix conso ZE à une appréciation </a:t>
+            </a:r>
+            <a:r>
+              <a:rPr lang="fr-FR" dirty="0"/>
+              <a:t>UK (2011)</a:t>
             </a:r>
             <a:endParaRPr lang="fr-FR" dirty="0"/>
           </a:p>
@@ -4191,13 +4207,26 @@
           <a:p>
             <a:r>
               <a:rPr lang="fr-FR" dirty="0"/>
-              <a:t>Comparaison avec les élasticités agrégées ?</a:t>
-            </a:r>
+              <a:t>Comparaison avec les élasticités </a:t>
+            </a:r>
+            <a:r>
+              <a:rPr lang="fr-FR" dirty="0" smtClean="0"/>
+              <a:t>agrégées?</a:t>
+            </a:r>
+            <a:endParaRPr lang="fr-FR" dirty="0"/>
           </a:p>
           <a:p>
             <a:r>
               <a:rPr lang="fr-FR" dirty="0"/>
-              <a:t>On ne peut pas comparer avec le MT ou le LT, mais on peut le faire avec le CT Est-ce que les différences sont comptables ou liées au bouclage ?</a:t>
+              <a:t>On ne peut pas comparer avec le MT ou le LT, mais on peut le faire avec le </a:t>
+            </a:r>
+            <a:r>
+              <a:rPr lang="fr-FR" dirty="0" smtClean="0"/>
+              <a:t>CT. </a:t>
+            </a:r>
+            <a:r>
+              <a:rPr lang="fr-FR" dirty="0"/>
+              <a:t>Est-ce que les différences sont comptables ou liées au bouclage ?</a:t>
             </a:r>
           </a:p>
           <a:p>
@@ -4209,13 +4238,29 @@
           <a:p>
             <a:r>
               <a:rPr lang="fr-FR" dirty="0"/>
-              <a:t>Approfondir l’analyse sur la part des inputs importés Quid des changements dans le temps ?</a:t>
-            </a:r>
-          </a:p>
-          <a:p>
+              <a:t>Approfondir l’analyse sur la part des inputs </a:t>
+            </a:r>
+            <a:r>
+              <a:rPr lang="fr-FR" dirty="0" smtClean="0"/>
+              <a:t>importés. </a:t>
+            </a:r>
             <a:r>
               <a:rPr lang="fr-FR" dirty="0"/>
-              <a:t>Est-ce qu’il y a une dynamique qui ne se résume à l’évolution de la part des inputs ?</a:t>
+              <a:t>Quid des changements dans le temps ?</a:t>
+            </a:r>
+          </a:p>
+          <a:p>
+            <a:r>
+              <a:rPr lang="fr-FR" dirty="0"/>
+              <a:t>Est-ce qu’il y a une dynamique qui ne se résume </a:t>
+            </a:r>
+            <a:r>
+              <a:rPr lang="fr-FR" dirty="0" smtClean="0"/>
+              <a:t>pas à </a:t>
+            </a:r>
+            <a:r>
+              <a:rPr lang="fr-FR" dirty="0"/>
+              <a:t>l’évolution de la part des inputs ?</a:t>
             </a:r>
           </a:p>
           <a:p>
@@ -4227,11 +4272,7 @@
           <a:p>
             <a:r>
               <a:rPr lang="fr-FR" dirty="0"/>
-              <a:t>Contrat suivant ? </a:t>
-            </a:r>
-            <a:r>
-              <a:rPr lang="fr-FR"/>
-              <a:t>Impact d’un choc sur le prix du pétrole sur les déflateurs</a:t>
+              <a:t>Contrat suivant ? Impact d’un choc sur le prix du pétrole sur les déflateurs</a:t>
             </a:r>
           </a:p>
         </p:txBody>
@@ -5150,20 +5191,24 @@
         <p:spPr>
           <a:xfrm>
             <a:off x="0" y="274638"/>
-            <a:ext cx="8686800" cy="634082"/>
+            <a:ext cx="9124950" cy="634082"/>
           </a:xfrm>
         </p:spPr>
         <p:txBody>
           <a:bodyPr>
-            <a:normAutofit fontScale="90000"/>
+            <a:normAutofit/>
           </a:bodyPr>
           <a:lstStyle/>
           <a:p>
             <a:r>
-              <a:rPr lang="fr-FR" dirty="0" smtClean="0"/>
-              <a:t>Élasticité prix ZE à une appréciation EUR</a:t>
-            </a:r>
-            <a:endParaRPr lang="fr-FR" dirty="0"/>
+              <a:rPr lang="fr-FR" sz="3200" dirty="0" smtClean="0"/>
+              <a:t>Élasticité prix ZE à une appréciation </a:t>
+            </a:r>
+            <a:r>
+              <a:rPr lang="fr-FR" sz="3200" dirty="0"/>
+              <a:t>EUR (2011)</a:t>
+            </a:r>
+            <a:endParaRPr lang="fr-FR" sz="3200" dirty="0"/>
           </a:p>
         </p:txBody>
       </p:sp>
@@ -5474,7 +5519,7 @@
             </a:r>
             <a:r>
               <a:rPr lang="fr-FR" dirty="0" smtClean="0"/>
-              <a:t>dépréciation devise locale</a:t>
+              <a:t>appréciation de la devise locale (2011)</a:t>
             </a:r>
             <a:endParaRPr lang="fr-FR" dirty="0"/>
           </a:p>
@@ -5547,13 +5592,13 @@
       </p:graphicFrame>
       <p:pic>
         <p:nvPicPr>
-          <p:cNvPr id="3075" name="Picture 3" descr="V:\DiagConj\Commun\CommerceVA\Results\Devaluations\HC_Graph_4_TIVA.png"/>
+          <p:cNvPr id="1027" name="Picture 3" descr="V:\DiagConj\Commun\CommerceVA\Results\Devaluations\HC_Graph_1_TIVAHZE.png"/>
           <p:cNvPicPr>
             <a:picLocks noChangeAspect="1" noChangeArrowheads="1"/>
           </p:cNvPicPr>
           <p:nvPr/>
         </p:nvPicPr>
-        <p:blipFill rotWithShape="1">
+        <p:blipFill>
           <a:blip r:embed="rId2">
             <a:extLst>
               <a:ext uri="{28A0092B-C50C-407E-A947-70E740481C1C}">
@@ -5561,13 +5606,15 @@
               </a:ext>
             </a:extLst>
           </a:blip>
-          <a:srcRect t="8320"/>
-          <a:stretch/>
+          <a:srcRect/>
+          <a:stretch>
+            <a:fillRect/>
+          </a:stretch>
         </p:blipFill>
         <p:spPr bwMode="auto">
           <a:xfrm>
-            <a:off x="4444430" y="2272683"/>
-            <a:ext cx="4699570" cy="3127769"/>
+            <a:off x="4427984" y="1916832"/>
+            <a:ext cx="4552950" cy="3305175"/>
           </a:xfrm>
           <a:prstGeom prst="rect">
             <a:avLst/>
@@ -5586,13 +5633,13 @@
       </p:pic>
       <p:pic>
         <p:nvPicPr>
-          <p:cNvPr id="3076" name="Picture 4" descr="V:\DiagConj\Commun\CommerceVA\Results\Devaluations\HC_Graph_4_WIOD.png"/>
+          <p:cNvPr id="1028" name="Picture 4" descr="V:\DiagConj\Commun\CommerceVA\Results\Devaluations\HC_Graph_1_WIODHZE.png"/>
           <p:cNvPicPr>
             <a:picLocks noChangeAspect="1" noChangeArrowheads="1"/>
           </p:cNvPicPr>
           <p:nvPr/>
         </p:nvPicPr>
-        <p:blipFill rotWithShape="1">
+        <p:blipFill>
           <a:blip r:embed="rId3">
             <a:extLst>
               <a:ext uri="{28A0092B-C50C-407E-A947-70E740481C1C}">
@@ -5600,13 +5647,15 @@
               </a:ext>
             </a:extLst>
           </a:blip>
-          <a:srcRect t="8354"/>
-          <a:stretch/>
+          <a:srcRect/>
+          <a:stretch>
+            <a:fillRect/>
+          </a:stretch>
         </p:blipFill>
         <p:spPr bwMode="auto">
           <a:xfrm>
-            <a:off x="-108520" y="2272683"/>
-            <a:ext cx="4680520" cy="3113940"/>
+            <a:off x="0" y="1916831"/>
+            <a:ext cx="4552950" cy="3305175"/>
           </a:xfrm>
           <a:prstGeom prst="rect">
             <a:avLst/>
@@ -5672,7 +5721,11 @@
           <a:p>
             <a:r>
               <a:rPr lang="fr-FR" dirty="0" smtClean="0"/>
-              <a:t>Élasticité prix conso pays hors ZE à une appréciation EUR</a:t>
+              <a:t>Élasticité prix conso pays hors ZE à une appréciation </a:t>
+            </a:r>
+            <a:r>
+              <a:rPr lang="fr-FR" dirty="0"/>
+              <a:t>EUR (2011)</a:t>
             </a:r>
             <a:endParaRPr lang="fr-FR" dirty="0"/>
           </a:p>

</xml_diff>